<commit_message>
Added a doc and edited slide
duplicated 2 slides for a different look
Added basic run through for speaking
</commit_message>
<xml_diff>
--- a/PowerPoint Slides/ITPV302 - Presentation.pptx
+++ b/PowerPoint Slides/ITPV302 - Presentation.pptx
@@ -7,10 +7,12 @@
   <p:sldIdLst>
     <p:sldId id="256" r:id="rId2"/>
     <p:sldId id="257" r:id="rId3"/>
-    <p:sldId id="258" r:id="rId4"/>
-    <p:sldId id="259" r:id="rId5"/>
-    <p:sldId id="260" r:id="rId6"/>
-    <p:sldId id="261" r:id="rId7"/>
+    <p:sldId id="263" r:id="rId4"/>
+    <p:sldId id="258" r:id="rId5"/>
+    <p:sldId id="262" r:id="rId6"/>
+    <p:sldId id="259" r:id="rId7"/>
+    <p:sldId id="260" r:id="rId8"/>
+    <p:sldId id="261" r:id="rId9"/>
   </p:sldIdLst>
   <p:sldSz cx="12192000" cy="6858000"/>
   <p:notesSz cx="6858000" cy="9144000"/>
@@ -109,7 +111,3055 @@
       </a:defRPr>
     </a:lvl9pPr>
   </p:defaultTextStyle>
+  <p:extLst>
+    <p:ext uri="{EFAFB233-063F-42B5-8137-9DF3F51BA10A}">
+      <p15:sldGuideLst xmlns:p15="http://schemas.microsoft.com/office/powerpoint/2012/main"/>
+    </p:ext>
+  </p:extLst>
 </p:presentation>
+</file>
+
+<file path=ppt/diagrams/colors1.xml><?xml version="1.0" encoding="utf-8"?>
+<dgm:colorsDef xmlns:dgm="http://schemas.openxmlformats.org/drawingml/2006/diagram" xmlns:a="http://schemas.openxmlformats.org/drawingml/2006/main" uniqueId="urn:microsoft.com/office/officeart/2018/5/colors/Iconchunking_neutralbg_colorful1">
+  <dgm:title val=""/>
+  <dgm:desc val=""/>
+  <dgm:catLst>
+    <dgm:cat type="colorful" pri="10100"/>
+  </dgm:catLst>
+  <dgm:styleLbl name="node0">
+    <dgm:fillClrLst meth="repeat">
+      <a:schemeClr val="accent1"/>
+    </dgm:fillClrLst>
+    <dgm:linClrLst meth="repeat">
+      <a:schemeClr val="lt1"/>
+    </dgm:linClrLst>
+    <dgm:effectClrLst/>
+    <dgm:txLinClrLst/>
+    <dgm:txFillClrLst/>
+    <dgm:txEffectClrLst/>
+  </dgm:styleLbl>
+  <dgm:styleLbl name="node1">
+    <dgm:fillClrLst meth="repeat">
+      <a:schemeClr val="accent2"/>
+      <a:schemeClr val="accent3"/>
+      <a:schemeClr val="accent4"/>
+      <a:schemeClr val="accent5"/>
+      <a:schemeClr val="accent6"/>
+    </dgm:fillClrLst>
+    <dgm:linClrLst meth="repeat">
+      <a:schemeClr val="lt1">
+        <a:alpha val="0"/>
+      </a:schemeClr>
+    </dgm:linClrLst>
+    <dgm:effectClrLst/>
+    <dgm:txLinClrLst/>
+    <dgm:txFillClrLst/>
+    <dgm:txEffectClrLst/>
+  </dgm:styleLbl>
+  <dgm:styleLbl name="alignNode1">
+    <dgm:fillClrLst meth="repeat">
+      <a:schemeClr val="accent2"/>
+      <a:schemeClr val="accent3"/>
+      <a:schemeClr val="accent4"/>
+      <a:schemeClr val="accent5"/>
+      <a:schemeClr val="accent6"/>
+    </dgm:fillClrLst>
+    <dgm:linClrLst meth="repeat">
+      <a:schemeClr val="accent2"/>
+      <a:schemeClr val="accent3"/>
+      <a:schemeClr val="accent4"/>
+      <a:schemeClr val="accent5"/>
+      <a:schemeClr val="accent6"/>
+    </dgm:linClrLst>
+    <dgm:effectClrLst/>
+    <dgm:txLinClrLst/>
+    <dgm:txFillClrLst/>
+    <dgm:txEffectClrLst/>
+  </dgm:styleLbl>
+  <dgm:styleLbl name="lnNode1">
+    <dgm:fillClrLst meth="repeat">
+      <a:schemeClr val="accent2"/>
+      <a:schemeClr val="accent3"/>
+      <a:schemeClr val="accent4"/>
+      <a:schemeClr val="accent5"/>
+      <a:schemeClr val="accent6"/>
+    </dgm:fillClrLst>
+    <dgm:linClrLst meth="repeat">
+      <a:schemeClr val="lt1"/>
+    </dgm:linClrLst>
+    <dgm:effectClrLst/>
+    <dgm:txLinClrLst/>
+    <dgm:txFillClrLst/>
+    <dgm:txEffectClrLst/>
+  </dgm:styleLbl>
+  <dgm:styleLbl name="vennNode1">
+    <dgm:fillClrLst meth="repeat">
+      <a:schemeClr val="accent2">
+        <a:alpha val="50000"/>
+      </a:schemeClr>
+      <a:schemeClr val="accent3">
+        <a:alpha val="50000"/>
+      </a:schemeClr>
+      <a:schemeClr val="accent4">
+        <a:alpha val="50000"/>
+      </a:schemeClr>
+      <a:schemeClr val="accent5">
+        <a:alpha val="50000"/>
+      </a:schemeClr>
+      <a:schemeClr val="accent6">
+        <a:alpha val="50000"/>
+      </a:schemeClr>
+    </dgm:fillClrLst>
+    <dgm:linClrLst meth="repeat">
+      <a:schemeClr val="lt1"/>
+    </dgm:linClrLst>
+    <dgm:effectClrLst/>
+    <dgm:txLinClrLst/>
+    <dgm:txFillClrLst/>
+    <dgm:txEffectClrLst/>
+  </dgm:styleLbl>
+  <dgm:styleLbl name="node2">
+    <dgm:fillClrLst>
+      <a:schemeClr val="accent2"/>
+    </dgm:fillClrLst>
+    <dgm:linClrLst meth="repeat">
+      <a:schemeClr val="lt1"/>
+    </dgm:linClrLst>
+    <dgm:effectClrLst/>
+    <dgm:txLinClrLst/>
+    <dgm:txFillClrLst/>
+    <dgm:txEffectClrLst/>
+  </dgm:styleLbl>
+  <dgm:styleLbl name="node3">
+    <dgm:fillClrLst>
+      <a:schemeClr val="accent3"/>
+    </dgm:fillClrLst>
+    <dgm:linClrLst meth="repeat">
+      <a:schemeClr val="lt1"/>
+    </dgm:linClrLst>
+    <dgm:effectClrLst/>
+    <dgm:txLinClrLst/>
+    <dgm:txFillClrLst/>
+    <dgm:txEffectClrLst/>
+  </dgm:styleLbl>
+  <dgm:styleLbl name="node4">
+    <dgm:fillClrLst>
+      <a:schemeClr val="accent4"/>
+    </dgm:fillClrLst>
+    <dgm:linClrLst meth="repeat">
+      <a:schemeClr val="lt1"/>
+    </dgm:linClrLst>
+    <dgm:effectClrLst/>
+    <dgm:txLinClrLst/>
+    <dgm:txFillClrLst/>
+    <dgm:txEffectClrLst/>
+  </dgm:styleLbl>
+  <dgm:styleLbl name="fgImgPlace1">
+    <dgm:fillClrLst meth="repeat">
+      <a:schemeClr val="accent2">
+        <a:tint val="50000"/>
+      </a:schemeClr>
+      <a:schemeClr val="accent3">
+        <a:tint val="50000"/>
+      </a:schemeClr>
+      <a:schemeClr val="accent4">
+        <a:tint val="50000"/>
+      </a:schemeClr>
+      <a:schemeClr val="accent5">
+        <a:tint val="50000"/>
+      </a:schemeClr>
+      <a:schemeClr val="accent6">
+        <a:tint val="50000"/>
+      </a:schemeClr>
+    </dgm:fillClrLst>
+    <dgm:linClrLst meth="repeat">
+      <a:schemeClr val="lt1"/>
+    </dgm:linClrLst>
+    <dgm:effectClrLst/>
+    <dgm:txLinClrLst/>
+    <dgm:txFillClrLst meth="repeat">
+      <a:schemeClr val="lt1"/>
+    </dgm:txFillClrLst>
+    <dgm:txEffectClrLst/>
+  </dgm:styleLbl>
+  <dgm:styleLbl name="alignImgPlace1">
+    <dgm:fillClrLst>
+      <a:schemeClr val="accent1">
+        <a:tint val="50000"/>
+      </a:schemeClr>
+      <a:schemeClr val="accent2">
+        <a:tint val="20000"/>
+      </a:schemeClr>
+    </dgm:fillClrLst>
+    <dgm:linClrLst meth="repeat">
+      <a:schemeClr val="lt1"/>
+    </dgm:linClrLst>
+    <dgm:effectClrLst/>
+    <dgm:txLinClrLst/>
+    <dgm:txFillClrLst meth="repeat">
+      <a:schemeClr val="lt1"/>
+    </dgm:txFillClrLst>
+    <dgm:txEffectClrLst/>
+  </dgm:styleLbl>
+  <dgm:styleLbl name="bgImgPlace1">
+    <dgm:fillClrLst>
+      <a:schemeClr val="accent1">
+        <a:tint val="50000"/>
+      </a:schemeClr>
+      <a:schemeClr val="accent2">
+        <a:tint val="20000"/>
+      </a:schemeClr>
+    </dgm:fillClrLst>
+    <dgm:linClrLst meth="repeat">
+      <a:schemeClr val="lt1"/>
+    </dgm:linClrLst>
+    <dgm:effectClrLst/>
+    <dgm:txLinClrLst/>
+    <dgm:txFillClrLst meth="repeat">
+      <a:schemeClr val="lt1"/>
+    </dgm:txFillClrLst>
+    <dgm:txEffectClrLst/>
+  </dgm:styleLbl>
+  <dgm:styleLbl name="sibTrans2D1">
+    <dgm:fillClrLst meth="repeat">
+      <a:schemeClr val="accent2"/>
+      <a:schemeClr val="accent3"/>
+      <a:schemeClr val="accent4"/>
+      <a:schemeClr val="accent5"/>
+      <a:schemeClr val="accent6"/>
+    </dgm:fillClrLst>
+    <dgm:linClrLst meth="cycle">
+      <a:schemeClr val="lt1"/>
+    </dgm:linClrLst>
+    <dgm:effectClrLst/>
+    <dgm:txLinClrLst/>
+    <dgm:txFillClrLst/>
+    <dgm:txEffectClrLst/>
+  </dgm:styleLbl>
+  <dgm:styleLbl name="fgSibTrans2D1">
+    <dgm:fillClrLst meth="repeat">
+      <a:schemeClr val="accent2"/>
+      <a:schemeClr val="accent3"/>
+      <a:schemeClr val="accent4"/>
+      <a:schemeClr val="accent5"/>
+      <a:schemeClr val="accent6"/>
+    </dgm:fillClrLst>
+    <dgm:linClrLst meth="cycle">
+      <a:schemeClr val="lt1"/>
+    </dgm:linClrLst>
+    <dgm:effectClrLst/>
+    <dgm:txLinClrLst/>
+    <dgm:txFillClrLst meth="repeat">
+      <a:schemeClr val="lt1"/>
+    </dgm:txFillClrLst>
+    <dgm:txEffectClrLst/>
+  </dgm:styleLbl>
+  <dgm:styleLbl name="bgSibTrans2D1">
+    <dgm:fillClrLst meth="repeat">
+      <a:schemeClr val="accent2"/>
+      <a:schemeClr val="accent3"/>
+      <a:schemeClr val="accent4"/>
+      <a:schemeClr val="accent5"/>
+      <a:schemeClr val="accent6"/>
+    </dgm:fillClrLst>
+    <dgm:linClrLst meth="cycle">
+      <a:schemeClr val="lt1"/>
+    </dgm:linClrLst>
+    <dgm:effectClrLst/>
+    <dgm:txLinClrLst/>
+    <dgm:txFillClrLst meth="repeat">
+      <a:schemeClr val="lt1"/>
+    </dgm:txFillClrLst>
+    <dgm:txEffectClrLst/>
+  </dgm:styleLbl>
+  <dgm:styleLbl name="sibTrans1D1">
+    <dgm:fillClrLst meth="repeat">
+      <a:schemeClr val="accent2"/>
+      <a:schemeClr val="accent3"/>
+      <a:schemeClr val="accent4"/>
+      <a:schemeClr val="accent5"/>
+      <a:schemeClr val="accent6"/>
+    </dgm:fillClrLst>
+    <dgm:linClrLst meth="repeat">
+      <a:schemeClr val="accent2"/>
+      <a:schemeClr val="accent3"/>
+      <a:schemeClr val="accent4"/>
+      <a:schemeClr val="accent5"/>
+      <a:schemeClr val="accent6"/>
+    </dgm:linClrLst>
+    <dgm:effectClrLst/>
+    <dgm:txLinClrLst/>
+    <dgm:txFillClrLst meth="repeat">
+      <a:schemeClr val="tx1"/>
+    </dgm:txFillClrLst>
+    <dgm:txEffectClrLst/>
+  </dgm:styleLbl>
+  <dgm:styleLbl name="callout">
+    <dgm:fillClrLst meth="repeat">
+      <a:schemeClr val="accent2"/>
+    </dgm:fillClrLst>
+    <dgm:linClrLst meth="repeat">
+      <a:schemeClr val="accent2">
+        <a:tint val="50000"/>
+      </a:schemeClr>
+    </dgm:linClrLst>
+    <dgm:effectClrLst/>
+    <dgm:txLinClrLst/>
+    <dgm:txFillClrLst meth="repeat">
+      <a:schemeClr val="tx1"/>
+    </dgm:txFillClrLst>
+    <dgm:txEffectClrLst/>
+  </dgm:styleLbl>
+  <dgm:styleLbl name="asst0">
+    <dgm:fillClrLst meth="repeat">
+      <a:schemeClr val="accent1"/>
+    </dgm:fillClrLst>
+    <dgm:linClrLst meth="repeat">
+      <a:schemeClr val="lt1"/>
+    </dgm:linClrLst>
+    <dgm:effectClrLst/>
+    <dgm:txLinClrLst/>
+    <dgm:txFillClrLst/>
+    <dgm:txEffectClrLst/>
+  </dgm:styleLbl>
+  <dgm:styleLbl name="asst1">
+    <dgm:fillClrLst meth="repeat">
+      <a:schemeClr val="accent2"/>
+    </dgm:fillClrLst>
+    <dgm:linClrLst meth="repeat">
+      <a:schemeClr val="lt1"/>
+    </dgm:linClrLst>
+    <dgm:effectClrLst/>
+    <dgm:txLinClrLst/>
+    <dgm:txFillClrLst/>
+    <dgm:txEffectClrLst/>
+  </dgm:styleLbl>
+  <dgm:styleLbl name="asst2">
+    <dgm:fillClrLst>
+      <a:schemeClr val="accent3"/>
+    </dgm:fillClrLst>
+    <dgm:linClrLst meth="repeat">
+      <a:schemeClr val="lt1"/>
+    </dgm:linClrLst>
+    <dgm:effectClrLst/>
+    <dgm:txLinClrLst/>
+    <dgm:txFillClrLst/>
+    <dgm:txEffectClrLst/>
+  </dgm:styleLbl>
+  <dgm:styleLbl name="asst3">
+    <dgm:fillClrLst>
+      <a:schemeClr val="accent4"/>
+    </dgm:fillClrLst>
+    <dgm:linClrLst meth="repeat">
+      <a:schemeClr val="lt1"/>
+    </dgm:linClrLst>
+    <dgm:effectClrLst/>
+    <dgm:txLinClrLst/>
+    <dgm:txFillClrLst/>
+    <dgm:txEffectClrLst/>
+  </dgm:styleLbl>
+  <dgm:styleLbl name="asst4">
+    <dgm:fillClrLst>
+      <a:schemeClr val="accent5"/>
+    </dgm:fillClrLst>
+    <dgm:linClrLst meth="repeat">
+      <a:schemeClr val="lt1"/>
+    </dgm:linClrLst>
+    <dgm:effectClrLst/>
+    <dgm:txLinClrLst/>
+    <dgm:txFillClrLst/>
+    <dgm:txEffectClrLst/>
+  </dgm:styleLbl>
+  <dgm:styleLbl name="parChTrans2D1">
+    <dgm:fillClrLst meth="repeat">
+      <a:schemeClr val="accent2"/>
+    </dgm:fillClrLst>
+    <dgm:linClrLst meth="repeat">
+      <a:schemeClr val="lt1"/>
+    </dgm:linClrLst>
+    <dgm:effectClrLst/>
+    <dgm:txLinClrLst/>
+    <dgm:txFillClrLst meth="repeat">
+      <a:schemeClr val="lt1"/>
+    </dgm:txFillClrLst>
+    <dgm:txEffectClrLst/>
+  </dgm:styleLbl>
+  <dgm:styleLbl name="parChTrans2D2">
+    <dgm:fillClrLst meth="repeat">
+      <a:schemeClr val="accent3"/>
+    </dgm:fillClrLst>
+    <dgm:linClrLst meth="repeat">
+      <a:schemeClr val="lt1"/>
+    </dgm:linClrLst>
+    <dgm:effectClrLst/>
+    <dgm:txLinClrLst/>
+    <dgm:txFillClrLst/>
+    <dgm:txEffectClrLst/>
+  </dgm:styleLbl>
+  <dgm:styleLbl name="parChTrans2D3">
+    <dgm:fillClrLst meth="repeat">
+      <a:schemeClr val="accent4"/>
+    </dgm:fillClrLst>
+    <dgm:linClrLst meth="repeat">
+      <a:schemeClr val="lt1"/>
+    </dgm:linClrLst>
+    <dgm:effectClrLst/>
+    <dgm:txLinClrLst/>
+    <dgm:txFillClrLst/>
+    <dgm:txEffectClrLst/>
+  </dgm:styleLbl>
+  <dgm:styleLbl name="parChTrans2D4">
+    <dgm:fillClrLst meth="repeat">
+      <a:schemeClr val="accent5"/>
+    </dgm:fillClrLst>
+    <dgm:linClrLst meth="repeat">
+      <a:schemeClr val="lt1"/>
+    </dgm:linClrLst>
+    <dgm:effectClrLst/>
+    <dgm:txLinClrLst/>
+    <dgm:txFillClrLst meth="repeat">
+      <a:schemeClr val="lt1"/>
+    </dgm:txFillClrLst>
+    <dgm:txEffectClrLst/>
+  </dgm:styleLbl>
+  <dgm:styleLbl name="parChTrans1D1">
+    <dgm:fillClrLst meth="repeat">
+      <a:schemeClr val="accent2"/>
+    </dgm:fillClrLst>
+    <dgm:linClrLst meth="repeat">
+      <a:schemeClr val="accent1"/>
+    </dgm:linClrLst>
+    <dgm:effectClrLst/>
+    <dgm:txLinClrLst/>
+    <dgm:txFillClrLst meth="repeat">
+      <a:schemeClr val="tx1"/>
+    </dgm:txFillClrLst>
+    <dgm:txEffectClrLst/>
+  </dgm:styleLbl>
+  <dgm:styleLbl name="parChTrans1D2">
+    <dgm:fillClrLst meth="repeat">
+      <a:schemeClr val="accent3">
+        <a:tint val="90000"/>
+      </a:schemeClr>
+    </dgm:fillClrLst>
+    <dgm:linClrLst meth="repeat">
+      <a:schemeClr val="accent2"/>
+    </dgm:linClrLst>
+    <dgm:effectClrLst/>
+    <dgm:txLinClrLst/>
+    <dgm:txFillClrLst meth="repeat">
+      <a:schemeClr val="tx1"/>
+    </dgm:txFillClrLst>
+    <dgm:txEffectClrLst/>
+  </dgm:styleLbl>
+  <dgm:styleLbl name="parChTrans1D3">
+    <dgm:fillClrLst meth="repeat">
+      <a:schemeClr val="accent4">
+        <a:tint val="70000"/>
+      </a:schemeClr>
+    </dgm:fillClrLst>
+    <dgm:linClrLst meth="repeat">
+      <a:schemeClr val="accent3"/>
+    </dgm:linClrLst>
+    <dgm:effectClrLst/>
+    <dgm:txLinClrLst/>
+    <dgm:txFillClrLst meth="repeat">
+      <a:schemeClr val="tx1"/>
+    </dgm:txFillClrLst>
+    <dgm:txEffectClrLst/>
+  </dgm:styleLbl>
+  <dgm:styleLbl name="parChTrans1D4">
+    <dgm:fillClrLst meth="repeat">
+      <a:schemeClr val="accent5">
+        <a:tint val="50000"/>
+      </a:schemeClr>
+    </dgm:fillClrLst>
+    <dgm:linClrLst meth="repeat">
+      <a:schemeClr val="accent4"/>
+    </dgm:linClrLst>
+    <dgm:effectClrLst/>
+    <dgm:txLinClrLst/>
+    <dgm:txFillClrLst meth="repeat">
+      <a:schemeClr val="tx1"/>
+    </dgm:txFillClrLst>
+    <dgm:txEffectClrLst/>
+  </dgm:styleLbl>
+  <dgm:styleLbl name="fgAcc1">
+    <dgm:fillClrLst meth="repeat">
+      <a:schemeClr val="lt1">
+        <a:alpha val="90000"/>
+      </a:schemeClr>
+    </dgm:fillClrLst>
+    <dgm:linClrLst meth="repeat">
+      <a:schemeClr val="accent2"/>
+      <a:schemeClr val="accent3"/>
+      <a:schemeClr val="accent4"/>
+      <a:schemeClr val="accent5"/>
+      <a:schemeClr val="accent6"/>
+    </dgm:linClrLst>
+    <dgm:effectClrLst/>
+    <dgm:txLinClrLst/>
+    <dgm:txFillClrLst meth="repeat">
+      <a:schemeClr val="dk1"/>
+    </dgm:txFillClrLst>
+    <dgm:txEffectClrLst/>
+  </dgm:styleLbl>
+  <dgm:styleLbl name="conFgAcc1">
+    <dgm:fillClrLst meth="repeat">
+      <a:schemeClr val="lt1">
+        <a:alpha val="90000"/>
+      </a:schemeClr>
+    </dgm:fillClrLst>
+    <dgm:linClrLst meth="repeat">
+      <a:schemeClr val="accent2"/>
+      <a:schemeClr val="accent3"/>
+      <a:schemeClr val="accent4"/>
+      <a:schemeClr val="accent5"/>
+      <a:schemeClr val="accent6"/>
+    </dgm:linClrLst>
+    <dgm:effectClrLst/>
+    <dgm:txLinClrLst/>
+    <dgm:txFillClrLst meth="repeat">
+      <a:schemeClr val="dk1"/>
+    </dgm:txFillClrLst>
+    <dgm:txEffectClrLst/>
+  </dgm:styleLbl>
+  <dgm:styleLbl name="alignAcc1">
+    <dgm:fillClrLst meth="repeat">
+      <a:schemeClr val="lt1">
+        <a:alpha val="90000"/>
+      </a:schemeClr>
+    </dgm:fillClrLst>
+    <dgm:linClrLst meth="repeat">
+      <a:schemeClr val="accent2"/>
+      <a:schemeClr val="accent3"/>
+      <a:schemeClr val="accent4"/>
+      <a:schemeClr val="accent5"/>
+      <a:schemeClr val="accent6"/>
+    </dgm:linClrLst>
+    <dgm:effectClrLst/>
+    <dgm:txLinClrLst/>
+    <dgm:txFillClrLst meth="repeat">
+      <a:schemeClr val="dk1"/>
+    </dgm:txFillClrLst>
+    <dgm:txEffectClrLst/>
+  </dgm:styleLbl>
+  <dgm:styleLbl name="trAlignAcc1">
+    <dgm:fillClrLst meth="repeat">
+      <a:schemeClr val="lt1">
+        <a:alpha val="40000"/>
+      </a:schemeClr>
+    </dgm:fillClrLst>
+    <dgm:linClrLst meth="repeat">
+      <a:schemeClr val="accent1"/>
+    </dgm:linClrLst>
+    <dgm:effectClrLst/>
+    <dgm:txLinClrLst/>
+    <dgm:txFillClrLst meth="repeat">
+      <a:schemeClr val="dk1"/>
+    </dgm:txFillClrLst>
+    <dgm:txEffectClrLst/>
+  </dgm:styleLbl>
+  <dgm:styleLbl name="bgAcc1">
+    <dgm:fillClrLst meth="repeat">
+      <a:schemeClr val="lt1">
+        <a:alpha val="90000"/>
+      </a:schemeClr>
+    </dgm:fillClrLst>
+    <dgm:linClrLst meth="repeat">
+      <a:schemeClr val="accent2"/>
+      <a:schemeClr val="accent3"/>
+      <a:schemeClr val="accent4"/>
+      <a:schemeClr val="accent5"/>
+      <a:schemeClr val="accent6"/>
+    </dgm:linClrLst>
+    <dgm:effectClrLst/>
+    <dgm:txLinClrLst/>
+    <dgm:txFillClrLst meth="repeat">
+      <a:schemeClr val="dk1"/>
+    </dgm:txFillClrLst>
+    <dgm:txEffectClrLst/>
+  </dgm:styleLbl>
+  <dgm:styleLbl name="solidFgAcc1">
+    <dgm:fillClrLst meth="repeat">
+      <a:schemeClr val="lt1"/>
+    </dgm:fillClrLst>
+    <dgm:linClrLst meth="repeat">
+      <a:schemeClr val="accent2"/>
+      <a:schemeClr val="accent3"/>
+      <a:schemeClr val="accent4"/>
+      <a:schemeClr val="accent5"/>
+      <a:schemeClr val="accent6"/>
+    </dgm:linClrLst>
+    <dgm:effectClrLst/>
+    <dgm:txLinClrLst/>
+    <dgm:txFillClrLst meth="repeat">
+      <a:schemeClr val="dk1"/>
+    </dgm:txFillClrLst>
+    <dgm:txEffectClrLst/>
+  </dgm:styleLbl>
+  <dgm:styleLbl name="solidAlignAcc1">
+    <dgm:fillClrLst meth="repeat">
+      <a:schemeClr val="lt1"/>
+    </dgm:fillClrLst>
+    <dgm:linClrLst meth="repeat">
+      <a:schemeClr val="accent2"/>
+      <a:schemeClr val="accent3"/>
+      <a:schemeClr val="accent4"/>
+      <a:schemeClr val="accent5"/>
+      <a:schemeClr val="accent6"/>
+    </dgm:linClrLst>
+    <dgm:effectClrLst/>
+    <dgm:txLinClrLst/>
+    <dgm:txFillClrLst meth="repeat">
+      <a:schemeClr val="dk1"/>
+    </dgm:txFillClrLst>
+    <dgm:txEffectClrLst/>
+  </dgm:styleLbl>
+  <dgm:styleLbl name="solidBgAcc1">
+    <dgm:fillClrLst meth="repeat">
+      <a:schemeClr val="lt1"/>
+    </dgm:fillClrLst>
+    <dgm:linClrLst meth="repeat">
+      <a:schemeClr val="accent2"/>
+      <a:schemeClr val="accent3"/>
+      <a:schemeClr val="accent4"/>
+      <a:schemeClr val="accent5"/>
+      <a:schemeClr val="accent6"/>
+    </dgm:linClrLst>
+    <dgm:effectClrLst/>
+    <dgm:txLinClrLst/>
+    <dgm:txFillClrLst meth="repeat">
+      <a:schemeClr val="dk1"/>
+    </dgm:txFillClrLst>
+    <dgm:txEffectClrLst/>
+  </dgm:styleLbl>
+  <dgm:styleLbl name="fgAccFollowNode1">
+    <dgm:fillClrLst meth="repeat">
+      <a:schemeClr val="accent2">
+        <a:tint val="40000"/>
+        <a:alpha val="90000"/>
+      </a:schemeClr>
+      <a:schemeClr val="accent3">
+        <a:tint val="40000"/>
+        <a:alpha val="90000"/>
+      </a:schemeClr>
+      <a:schemeClr val="accent4">
+        <a:tint val="40000"/>
+        <a:alpha val="90000"/>
+      </a:schemeClr>
+      <a:schemeClr val="accent5">
+        <a:tint val="40000"/>
+        <a:alpha val="90000"/>
+      </a:schemeClr>
+      <a:schemeClr val="accent6">
+        <a:tint val="40000"/>
+        <a:alpha val="90000"/>
+      </a:schemeClr>
+    </dgm:fillClrLst>
+    <dgm:linClrLst meth="repeat">
+      <a:schemeClr val="accent2">
+        <a:tint val="40000"/>
+        <a:alpha val="90000"/>
+      </a:schemeClr>
+      <a:schemeClr val="accent3">
+        <a:tint val="40000"/>
+        <a:alpha val="90000"/>
+      </a:schemeClr>
+      <a:schemeClr val="accent4">
+        <a:tint val="40000"/>
+        <a:alpha val="90000"/>
+      </a:schemeClr>
+      <a:schemeClr val="accent5">
+        <a:tint val="40000"/>
+        <a:alpha val="90000"/>
+      </a:schemeClr>
+      <a:schemeClr val="accent6">
+        <a:tint val="40000"/>
+        <a:alpha val="90000"/>
+      </a:schemeClr>
+    </dgm:linClrLst>
+    <dgm:effectClrLst/>
+    <dgm:txLinClrLst/>
+    <dgm:txFillClrLst meth="repeat">
+      <a:schemeClr val="dk1"/>
+    </dgm:txFillClrLst>
+    <dgm:txEffectClrLst/>
+  </dgm:styleLbl>
+  <dgm:styleLbl name="alignAccFollowNode1">
+    <dgm:fillClrLst meth="repeat">
+      <a:schemeClr val="accent2">
+        <a:tint val="40000"/>
+        <a:alpha val="90000"/>
+      </a:schemeClr>
+      <a:schemeClr val="accent3">
+        <a:tint val="40000"/>
+        <a:alpha val="90000"/>
+      </a:schemeClr>
+      <a:schemeClr val="accent4">
+        <a:tint val="40000"/>
+        <a:alpha val="90000"/>
+      </a:schemeClr>
+      <a:schemeClr val="accent5">
+        <a:tint val="40000"/>
+        <a:alpha val="90000"/>
+      </a:schemeClr>
+      <a:schemeClr val="accent6">
+        <a:tint val="40000"/>
+        <a:alpha val="90000"/>
+      </a:schemeClr>
+    </dgm:fillClrLst>
+    <dgm:linClrLst meth="repeat">
+      <a:schemeClr val="accent2">
+        <a:tint val="40000"/>
+        <a:alpha val="90000"/>
+      </a:schemeClr>
+      <a:schemeClr val="accent3">
+        <a:tint val="40000"/>
+        <a:alpha val="90000"/>
+      </a:schemeClr>
+      <a:schemeClr val="accent4">
+        <a:tint val="40000"/>
+        <a:alpha val="90000"/>
+      </a:schemeClr>
+      <a:schemeClr val="accent5">
+        <a:tint val="40000"/>
+        <a:alpha val="90000"/>
+      </a:schemeClr>
+      <a:schemeClr val="accent6">
+        <a:tint val="40000"/>
+        <a:alpha val="90000"/>
+      </a:schemeClr>
+    </dgm:linClrLst>
+    <dgm:effectClrLst/>
+    <dgm:txLinClrLst/>
+    <dgm:txFillClrLst meth="repeat">
+      <a:schemeClr val="dk1"/>
+    </dgm:txFillClrLst>
+    <dgm:txEffectClrLst/>
+  </dgm:styleLbl>
+  <dgm:styleLbl name="bgAccFollowNode1">
+    <dgm:fillClrLst meth="repeat">
+      <a:schemeClr val="accent2">
+        <a:tint val="40000"/>
+        <a:alpha val="90000"/>
+      </a:schemeClr>
+      <a:schemeClr val="accent3">
+        <a:tint val="40000"/>
+        <a:alpha val="90000"/>
+      </a:schemeClr>
+      <a:schemeClr val="accent4">
+        <a:tint val="40000"/>
+        <a:alpha val="90000"/>
+      </a:schemeClr>
+      <a:schemeClr val="accent5">
+        <a:tint val="40000"/>
+        <a:alpha val="90000"/>
+      </a:schemeClr>
+      <a:schemeClr val="accent6">
+        <a:tint val="40000"/>
+        <a:alpha val="90000"/>
+      </a:schemeClr>
+    </dgm:fillClrLst>
+    <dgm:linClrLst meth="repeat">
+      <a:schemeClr val="accent2">
+        <a:tint val="40000"/>
+        <a:alpha val="90000"/>
+      </a:schemeClr>
+      <a:schemeClr val="accent3">
+        <a:tint val="40000"/>
+        <a:alpha val="90000"/>
+      </a:schemeClr>
+      <a:schemeClr val="accent4">
+        <a:tint val="40000"/>
+        <a:alpha val="90000"/>
+      </a:schemeClr>
+      <a:schemeClr val="accent5">
+        <a:tint val="40000"/>
+        <a:alpha val="90000"/>
+      </a:schemeClr>
+      <a:schemeClr val="accent6">
+        <a:tint val="40000"/>
+        <a:alpha val="90000"/>
+      </a:schemeClr>
+    </dgm:linClrLst>
+    <dgm:effectClrLst/>
+    <dgm:txLinClrLst/>
+    <dgm:txFillClrLst meth="repeat">
+      <a:schemeClr val="dk1"/>
+    </dgm:txFillClrLst>
+    <dgm:txEffectClrLst/>
+  </dgm:styleLbl>
+  <dgm:styleLbl name="fgAcc0">
+    <dgm:fillClrLst meth="repeat">
+      <a:schemeClr val="lt1">
+        <a:alpha val="90000"/>
+      </a:schemeClr>
+    </dgm:fillClrLst>
+    <dgm:linClrLst>
+      <a:schemeClr val="accent1"/>
+    </dgm:linClrLst>
+    <dgm:effectClrLst/>
+    <dgm:txLinClrLst/>
+    <dgm:txFillClrLst meth="repeat">
+      <a:schemeClr val="dk1"/>
+    </dgm:txFillClrLst>
+    <dgm:txEffectClrLst/>
+  </dgm:styleLbl>
+  <dgm:styleLbl name="fgAcc2">
+    <dgm:fillClrLst meth="repeat">
+      <a:schemeClr val="lt1">
+        <a:alpha val="90000"/>
+      </a:schemeClr>
+    </dgm:fillClrLst>
+    <dgm:linClrLst>
+      <a:schemeClr val="accent2"/>
+    </dgm:linClrLst>
+    <dgm:effectClrLst/>
+    <dgm:txLinClrLst/>
+    <dgm:txFillClrLst meth="repeat">
+      <a:schemeClr val="dk1"/>
+    </dgm:txFillClrLst>
+    <dgm:txEffectClrLst/>
+  </dgm:styleLbl>
+  <dgm:styleLbl name="fgAcc3">
+    <dgm:fillClrLst meth="repeat">
+      <a:schemeClr val="lt1">
+        <a:alpha val="90000"/>
+      </a:schemeClr>
+    </dgm:fillClrLst>
+    <dgm:linClrLst>
+      <a:schemeClr val="accent3"/>
+    </dgm:linClrLst>
+    <dgm:effectClrLst/>
+    <dgm:txLinClrLst/>
+    <dgm:txFillClrLst meth="repeat">
+      <a:schemeClr val="dk1"/>
+    </dgm:txFillClrLst>
+    <dgm:txEffectClrLst/>
+  </dgm:styleLbl>
+  <dgm:styleLbl name="fgAcc4">
+    <dgm:fillClrLst meth="repeat">
+      <a:schemeClr val="lt1">
+        <a:alpha val="90000"/>
+      </a:schemeClr>
+    </dgm:fillClrLst>
+    <dgm:linClrLst>
+      <a:schemeClr val="accent4"/>
+    </dgm:linClrLst>
+    <dgm:effectClrLst/>
+    <dgm:txLinClrLst/>
+    <dgm:txFillClrLst meth="repeat">
+      <a:schemeClr val="dk1"/>
+    </dgm:txFillClrLst>
+    <dgm:txEffectClrLst/>
+  </dgm:styleLbl>
+  <dgm:styleLbl name="bgShp">
+    <dgm:fillClrLst meth="repeat">
+      <a:schemeClr val="bg1">
+        <a:lumMod val="95000"/>
+      </a:schemeClr>
+    </dgm:fillClrLst>
+    <dgm:linClrLst meth="repeat">
+      <a:schemeClr val="dk1"/>
+    </dgm:linClrLst>
+    <dgm:effectClrLst/>
+    <dgm:txLinClrLst/>
+    <dgm:txFillClrLst meth="repeat">
+      <a:schemeClr val="dk1"/>
+    </dgm:txFillClrLst>
+    <dgm:txEffectClrLst/>
+  </dgm:styleLbl>
+  <dgm:styleLbl name="dkBgShp">
+    <dgm:fillClrLst meth="repeat">
+      <a:schemeClr val="accent2">
+        <a:shade val="90000"/>
+      </a:schemeClr>
+    </dgm:fillClrLst>
+    <dgm:linClrLst meth="repeat">
+      <a:schemeClr val="dk1"/>
+    </dgm:linClrLst>
+    <dgm:effectClrLst/>
+    <dgm:txLinClrLst/>
+    <dgm:txFillClrLst meth="repeat">
+      <a:schemeClr val="lt1"/>
+    </dgm:txFillClrLst>
+    <dgm:txEffectClrLst/>
+  </dgm:styleLbl>
+  <dgm:styleLbl name="trBgShp">
+    <dgm:fillClrLst meth="repeat">
+      <a:schemeClr val="accent1">
+        <a:tint val="50000"/>
+        <a:alpha val="40000"/>
+      </a:schemeClr>
+    </dgm:fillClrLst>
+    <dgm:linClrLst meth="repeat">
+      <a:schemeClr val="accent2"/>
+    </dgm:linClrLst>
+    <dgm:effectClrLst/>
+    <dgm:txLinClrLst/>
+    <dgm:txFillClrLst meth="repeat">
+      <a:schemeClr val="lt1"/>
+    </dgm:txFillClrLst>
+    <dgm:txEffectClrLst/>
+  </dgm:styleLbl>
+  <dgm:styleLbl name="fgShp">
+    <dgm:fillClrLst meth="repeat">
+      <a:schemeClr val="accent2">
+        <a:tint val="40000"/>
+      </a:schemeClr>
+    </dgm:fillClrLst>
+    <dgm:linClrLst meth="repeat">
+      <a:schemeClr val="lt1"/>
+    </dgm:linClrLst>
+    <dgm:effectClrLst/>
+    <dgm:txLinClrLst/>
+    <dgm:txFillClrLst meth="repeat">
+      <a:schemeClr val="dk1"/>
+    </dgm:txFillClrLst>
+    <dgm:txEffectClrLst/>
+  </dgm:styleLbl>
+  <dgm:styleLbl name="revTx">
+    <dgm:fillClrLst meth="repeat">
+      <a:schemeClr val="lt1">
+        <a:alpha val="0"/>
+      </a:schemeClr>
+    </dgm:fillClrLst>
+    <dgm:linClrLst meth="repeat">
+      <a:schemeClr val="dk1">
+        <a:alpha val="0"/>
+      </a:schemeClr>
+    </dgm:linClrLst>
+    <dgm:effectClrLst/>
+    <dgm:txLinClrLst/>
+    <dgm:txFillClrLst meth="repeat">
+      <a:schemeClr val="tx1"/>
+    </dgm:txFillClrLst>
+    <dgm:txEffectClrLst/>
+  </dgm:styleLbl>
+</dgm:colorsDef>
+</file>
+
+<file path=ppt/diagrams/data1.xml><?xml version="1.0" encoding="utf-8"?>
+<dgm:dataModel xmlns:dgm="http://schemas.openxmlformats.org/drawingml/2006/diagram" xmlns:a="http://schemas.openxmlformats.org/drawingml/2006/main">
+  <dgm:ptLst>
+    <dgm:pt modelId="{D2A91B7C-41C4-4FBF-AE53-1FE3782C8580}" type="doc">
+      <dgm:prSet loTypeId="urn:microsoft.com/office/officeart/2018/2/layout/IconVerticalSolidList" loCatId="icon" qsTypeId="urn:microsoft.com/office/officeart/2005/8/quickstyle/simple1" qsCatId="simple" csTypeId="urn:microsoft.com/office/officeart/2018/5/colors/Iconchunking_neutralbg_colorful1" csCatId="colorful" phldr="1"/>
+      <dgm:spPr/>
+      <dgm:t>
+        <a:bodyPr/>
+        <a:lstStyle/>
+        <a:p>
+          <a:endParaRPr lang="en-US"/>
+        </a:p>
+      </dgm:t>
+    </dgm:pt>
+    <dgm:pt modelId="{654FA45D-D533-4C34-9406-A595C07F2C4E}">
+      <dgm:prSet/>
+      <dgm:spPr/>
+      <dgm:t>
+        <a:bodyPr/>
+        <a:lstStyle/>
+        <a:p>
+          <a:r>
+            <a:rPr lang="en-ZA"/>
+            <a:t>People struggle to find recipes that are suited to their needs</a:t>
+          </a:r>
+          <a:endParaRPr lang="en-US"/>
+        </a:p>
+      </dgm:t>
+    </dgm:pt>
+    <dgm:pt modelId="{4C53BB95-E0B9-41CB-B6EA-6E83C32541B6}" type="parTrans" cxnId="{6ED35F84-B04E-4286-971E-B1757A0BBC7C}">
+      <dgm:prSet/>
+      <dgm:spPr/>
+      <dgm:t>
+        <a:bodyPr/>
+        <a:lstStyle/>
+        <a:p>
+          <a:endParaRPr lang="en-US"/>
+        </a:p>
+      </dgm:t>
+    </dgm:pt>
+    <dgm:pt modelId="{C88A760E-D114-443C-A9D1-5A17FF9D3F4A}" type="sibTrans" cxnId="{6ED35F84-B04E-4286-971E-B1757A0BBC7C}">
+      <dgm:prSet/>
+      <dgm:spPr/>
+      <dgm:t>
+        <a:bodyPr/>
+        <a:lstStyle/>
+        <a:p>
+          <a:endParaRPr lang="en-US"/>
+        </a:p>
+      </dgm:t>
+    </dgm:pt>
+    <dgm:pt modelId="{F363AC19-D559-4882-99BD-DE71E52D0D98}">
+      <dgm:prSet/>
+      <dgm:spPr/>
+      <dgm:t>
+        <a:bodyPr/>
+        <a:lstStyle/>
+        <a:p>
+          <a:r>
+            <a:rPr lang="en-ZA"/>
+            <a:t>Lack of beginner-friendly recipes</a:t>
+          </a:r>
+          <a:endParaRPr lang="en-US"/>
+        </a:p>
+      </dgm:t>
+    </dgm:pt>
+    <dgm:pt modelId="{365E6119-DA73-4A96-AA9A-CC5687EF1A05}" type="parTrans" cxnId="{4E942D1D-D8AB-4189-A7FC-856EAE749B07}">
+      <dgm:prSet/>
+      <dgm:spPr/>
+      <dgm:t>
+        <a:bodyPr/>
+        <a:lstStyle/>
+        <a:p>
+          <a:endParaRPr lang="en-US"/>
+        </a:p>
+      </dgm:t>
+    </dgm:pt>
+    <dgm:pt modelId="{40F3FE3F-9B13-4D9E-B197-045A48EC91D7}" type="sibTrans" cxnId="{4E942D1D-D8AB-4189-A7FC-856EAE749B07}">
+      <dgm:prSet/>
+      <dgm:spPr/>
+      <dgm:t>
+        <a:bodyPr/>
+        <a:lstStyle/>
+        <a:p>
+          <a:endParaRPr lang="en-US"/>
+        </a:p>
+      </dgm:t>
+    </dgm:pt>
+    <dgm:pt modelId="{5F971BA8-3816-4496-8411-D295B3F59B9B}">
+      <dgm:prSet/>
+      <dgm:spPr/>
+      <dgm:t>
+        <a:bodyPr/>
+        <a:lstStyle/>
+        <a:p>
+          <a:r>
+            <a:rPr lang="en-ZA"/>
+            <a:t>How this affects those who need easy to follow recipes</a:t>
+          </a:r>
+          <a:endParaRPr lang="en-US"/>
+        </a:p>
+      </dgm:t>
+    </dgm:pt>
+    <dgm:pt modelId="{CF5558DB-B30E-4A02-BF9A-ADCE31A782D7}" type="parTrans" cxnId="{A1FBC6AB-087A-4715-B36C-4A28EC13D722}">
+      <dgm:prSet/>
+      <dgm:spPr/>
+      <dgm:t>
+        <a:bodyPr/>
+        <a:lstStyle/>
+        <a:p>
+          <a:endParaRPr lang="en-US"/>
+        </a:p>
+      </dgm:t>
+    </dgm:pt>
+    <dgm:pt modelId="{0A9E8214-7602-4AED-92D2-A9D15AE6F81E}" type="sibTrans" cxnId="{A1FBC6AB-087A-4715-B36C-4A28EC13D722}">
+      <dgm:prSet/>
+      <dgm:spPr/>
+      <dgm:t>
+        <a:bodyPr/>
+        <a:lstStyle/>
+        <a:p>
+          <a:endParaRPr lang="en-US"/>
+        </a:p>
+      </dgm:t>
+    </dgm:pt>
+    <dgm:pt modelId="{0A3E2D78-0F65-44CE-9743-EFCBCEE2A2F3}" type="pres">
+      <dgm:prSet presAssocID="{D2A91B7C-41C4-4FBF-AE53-1FE3782C8580}" presName="root" presStyleCnt="0">
+        <dgm:presLayoutVars>
+          <dgm:dir/>
+          <dgm:resizeHandles val="exact"/>
+        </dgm:presLayoutVars>
+      </dgm:prSet>
+      <dgm:spPr/>
+    </dgm:pt>
+    <dgm:pt modelId="{0C2DA695-170E-423D-953A-D2154A28C1CC}" type="pres">
+      <dgm:prSet presAssocID="{654FA45D-D533-4C34-9406-A595C07F2C4E}" presName="compNode" presStyleCnt="0"/>
+      <dgm:spPr/>
+    </dgm:pt>
+    <dgm:pt modelId="{FBDB4F51-9E86-4D98-9F3F-FFF3E4943C0F}" type="pres">
+      <dgm:prSet presAssocID="{654FA45D-D533-4C34-9406-A595C07F2C4E}" presName="bgRect" presStyleLbl="bgShp" presStyleIdx="0" presStyleCnt="3"/>
+      <dgm:spPr/>
+    </dgm:pt>
+    <dgm:pt modelId="{BAF9EAAB-0FB6-433F-9036-1110CC07E9C7}" type="pres">
+      <dgm:prSet presAssocID="{654FA45D-D533-4C34-9406-A595C07F2C4E}" presName="iconRect" presStyleLbl="node1" presStyleIdx="0" presStyleCnt="3"/>
+      <dgm:spPr>
+        <a:blipFill>
+          <a:blip xmlns:r="http://schemas.openxmlformats.org/officeDocument/2006/relationships" r:embed="rId1">
+            <a:extLst>
+              <a:ext uri="{28A0092B-C50C-407E-A947-70E740481C1C}">
+                <a14:useLocalDpi xmlns:a14="http://schemas.microsoft.com/office/drawing/2010/main" val="0"/>
+              </a:ext>
+              <a:ext uri="{96DAC541-7B7A-43D3-8B79-37D633B846F1}">
+                <asvg:svgBlip xmlns:asvg="http://schemas.microsoft.com/office/drawing/2016/SVG/main" r:embed="rId2"/>
+              </a:ext>
+            </a:extLst>
+          </a:blip>
+          <a:stretch>
+            <a:fillRect/>
+          </a:stretch>
+        </a:blipFill>
+        <a:ln>
+          <a:noFill/>
+        </a:ln>
+      </dgm:spPr>
+      <dgm:extLst>
+        <a:ext uri="{E40237B7-FDA0-4F09-8148-C483321AD2D9}">
+          <dgm14:cNvPr xmlns:dgm14="http://schemas.microsoft.com/office/drawing/2010/diagram" id="0" name="" descr="Chef"/>
+        </a:ext>
+      </dgm:extLst>
+    </dgm:pt>
+    <dgm:pt modelId="{4B1F5E80-D82D-4F81-86F9-E05F830303FB}" type="pres">
+      <dgm:prSet presAssocID="{654FA45D-D533-4C34-9406-A595C07F2C4E}" presName="spaceRect" presStyleCnt="0"/>
+      <dgm:spPr/>
+    </dgm:pt>
+    <dgm:pt modelId="{DBB0187B-93F9-4091-855B-855650F2F115}" type="pres">
+      <dgm:prSet presAssocID="{654FA45D-D533-4C34-9406-A595C07F2C4E}" presName="parTx" presStyleLbl="revTx" presStyleIdx="0" presStyleCnt="3">
+        <dgm:presLayoutVars>
+          <dgm:chMax val="0"/>
+          <dgm:chPref val="0"/>
+        </dgm:presLayoutVars>
+      </dgm:prSet>
+      <dgm:spPr/>
+    </dgm:pt>
+    <dgm:pt modelId="{F7947824-197B-44ED-929E-55F2B812BA63}" type="pres">
+      <dgm:prSet presAssocID="{C88A760E-D114-443C-A9D1-5A17FF9D3F4A}" presName="sibTrans" presStyleCnt="0"/>
+      <dgm:spPr/>
+    </dgm:pt>
+    <dgm:pt modelId="{BD9706CE-BE51-4B93-B2F3-1C65721F1086}" type="pres">
+      <dgm:prSet presAssocID="{F363AC19-D559-4882-99BD-DE71E52D0D98}" presName="compNode" presStyleCnt="0"/>
+      <dgm:spPr/>
+    </dgm:pt>
+    <dgm:pt modelId="{E297528F-1E0F-40A3-BB75-449AD2FB8DFE}" type="pres">
+      <dgm:prSet presAssocID="{F363AC19-D559-4882-99BD-DE71E52D0D98}" presName="bgRect" presStyleLbl="bgShp" presStyleIdx="1" presStyleCnt="3"/>
+      <dgm:spPr/>
+    </dgm:pt>
+    <dgm:pt modelId="{0D75826E-0143-421E-A79A-6A0BA2300A0F}" type="pres">
+      <dgm:prSet presAssocID="{F363AC19-D559-4882-99BD-DE71E52D0D98}" presName="iconRect" presStyleLbl="node1" presStyleIdx="1" presStyleCnt="3"/>
+      <dgm:spPr>
+        <a:blipFill>
+          <a:blip xmlns:r="http://schemas.openxmlformats.org/officeDocument/2006/relationships" r:embed="rId3">
+            <a:extLst>
+              <a:ext uri="{28A0092B-C50C-407E-A947-70E740481C1C}">
+                <a14:useLocalDpi xmlns:a14="http://schemas.microsoft.com/office/drawing/2010/main" val="0"/>
+              </a:ext>
+              <a:ext uri="{96DAC541-7B7A-43D3-8B79-37D633B846F1}">
+                <asvg:svgBlip xmlns:asvg="http://schemas.microsoft.com/office/drawing/2016/SVG/main" r:embed="rId4"/>
+              </a:ext>
+            </a:extLst>
+          </a:blip>
+          <a:stretch>
+            <a:fillRect/>
+          </a:stretch>
+        </a:blipFill>
+        <a:ln>
+          <a:noFill/>
+        </a:ln>
+      </dgm:spPr>
+      <dgm:extLst>
+        <a:ext uri="{E40237B7-FDA0-4F09-8148-C483321AD2D9}">
+          <dgm14:cNvPr xmlns:dgm14="http://schemas.microsoft.com/office/drawing/2010/diagram" id="0" name="" descr="Whole Pizza"/>
+        </a:ext>
+      </dgm:extLst>
+    </dgm:pt>
+    <dgm:pt modelId="{EDE2DDF2-53AB-4948-9BEF-E4BE908EC2C4}" type="pres">
+      <dgm:prSet presAssocID="{F363AC19-D559-4882-99BD-DE71E52D0D98}" presName="spaceRect" presStyleCnt="0"/>
+      <dgm:spPr/>
+    </dgm:pt>
+    <dgm:pt modelId="{46EF5E7A-F840-4158-B063-63CA6A27BD31}" type="pres">
+      <dgm:prSet presAssocID="{F363AC19-D559-4882-99BD-DE71E52D0D98}" presName="parTx" presStyleLbl="revTx" presStyleIdx="1" presStyleCnt="3">
+        <dgm:presLayoutVars>
+          <dgm:chMax val="0"/>
+          <dgm:chPref val="0"/>
+        </dgm:presLayoutVars>
+      </dgm:prSet>
+      <dgm:spPr/>
+    </dgm:pt>
+    <dgm:pt modelId="{5A680A52-5945-4A2E-AD54-965D85C7C6BC}" type="pres">
+      <dgm:prSet presAssocID="{40F3FE3F-9B13-4D9E-B197-045A48EC91D7}" presName="sibTrans" presStyleCnt="0"/>
+      <dgm:spPr/>
+    </dgm:pt>
+    <dgm:pt modelId="{CB460AA4-E7F1-47C7-B8FF-DAF6AF0D2036}" type="pres">
+      <dgm:prSet presAssocID="{5F971BA8-3816-4496-8411-D295B3F59B9B}" presName="compNode" presStyleCnt="0"/>
+      <dgm:spPr/>
+    </dgm:pt>
+    <dgm:pt modelId="{743D2309-C80B-4848-8E57-91973323C8F2}" type="pres">
+      <dgm:prSet presAssocID="{5F971BA8-3816-4496-8411-D295B3F59B9B}" presName="bgRect" presStyleLbl="bgShp" presStyleIdx="2" presStyleCnt="3"/>
+      <dgm:spPr/>
+    </dgm:pt>
+    <dgm:pt modelId="{A6998874-5670-47E5-A237-88EB13FCA44B}" type="pres">
+      <dgm:prSet presAssocID="{5F971BA8-3816-4496-8411-D295B3F59B9B}" presName="iconRect" presStyleLbl="node1" presStyleIdx="2" presStyleCnt="3"/>
+      <dgm:spPr>
+        <a:blipFill>
+          <a:blip xmlns:r="http://schemas.openxmlformats.org/officeDocument/2006/relationships" r:embed="rId5">
+            <a:extLst>
+              <a:ext uri="{28A0092B-C50C-407E-A947-70E740481C1C}">
+                <a14:useLocalDpi xmlns:a14="http://schemas.microsoft.com/office/drawing/2010/main" val="0"/>
+              </a:ext>
+              <a:ext uri="{96DAC541-7B7A-43D3-8B79-37D633B846F1}">
+                <asvg:svgBlip xmlns:asvg="http://schemas.microsoft.com/office/drawing/2016/SVG/main" r:embed="rId6"/>
+              </a:ext>
+            </a:extLst>
+          </a:blip>
+          <a:stretch>
+            <a:fillRect/>
+          </a:stretch>
+        </a:blipFill>
+        <a:ln>
+          <a:noFill/>
+        </a:ln>
+      </dgm:spPr>
+      <dgm:extLst>
+        <a:ext uri="{E40237B7-FDA0-4F09-8148-C483321AD2D9}">
+          <dgm14:cNvPr xmlns:dgm14="http://schemas.microsoft.com/office/drawing/2010/diagram" id="0" name="" descr="Fork and knife"/>
+        </a:ext>
+      </dgm:extLst>
+    </dgm:pt>
+    <dgm:pt modelId="{48E55DB9-E349-4DE3-A5E6-D13F7429DAC3}" type="pres">
+      <dgm:prSet presAssocID="{5F971BA8-3816-4496-8411-D295B3F59B9B}" presName="spaceRect" presStyleCnt="0"/>
+      <dgm:spPr/>
+    </dgm:pt>
+    <dgm:pt modelId="{15200E00-96B6-4B25-BB7D-03B9018E400C}" type="pres">
+      <dgm:prSet presAssocID="{5F971BA8-3816-4496-8411-D295B3F59B9B}" presName="parTx" presStyleLbl="revTx" presStyleIdx="2" presStyleCnt="3">
+        <dgm:presLayoutVars>
+          <dgm:chMax val="0"/>
+          <dgm:chPref val="0"/>
+        </dgm:presLayoutVars>
+      </dgm:prSet>
+      <dgm:spPr/>
+    </dgm:pt>
+  </dgm:ptLst>
+  <dgm:cxnLst>
+    <dgm:cxn modelId="{4E942D1D-D8AB-4189-A7FC-856EAE749B07}" srcId="{D2A91B7C-41C4-4FBF-AE53-1FE3782C8580}" destId="{F363AC19-D559-4882-99BD-DE71E52D0D98}" srcOrd="1" destOrd="0" parTransId="{365E6119-DA73-4A96-AA9A-CC5687EF1A05}" sibTransId="{40F3FE3F-9B13-4D9E-B197-045A48EC91D7}"/>
+    <dgm:cxn modelId="{6ED35F84-B04E-4286-971E-B1757A0BBC7C}" srcId="{D2A91B7C-41C4-4FBF-AE53-1FE3782C8580}" destId="{654FA45D-D533-4C34-9406-A595C07F2C4E}" srcOrd="0" destOrd="0" parTransId="{4C53BB95-E0B9-41CB-B6EA-6E83C32541B6}" sibTransId="{C88A760E-D114-443C-A9D1-5A17FF9D3F4A}"/>
+    <dgm:cxn modelId="{769E509B-44CB-42CC-B4EA-20BF47BCB97F}" type="presOf" srcId="{F363AC19-D559-4882-99BD-DE71E52D0D98}" destId="{46EF5E7A-F840-4158-B063-63CA6A27BD31}" srcOrd="0" destOrd="0" presId="urn:microsoft.com/office/officeart/2018/2/layout/IconVerticalSolidList"/>
+    <dgm:cxn modelId="{A1FBC6AB-087A-4715-B36C-4A28EC13D722}" srcId="{D2A91B7C-41C4-4FBF-AE53-1FE3782C8580}" destId="{5F971BA8-3816-4496-8411-D295B3F59B9B}" srcOrd="2" destOrd="0" parTransId="{CF5558DB-B30E-4A02-BF9A-ADCE31A782D7}" sibTransId="{0A9E8214-7602-4AED-92D2-A9D15AE6F81E}"/>
+    <dgm:cxn modelId="{034D1CAE-CB35-4A89-80EB-424D798FB8FF}" type="presOf" srcId="{5F971BA8-3816-4496-8411-D295B3F59B9B}" destId="{15200E00-96B6-4B25-BB7D-03B9018E400C}" srcOrd="0" destOrd="0" presId="urn:microsoft.com/office/officeart/2018/2/layout/IconVerticalSolidList"/>
+    <dgm:cxn modelId="{FF91AEC5-5A5A-4471-A772-C9E766079452}" type="presOf" srcId="{654FA45D-D533-4C34-9406-A595C07F2C4E}" destId="{DBB0187B-93F9-4091-855B-855650F2F115}" srcOrd="0" destOrd="0" presId="urn:microsoft.com/office/officeart/2018/2/layout/IconVerticalSolidList"/>
+    <dgm:cxn modelId="{EFFE9DD0-8483-4116-AA1F-3E53CC5AFD6F}" type="presOf" srcId="{D2A91B7C-41C4-4FBF-AE53-1FE3782C8580}" destId="{0A3E2D78-0F65-44CE-9743-EFCBCEE2A2F3}" srcOrd="0" destOrd="0" presId="urn:microsoft.com/office/officeart/2018/2/layout/IconVerticalSolidList"/>
+    <dgm:cxn modelId="{BD97CCAB-0A9C-4E56-8BFF-1DB3D777A0DC}" type="presParOf" srcId="{0A3E2D78-0F65-44CE-9743-EFCBCEE2A2F3}" destId="{0C2DA695-170E-423D-953A-D2154A28C1CC}" srcOrd="0" destOrd="0" presId="urn:microsoft.com/office/officeart/2018/2/layout/IconVerticalSolidList"/>
+    <dgm:cxn modelId="{E130093A-1D2A-4946-98AD-3B14AB4BCF41}" type="presParOf" srcId="{0C2DA695-170E-423D-953A-D2154A28C1CC}" destId="{FBDB4F51-9E86-4D98-9F3F-FFF3E4943C0F}" srcOrd="0" destOrd="0" presId="urn:microsoft.com/office/officeart/2018/2/layout/IconVerticalSolidList"/>
+    <dgm:cxn modelId="{7FEB08C5-0C3F-4A42-99E9-4465AF1A6314}" type="presParOf" srcId="{0C2DA695-170E-423D-953A-D2154A28C1CC}" destId="{BAF9EAAB-0FB6-433F-9036-1110CC07E9C7}" srcOrd="1" destOrd="0" presId="urn:microsoft.com/office/officeart/2018/2/layout/IconVerticalSolidList"/>
+    <dgm:cxn modelId="{DFA66260-9504-4D79-8B38-4837EA324A47}" type="presParOf" srcId="{0C2DA695-170E-423D-953A-D2154A28C1CC}" destId="{4B1F5E80-D82D-4F81-86F9-E05F830303FB}" srcOrd="2" destOrd="0" presId="urn:microsoft.com/office/officeart/2018/2/layout/IconVerticalSolidList"/>
+    <dgm:cxn modelId="{8F4F8EDF-0193-4526-AA8D-71394FD04324}" type="presParOf" srcId="{0C2DA695-170E-423D-953A-D2154A28C1CC}" destId="{DBB0187B-93F9-4091-855B-855650F2F115}" srcOrd="3" destOrd="0" presId="urn:microsoft.com/office/officeart/2018/2/layout/IconVerticalSolidList"/>
+    <dgm:cxn modelId="{8DD75DE3-A0AF-407B-A2B9-780DA7A8AC96}" type="presParOf" srcId="{0A3E2D78-0F65-44CE-9743-EFCBCEE2A2F3}" destId="{F7947824-197B-44ED-929E-55F2B812BA63}" srcOrd="1" destOrd="0" presId="urn:microsoft.com/office/officeart/2018/2/layout/IconVerticalSolidList"/>
+    <dgm:cxn modelId="{F3AADE15-010D-4F5C-BEDD-3FA1BE2AC0FB}" type="presParOf" srcId="{0A3E2D78-0F65-44CE-9743-EFCBCEE2A2F3}" destId="{BD9706CE-BE51-4B93-B2F3-1C65721F1086}" srcOrd="2" destOrd="0" presId="urn:microsoft.com/office/officeart/2018/2/layout/IconVerticalSolidList"/>
+    <dgm:cxn modelId="{9CA577A9-D268-4C46-BC4A-F59620A4FC31}" type="presParOf" srcId="{BD9706CE-BE51-4B93-B2F3-1C65721F1086}" destId="{E297528F-1E0F-40A3-BB75-449AD2FB8DFE}" srcOrd="0" destOrd="0" presId="urn:microsoft.com/office/officeart/2018/2/layout/IconVerticalSolidList"/>
+    <dgm:cxn modelId="{C1BE3E00-BB3A-40F1-BB35-1D8C3EDE1E27}" type="presParOf" srcId="{BD9706CE-BE51-4B93-B2F3-1C65721F1086}" destId="{0D75826E-0143-421E-A79A-6A0BA2300A0F}" srcOrd="1" destOrd="0" presId="urn:microsoft.com/office/officeart/2018/2/layout/IconVerticalSolidList"/>
+    <dgm:cxn modelId="{FED15CFF-79D5-4239-BCA4-8E3C5DB3CBA6}" type="presParOf" srcId="{BD9706CE-BE51-4B93-B2F3-1C65721F1086}" destId="{EDE2DDF2-53AB-4948-9BEF-E4BE908EC2C4}" srcOrd="2" destOrd="0" presId="urn:microsoft.com/office/officeart/2018/2/layout/IconVerticalSolidList"/>
+    <dgm:cxn modelId="{FB992291-30D9-40DF-A89A-A9743F74039B}" type="presParOf" srcId="{BD9706CE-BE51-4B93-B2F3-1C65721F1086}" destId="{46EF5E7A-F840-4158-B063-63CA6A27BD31}" srcOrd="3" destOrd="0" presId="urn:microsoft.com/office/officeart/2018/2/layout/IconVerticalSolidList"/>
+    <dgm:cxn modelId="{642A95C4-A19B-48B3-AE02-4C8775DA202E}" type="presParOf" srcId="{0A3E2D78-0F65-44CE-9743-EFCBCEE2A2F3}" destId="{5A680A52-5945-4A2E-AD54-965D85C7C6BC}" srcOrd="3" destOrd="0" presId="urn:microsoft.com/office/officeart/2018/2/layout/IconVerticalSolidList"/>
+    <dgm:cxn modelId="{E3B9ED82-8AE2-4218-BC4E-752944630183}" type="presParOf" srcId="{0A3E2D78-0F65-44CE-9743-EFCBCEE2A2F3}" destId="{CB460AA4-E7F1-47C7-B8FF-DAF6AF0D2036}" srcOrd="4" destOrd="0" presId="urn:microsoft.com/office/officeart/2018/2/layout/IconVerticalSolidList"/>
+    <dgm:cxn modelId="{D7897CFD-F9C7-4EF0-A135-B7B66B955735}" type="presParOf" srcId="{CB460AA4-E7F1-47C7-B8FF-DAF6AF0D2036}" destId="{743D2309-C80B-4848-8E57-91973323C8F2}" srcOrd="0" destOrd="0" presId="urn:microsoft.com/office/officeart/2018/2/layout/IconVerticalSolidList"/>
+    <dgm:cxn modelId="{A25017D3-A805-40E6-A60B-9242888F6AF5}" type="presParOf" srcId="{CB460AA4-E7F1-47C7-B8FF-DAF6AF0D2036}" destId="{A6998874-5670-47E5-A237-88EB13FCA44B}" srcOrd="1" destOrd="0" presId="urn:microsoft.com/office/officeart/2018/2/layout/IconVerticalSolidList"/>
+    <dgm:cxn modelId="{F7E7BC09-B56A-4024-BE9D-800C6AAE399D}" type="presParOf" srcId="{CB460AA4-E7F1-47C7-B8FF-DAF6AF0D2036}" destId="{48E55DB9-E349-4DE3-A5E6-D13F7429DAC3}" srcOrd="2" destOrd="0" presId="urn:microsoft.com/office/officeart/2018/2/layout/IconVerticalSolidList"/>
+    <dgm:cxn modelId="{EC3BDB42-01F2-4051-A98C-DF479F6742EB}" type="presParOf" srcId="{CB460AA4-E7F1-47C7-B8FF-DAF6AF0D2036}" destId="{15200E00-96B6-4B25-BB7D-03B9018E400C}" srcOrd="3" destOrd="0" presId="urn:microsoft.com/office/officeart/2018/2/layout/IconVerticalSolidList"/>
+  </dgm:cxnLst>
+  <dgm:bg/>
+  <dgm:whole/>
+  <dgm:extLst>
+    <a:ext uri="http://schemas.microsoft.com/office/drawing/2008/diagram">
+      <dsp:dataModelExt xmlns:dsp="http://schemas.microsoft.com/office/drawing/2008/diagram" relId="rId6" minVer="http://schemas.openxmlformats.org/drawingml/2006/diagram"/>
+    </a:ext>
+  </dgm:extLst>
+</dgm:dataModel>
+</file>
+
+<file path=ppt/diagrams/drawing1.xml><?xml version="1.0" encoding="utf-8"?>
+<dsp:drawing xmlns:dgm="http://schemas.openxmlformats.org/drawingml/2006/diagram" xmlns:dsp="http://schemas.microsoft.com/office/drawing/2008/diagram" xmlns:a="http://schemas.openxmlformats.org/drawingml/2006/main">
+  <dsp:spTree>
+    <dsp:nvGrpSpPr>
+      <dsp:cNvPr id="0" name=""/>
+      <dsp:cNvGrpSpPr/>
+    </dsp:nvGrpSpPr>
+    <dsp:grpSpPr/>
+    <dsp:sp modelId="{FBDB4F51-9E86-4D98-9F3F-FFF3E4943C0F}">
+      <dsp:nvSpPr>
+        <dsp:cNvPr id="0" name=""/>
+        <dsp:cNvSpPr/>
+      </dsp:nvSpPr>
+      <dsp:spPr>
+        <a:xfrm>
+          <a:off x="0" y="582"/>
+          <a:ext cx="5614987" cy="1363556"/>
+        </a:xfrm>
+        <a:prstGeom prst="roundRect">
+          <a:avLst>
+            <a:gd name="adj" fmla="val 10000"/>
+          </a:avLst>
+        </a:prstGeom>
+        <a:solidFill>
+          <a:schemeClr val="bg1">
+            <a:lumMod val="95000"/>
+            <a:hueOff val="0"/>
+            <a:satOff val="0"/>
+            <a:lumOff val="0"/>
+            <a:alphaOff val="0"/>
+          </a:schemeClr>
+        </a:solidFill>
+        <a:ln>
+          <a:noFill/>
+        </a:ln>
+        <a:effectLst/>
+      </dsp:spPr>
+      <dsp:style>
+        <a:lnRef idx="0">
+          <a:scrgbClr r="0" g="0" b="0"/>
+        </a:lnRef>
+        <a:fillRef idx="1">
+          <a:scrgbClr r="0" g="0" b="0"/>
+        </a:fillRef>
+        <a:effectRef idx="0">
+          <a:scrgbClr r="0" g="0" b="0"/>
+        </a:effectRef>
+        <a:fontRef idx="minor"/>
+      </dsp:style>
+    </dsp:sp>
+    <dsp:sp modelId="{BAF9EAAB-0FB6-433F-9036-1110CC07E9C7}">
+      <dsp:nvSpPr>
+        <dsp:cNvPr id="0" name=""/>
+        <dsp:cNvSpPr/>
+      </dsp:nvSpPr>
+      <dsp:spPr>
+        <a:xfrm>
+          <a:off x="412475" y="307382"/>
+          <a:ext cx="749956" cy="749956"/>
+        </a:xfrm>
+        <a:prstGeom prst="rect">
+          <a:avLst/>
+        </a:prstGeom>
+        <a:blipFill>
+          <a:blip xmlns:r="http://schemas.openxmlformats.org/officeDocument/2006/relationships" r:embed="rId1">
+            <a:extLst>
+              <a:ext uri="{28A0092B-C50C-407E-A947-70E740481C1C}">
+                <a14:useLocalDpi xmlns:a14="http://schemas.microsoft.com/office/drawing/2010/main" val="0"/>
+              </a:ext>
+              <a:ext uri="{96DAC541-7B7A-43D3-8B79-37D633B846F1}">
+                <asvg:svgBlip xmlns:asvg="http://schemas.microsoft.com/office/drawing/2016/SVG/main" r:embed="rId2"/>
+              </a:ext>
+            </a:extLst>
+          </a:blip>
+          <a:stretch>
+            <a:fillRect/>
+          </a:stretch>
+        </a:blipFill>
+        <a:ln w="19050" cap="rnd" cmpd="sng" algn="ctr">
+          <a:noFill/>
+          <a:prstDash val="solid"/>
+        </a:ln>
+        <a:effectLst/>
+      </dsp:spPr>
+      <dsp:style>
+        <a:lnRef idx="2">
+          <a:scrgbClr r="0" g="0" b="0"/>
+        </a:lnRef>
+        <a:fillRef idx="1">
+          <a:scrgbClr r="0" g="0" b="0"/>
+        </a:fillRef>
+        <a:effectRef idx="0">
+          <a:scrgbClr r="0" g="0" b="0"/>
+        </a:effectRef>
+        <a:fontRef idx="minor">
+          <a:schemeClr val="lt1"/>
+        </a:fontRef>
+      </dsp:style>
+    </dsp:sp>
+    <dsp:sp modelId="{DBB0187B-93F9-4091-855B-855650F2F115}">
+      <dsp:nvSpPr>
+        <dsp:cNvPr id="0" name=""/>
+        <dsp:cNvSpPr/>
+      </dsp:nvSpPr>
+      <dsp:spPr>
+        <a:xfrm>
+          <a:off x="1574907" y="582"/>
+          <a:ext cx="4040079" cy="1363556"/>
+        </a:xfrm>
+        <a:prstGeom prst="rect">
+          <a:avLst/>
+        </a:prstGeom>
+        <a:noFill/>
+        <a:ln>
+          <a:noFill/>
+        </a:ln>
+        <a:effectLst/>
+      </dsp:spPr>
+      <dsp:style>
+        <a:lnRef idx="0">
+          <a:scrgbClr r="0" g="0" b="0"/>
+        </a:lnRef>
+        <a:fillRef idx="0">
+          <a:scrgbClr r="0" g="0" b="0"/>
+        </a:fillRef>
+        <a:effectRef idx="0">
+          <a:scrgbClr r="0" g="0" b="0"/>
+        </a:effectRef>
+        <a:fontRef idx="minor"/>
+      </dsp:style>
+      <dsp:txBody>
+        <a:bodyPr spcFirstLastPara="0" vert="horz" wrap="square" lIns="144310" tIns="144310" rIns="144310" bIns="144310" numCol="1" spcCol="1270" anchor="ctr" anchorCtr="0">
+          <a:noAutofit/>
+        </a:bodyPr>
+        <a:lstStyle/>
+        <a:p>
+          <a:pPr marL="0" lvl="0" indent="0" algn="l" defTabSz="1111250">
+            <a:lnSpc>
+              <a:spcPct val="90000"/>
+            </a:lnSpc>
+            <a:spcBef>
+              <a:spcPct val="0"/>
+            </a:spcBef>
+            <a:spcAft>
+              <a:spcPct val="35000"/>
+            </a:spcAft>
+            <a:buNone/>
+          </a:pPr>
+          <a:r>
+            <a:rPr lang="en-ZA" sz="2500" kern="1200"/>
+            <a:t>People struggle to find recipes that are suited to their needs</a:t>
+          </a:r>
+          <a:endParaRPr lang="en-US" sz="2500" kern="1200"/>
+        </a:p>
+      </dsp:txBody>
+      <dsp:txXfrm>
+        <a:off x="1574907" y="582"/>
+        <a:ext cx="4040079" cy="1363556"/>
+      </dsp:txXfrm>
+    </dsp:sp>
+    <dsp:sp modelId="{E297528F-1E0F-40A3-BB75-449AD2FB8DFE}">
+      <dsp:nvSpPr>
+        <dsp:cNvPr id="0" name=""/>
+        <dsp:cNvSpPr/>
+      </dsp:nvSpPr>
+      <dsp:spPr>
+        <a:xfrm>
+          <a:off x="0" y="1705028"/>
+          <a:ext cx="5614987" cy="1363556"/>
+        </a:xfrm>
+        <a:prstGeom prst="roundRect">
+          <a:avLst>
+            <a:gd name="adj" fmla="val 10000"/>
+          </a:avLst>
+        </a:prstGeom>
+        <a:solidFill>
+          <a:schemeClr val="bg1">
+            <a:lumMod val="95000"/>
+            <a:hueOff val="0"/>
+            <a:satOff val="0"/>
+            <a:lumOff val="0"/>
+            <a:alphaOff val="0"/>
+          </a:schemeClr>
+        </a:solidFill>
+        <a:ln>
+          <a:noFill/>
+        </a:ln>
+        <a:effectLst/>
+      </dsp:spPr>
+      <dsp:style>
+        <a:lnRef idx="0">
+          <a:scrgbClr r="0" g="0" b="0"/>
+        </a:lnRef>
+        <a:fillRef idx="1">
+          <a:scrgbClr r="0" g="0" b="0"/>
+        </a:fillRef>
+        <a:effectRef idx="0">
+          <a:scrgbClr r="0" g="0" b="0"/>
+        </a:effectRef>
+        <a:fontRef idx="minor"/>
+      </dsp:style>
+    </dsp:sp>
+    <dsp:sp modelId="{0D75826E-0143-421E-A79A-6A0BA2300A0F}">
+      <dsp:nvSpPr>
+        <dsp:cNvPr id="0" name=""/>
+        <dsp:cNvSpPr/>
+      </dsp:nvSpPr>
+      <dsp:spPr>
+        <a:xfrm>
+          <a:off x="412475" y="2011828"/>
+          <a:ext cx="749956" cy="749956"/>
+        </a:xfrm>
+        <a:prstGeom prst="rect">
+          <a:avLst/>
+        </a:prstGeom>
+        <a:blipFill>
+          <a:blip xmlns:r="http://schemas.openxmlformats.org/officeDocument/2006/relationships" r:embed="rId3">
+            <a:extLst>
+              <a:ext uri="{28A0092B-C50C-407E-A947-70E740481C1C}">
+                <a14:useLocalDpi xmlns:a14="http://schemas.microsoft.com/office/drawing/2010/main" val="0"/>
+              </a:ext>
+              <a:ext uri="{96DAC541-7B7A-43D3-8B79-37D633B846F1}">
+                <asvg:svgBlip xmlns:asvg="http://schemas.microsoft.com/office/drawing/2016/SVG/main" r:embed="rId4"/>
+              </a:ext>
+            </a:extLst>
+          </a:blip>
+          <a:stretch>
+            <a:fillRect/>
+          </a:stretch>
+        </a:blipFill>
+        <a:ln w="19050" cap="rnd" cmpd="sng" algn="ctr">
+          <a:noFill/>
+          <a:prstDash val="solid"/>
+        </a:ln>
+        <a:effectLst/>
+      </dsp:spPr>
+      <dsp:style>
+        <a:lnRef idx="2">
+          <a:scrgbClr r="0" g="0" b="0"/>
+        </a:lnRef>
+        <a:fillRef idx="1">
+          <a:scrgbClr r="0" g="0" b="0"/>
+        </a:fillRef>
+        <a:effectRef idx="0">
+          <a:scrgbClr r="0" g="0" b="0"/>
+        </a:effectRef>
+        <a:fontRef idx="minor">
+          <a:schemeClr val="lt1"/>
+        </a:fontRef>
+      </dsp:style>
+    </dsp:sp>
+    <dsp:sp modelId="{46EF5E7A-F840-4158-B063-63CA6A27BD31}">
+      <dsp:nvSpPr>
+        <dsp:cNvPr id="0" name=""/>
+        <dsp:cNvSpPr/>
+      </dsp:nvSpPr>
+      <dsp:spPr>
+        <a:xfrm>
+          <a:off x="1574907" y="1705028"/>
+          <a:ext cx="4040079" cy="1363556"/>
+        </a:xfrm>
+        <a:prstGeom prst="rect">
+          <a:avLst/>
+        </a:prstGeom>
+        <a:noFill/>
+        <a:ln>
+          <a:noFill/>
+        </a:ln>
+        <a:effectLst/>
+      </dsp:spPr>
+      <dsp:style>
+        <a:lnRef idx="0">
+          <a:scrgbClr r="0" g="0" b="0"/>
+        </a:lnRef>
+        <a:fillRef idx="0">
+          <a:scrgbClr r="0" g="0" b="0"/>
+        </a:fillRef>
+        <a:effectRef idx="0">
+          <a:scrgbClr r="0" g="0" b="0"/>
+        </a:effectRef>
+        <a:fontRef idx="minor"/>
+      </dsp:style>
+      <dsp:txBody>
+        <a:bodyPr spcFirstLastPara="0" vert="horz" wrap="square" lIns="144310" tIns="144310" rIns="144310" bIns="144310" numCol="1" spcCol="1270" anchor="ctr" anchorCtr="0">
+          <a:noAutofit/>
+        </a:bodyPr>
+        <a:lstStyle/>
+        <a:p>
+          <a:pPr marL="0" lvl="0" indent="0" algn="l" defTabSz="1111250">
+            <a:lnSpc>
+              <a:spcPct val="90000"/>
+            </a:lnSpc>
+            <a:spcBef>
+              <a:spcPct val="0"/>
+            </a:spcBef>
+            <a:spcAft>
+              <a:spcPct val="35000"/>
+            </a:spcAft>
+            <a:buNone/>
+          </a:pPr>
+          <a:r>
+            <a:rPr lang="en-ZA" sz="2500" kern="1200"/>
+            <a:t>Lack of beginner-friendly recipes</a:t>
+          </a:r>
+          <a:endParaRPr lang="en-US" sz="2500" kern="1200"/>
+        </a:p>
+      </dsp:txBody>
+      <dsp:txXfrm>
+        <a:off x="1574907" y="1705028"/>
+        <a:ext cx="4040079" cy="1363556"/>
+      </dsp:txXfrm>
+    </dsp:sp>
+    <dsp:sp modelId="{743D2309-C80B-4848-8E57-91973323C8F2}">
+      <dsp:nvSpPr>
+        <dsp:cNvPr id="0" name=""/>
+        <dsp:cNvSpPr/>
+      </dsp:nvSpPr>
+      <dsp:spPr>
+        <a:xfrm>
+          <a:off x="0" y="3409473"/>
+          <a:ext cx="5614987" cy="1363556"/>
+        </a:xfrm>
+        <a:prstGeom prst="roundRect">
+          <a:avLst>
+            <a:gd name="adj" fmla="val 10000"/>
+          </a:avLst>
+        </a:prstGeom>
+        <a:solidFill>
+          <a:schemeClr val="bg1">
+            <a:lumMod val="95000"/>
+            <a:hueOff val="0"/>
+            <a:satOff val="0"/>
+            <a:lumOff val="0"/>
+            <a:alphaOff val="0"/>
+          </a:schemeClr>
+        </a:solidFill>
+        <a:ln>
+          <a:noFill/>
+        </a:ln>
+        <a:effectLst/>
+      </dsp:spPr>
+      <dsp:style>
+        <a:lnRef idx="0">
+          <a:scrgbClr r="0" g="0" b="0"/>
+        </a:lnRef>
+        <a:fillRef idx="1">
+          <a:scrgbClr r="0" g="0" b="0"/>
+        </a:fillRef>
+        <a:effectRef idx="0">
+          <a:scrgbClr r="0" g="0" b="0"/>
+        </a:effectRef>
+        <a:fontRef idx="minor"/>
+      </dsp:style>
+    </dsp:sp>
+    <dsp:sp modelId="{A6998874-5670-47E5-A237-88EB13FCA44B}">
+      <dsp:nvSpPr>
+        <dsp:cNvPr id="0" name=""/>
+        <dsp:cNvSpPr/>
+      </dsp:nvSpPr>
+      <dsp:spPr>
+        <a:xfrm>
+          <a:off x="412475" y="3716274"/>
+          <a:ext cx="749956" cy="749956"/>
+        </a:xfrm>
+        <a:prstGeom prst="rect">
+          <a:avLst/>
+        </a:prstGeom>
+        <a:blipFill>
+          <a:blip xmlns:r="http://schemas.openxmlformats.org/officeDocument/2006/relationships" r:embed="rId5">
+            <a:extLst>
+              <a:ext uri="{28A0092B-C50C-407E-A947-70E740481C1C}">
+                <a14:useLocalDpi xmlns:a14="http://schemas.microsoft.com/office/drawing/2010/main" val="0"/>
+              </a:ext>
+              <a:ext uri="{96DAC541-7B7A-43D3-8B79-37D633B846F1}">
+                <asvg:svgBlip xmlns:asvg="http://schemas.microsoft.com/office/drawing/2016/SVG/main" r:embed="rId6"/>
+              </a:ext>
+            </a:extLst>
+          </a:blip>
+          <a:stretch>
+            <a:fillRect/>
+          </a:stretch>
+        </a:blipFill>
+        <a:ln w="19050" cap="rnd" cmpd="sng" algn="ctr">
+          <a:noFill/>
+          <a:prstDash val="solid"/>
+        </a:ln>
+        <a:effectLst/>
+      </dsp:spPr>
+      <dsp:style>
+        <a:lnRef idx="2">
+          <a:scrgbClr r="0" g="0" b="0"/>
+        </a:lnRef>
+        <a:fillRef idx="1">
+          <a:scrgbClr r="0" g="0" b="0"/>
+        </a:fillRef>
+        <a:effectRef idx="0">
+          <a:scrgbClr r="0" g="0" b="0"/>
+        </a:effectRef>
+        <a:fontRef idx="minor">
+          <a:schemeClr val="lt1"/>
+        </a:fontRef>
+      </dsp:style>
+    </dsp:sp>
+    <dsp:sp modelId="{15200E00-96B6-4B25-BB7D-03B9018E400C}">
+      <dsp:nvSpPr>
+        <dsp:cNvPr id="0" name=""/>
+        <dsp:cNvSpPr/>
+      </dsp:nvSpPr>
+      <dsp:spPr>
+        <a:xfrm>
+          <a:off x="1574907" y="3409473"/>
+          <a:ext cx="4040079" cy="1363556"/>
+        </a:xfrm>
+        <a:prstGeom prst="rect">
+          <a:avLst/>
+        </a:prstGeom>
+        <a:noFill/>
+        <a:ln>
+          <a:noFill/>
+        </a:ln>
+        <a:effectLst/>
+      </dsp:spPr>
+      <dsp:style>
+        <a:lnRef idx="0">
+          <a:scrgbClr r="0" g="0" b="0"/>
+        </a:lnRef>
+        <a:fillRef idx="0">
+          <a:scrgbClr r="0" g="0" b="0"/>
+        </a:fillRef>
+        <a:effectRef idx="0">
+          <a:scrgbClr r="0" g="0" b="0"/>
+        </a:effectRef>
+        <a:fontRef idx="minor"/>
+      </dsp:style>
+      <dsp:txBody>
+        <a:bodyPr spcFirstLastPara="0" vert="horz" wrap="square" lIns="144310" tIns="144310" rIns="144310" bIns="144310" numCol="1" spcCol="1270" anchor="ctr" anchorCtr="0">
+          <a:noAutofit/>
+        </a:bodyPr>
+        <a:lstStyle/>
+        <a:p>
+          <a:pPr marL="0" lvl="0" indent="0" algn="l" defTabSz="1111250">
+            <a:lnSpc>
+              <a:spcPct val="90000"/>
+            </a:lnSpc>
+            <a:spcBef>
+              <a:spcPct val="0"/>
+            </a:spcBef>
+            <a:spcAft>
+              <a:spcPct val="35000"/>
+            </a:spcAft>
+            <a:buNone/>
+          </a:pPr>
+          <a:r>
+            <a:rPr lang="en-ZA" sz="2500" kern="1200"/>
+            <a:t>How this affects those who need easy to follow recipes</a:t>
+          </a:r>
+          <a:endParaRPr lang="en-US" sz="2500" kern="1200"/>
+        </a:p>
+      </dsp:txBody>
+      <dsp:txXfrm>
+        <a:off x="1574907" y="3409473"/>
+        <a:ext cx="4040079" cy="1363556"/>
+      </dsp:txXfrm>
+    </dsp:sp>
+  </dsp:spTree>
+</dsp:drawing>
+</file>
+
+<file path=ppt/diagrams/layout1.xml><?xml version="1.0" encoding="utf-8"?>
+<dgm:layoutDef xmlns:dgm="http://schemas.openxmlformats.org/drawingml/2006/diagram" xmlns:a="http://schemas.openxmlformats.org/drawingml/2006/main" uniqueId="urn:microsoft.com/office/officeart/2018/2/layout/IconVerticalSolidList">
+  <dgm:title val="Icon Vertical Solid List"/>
+  <dgm:desc val="Use to show a series of visuals from top to bottom with Level 1 or Level 1 and Level 2 text grouped in a shape. Works best with icons or small pictures with lengthier descriptions."/>
+  <dgm:catLst>
+    <dgm:cat type="icon" pri="500"/>
+  </dgm:catLst>
+  <dgm:sampData useDef="1">
+    <dgm:dataModel>
+      <dgm:ptLst/>
+      <dgm:bg/>
+      <dgm:whole/>
+    </dgm:dataModel>
+  </dgm:sampData>
+  <dgm:styleData useDef="1">
+    <dgm:dataModel>
+      <dgm:ptLst/>
+      <dgm:bg/>
+      <dgm:whole/>
+    </dgm:dataModel>
+  </dgm:styleData>
+  <dgm:clrData useDef="1">
+    <dgm:dataModel>
+      <dgm:ptLst/>
+      <dgm:bg/>
+      <dgm:whole/>
+    </dgm:dataModel>
+  </dgm:clrData>
+  <dgm:layoutNode name="root">
+    <dgm:varLst>
+      <dgm:dir/>
+      <dgm:resizeHandles val="exact"/>
+    </dgm:varLst>
+    <dgm:choose name="Name0">
+      <dgm:if name="Name1" axis="self" func="var" arg="dir" op="equ" val="norm">
+        <dgm:alg type="lin">
+          <dgm:param type="linDir" val="fromT"/>
+          <dgm:param type="nodeHorzAlign" val="l"/>
+        </dgm:alg>
+      </dgm:if>
+      <dgm:else name="Name2">
+        <dgm:alg type="lin">
+          <dgm:param type="linDir" val="fromT"/>
+          <dgm:param type="nodeHorzAlign" val="r"/>
+        </dgm:alg>
+      </dgm:else>
+    </dgm:choose>
+    <dgm:shape xmlns:r="http://schemas.openxmlformats.org/officeDocument/2006/relationships" r:blip="">
+      <dgm:adjLst/>
+    </dgm:shape>
+    <dgm:presOf/>
+    <dgm:choose name="Name3">
+      <dgm:if name="Name4" axis="ch" ptType="node" func="cnt" op="lte" val="3">
+        <dgm:constrLst>
+          <dgm:constr type="h" for="ch" forName="compNode" refType="h" fact="0.3"/>
+          <dgm:constr type="w" for="ch" forName="compNode" refType="w"/>
+          <dgm:constr type="h" for="ch" forName="sibTrans" refType="h" refFor="ch" refForName="compNode" fact="0.25"/>
+          <dgm:constr type="primFontSz" for="des" forName="parTx" val="25"/>
+          <dgm:constr type="primFontSz" for="des" forName="desTx" refType="primFontSz" refFor="des" refForName="parTx" op="lte" fact="0.75"/>
+          <dgm:constr type="h" for="des" forName="compNode" op="equ"/>
+          <dgm:constr type="h" for="des" forName="bgRect" op="equ"/>
+          <dgm:constr type="h" for="des" forName="iconRect" op="equ"/>
+          <dgm:constr type="w" for="des" forName="iconRect" op="equ"/>
+          <dgm:constr type="h" for="des" forName="spaceRect" op="equ"/>
+          <dgm:constr type="h" for="des" forName="parTx" op="equ"/>
+          <dgm:constr type="h" for="des" forName="desTx" op="equ"/>
+        </dgm:constrLst>
+      </dgm:if>
+      <dgm:if name="Name5" axis="ch" ptType="node" func="cnt" op="lte" val="4">
+        <dgm:constrLst>
+          <dgm:constr type="h" for="ch" forName="compNode" refType="h" fact="0.3"/>
+          <dgm:constr type="w" for="ch" forName="compNode" refType="w"/>
+          <dgm:constr type="h" for="ch" forName="sibTrans" refType="h" refFor="ch" refForName="compNode" fact="0.25"/>
+          <dgm:constr type="primFontSz" for="des" forName="parTx" val="22"/>
+          <dgm:constr type="primFontSz" for="des" forName="desTx" refType="primFontSz" refFor="des" refForName="parTx" op="lte" fact="0.75"/>
+          <dgm:constr type="h" for="des" forName="compNode" op="equ"/>
+          <dgm:constr type="h" for="des" forName="bgRect" op="equ"/>
+          <dgm:constr type="h" for="des" forName="iconRect" op="equ"/>
+          <dgm:constr type="w" for="des" forName="iconRect" op="equ"/>
+          <dgm:constr type="h" for="des" forName="spaceRect" op="equ"/>
+          <dgm:constr type="h" for="des" forName="parTx" op="equ"/>
+          <dgm:constr type="h" for="des" forName="desTx" op="equ"/>
+        </dgm:constrLst>
+      </dgm:if>
+      <dgm:if name="Name6" axis="ch" ptType="node" func="cnt" op="lte" val="6">
+        <dgm:constrLst>
+          <dgm:constr type="h" for="ch" forName="compNode" refType="h" fact="0.3"/>
+          <dgm:constr type="w" for="ch" forName="compNode" refType="w"/>
+          <dgm:constr type="h" for="ch" forName="sibTrans" refType="h" refFor="ch" refForName="compNode" fact="0.25"/>
+          <dgm:constr type="primFontSz" for="des" forName="parTx" val="19"/>
+          <dgm:constr type="primFontSz" for="des" forName="desTx" refType="primFontSz" refFor="des" refForName="parTx" op="lte" fact="0.75"/>
+          <dgm:constr type="h" for="des" forName="compNode" op="equ"/>
+          <dgm:constr type="h" for="des" forName="bgRect" op="equ"/>
+          <dgm:constr type="h" for="des" forName="iconRect" op="equ"/>
+          <dgm:constr type="w" for="des" forName="iconRect" op="equ"/>
+          <dgm:constr type="h" for="des" forName="spaceRect" op="equ"/>
+          <dgm:constr type="h" for="des" forName="parTx" op="equ"/>
+          <dgm:constr type="h" for="des" forName="desTx" op="equ"/>
+        </dgm:constrLst>
+      </dgm:if>
+      <dgm:else name="Name7">
+        <dgm:constrLst>
+          <dgm:constr type="h" for="ch" forName="compNode" refType="h" fact="0.3"/>
+          <dgm:constr type="w" for="ch" forName="compNode" refType="w"/>
+          <dgm:constr type="h" for="ch" forName="sibTrans" refType="h" refFor="ch" refForName="compNode" fact="0.25"/>
+          <dgm:constr type="primFontSz" for="des" forName="parTx" val="16"/>
+          <dgm:constr type="primFontSz" for="des" forName="desTx" refType="primFontSz" refFor="des" refForName="parTx" op="lte" fact="0.75"/>
+          <dgm:constr type="h" for="des" forName="compNode" op="equ"/>
+          <dgm:constr type="h" for="des" forName="bgRect" op="equ"/>
+          <dgm:constr type="h" for="des" forName="iconRect" op="equ"/>
+          <dgm:constr type="w" for="des" forName="iconRect" op="equ"/>
+          <dgm:constr type="h" for="des" forName="spaceRect" op="equ"/>
+          <dgm:constr type="h" for="des" forName="parTx" op="equ"/>
+          <dgm:constr type="h" for="des" forName="desTx" op="equ"/>
+        </dgm:constrLst>
+      </dgm:else>
+    </dgm:choose>
+    <dgm:ruleLst>
+      <dgm:rule type="h" for="ch" forName="compNode" val="0" fact="NaN" max="NaN"/>
+    </dgm:ruleLst>
+    <dgm:forEach name="Name8" axis="ch" ptType="node">
+      <dgm:layoutNode name="compNode">
+        <dgm:alg type="composite"/>
+        <dgm:shape xmlns:r="http://schemas.openxmlformats.org/officeDocument/2006/relationships" r:blip="">
+          <dgm:adjLst/>
+        </dgm:shape>
+        <dgm:presOf axis="self"/>
+        <dgm:choose name="Name9">
+          <dgm:if name="Name10" axis="ch" ptType="node" func="cnt" op="gte" val="1">
+            <dgm:constrLst>
+              <dgm:constr type="w" for="ch" forName="bgRect" refType="w"/>
+              <dgm:constr type="h" for="ch" forName="bgRect" refType="h"/>
+              <dgm:constr type="l" for="ch" forName="bgRect"/>
+              <dgm:constr type="t" for="ch" forName="bgRect"/>
+              <dgm:constr type="h" for="ch" forName="iconRect" refType="h" fact="0.55"/>
+              <dgm:constr type="w" for="ch" forName="iconRect" refType="h" refFor="ch" refForName="iconRect"/>
+              <dgm:constr type="l" for="ch" forName="iconRect" refType="h" refFor="ch" refForName="iconRect" fact="0.55"/>
+              <dgm:constr type="ctrY" for="ch" forName="iconRect" refType="ctrY" refFor="ch" refForName="bgRect"/>
+              <dgm:constr type="w" for="ch" forName="spaceRect" refType="l" refFor="ch" refForName="iconRect"/>
+              <dgm:constr type="h" for="ch" forName="spaceRect" refType="h"/>
+              <dgm:constr type="l" for="ch" forName="spaceRect" refType="r" refFor="ch" refForName="iconRect"/>
+              <dgm:constr type="t" for="ch" forName="spaceRect"/>
+              <dgm:constr type="w" for="ch" forName="parTx" refType="w" fact="0.45"/>
+              <dgm:constr type="h" for="ch" forName="parTx" refType="h"/>
+              <dgm:constr type="l" for="ch" forName="parTx" refType="r" refFor="ch" refForName="spaceRect"/>
+              <dgm:constr type="t" for="ch" forName="parTx"/>
+              <dgm:constr type="h" for="ch" forName="desTx" refType="h"/>
+              <dgm:constr type="l" for="ch" forName="desTx" refType="r" refFor="ch" refForName="parTx"/>
+              <dgm:constr type="t" for="ch" forName="desTx"/>
+            </dgm:constrLst>
+          </dgm:if>
+          <dgm:else name="Name11">
+            <dgm:constrLst>
+              <dgm:constr type="w" for="ch" forName="bgRect" refType="w"/>
+              <dgm:constr type="h" for="ch" forName="bgRect" refType="h"/>
+              <dgm:constr type="l" for="ch" forName="bgRect"/>
+              <dgm:constr type="t" for="ch" forName="bgRect"/>
+              <dgm:constr type="h" for="ch" forName="iconRect" refType="h" fact="0.55"/>
+              <dgm:constr type="w" for="ch" forName="iconRect" refType="h" refFor="ch" refForName="iconRect"/>
+              <dgm:constr type="l" for="ch" forName="iconRect" refType="h" refFor="ch" refForName="iconRect" fact="0.55"/>
+              <dgm:constr type="ctrY" for="ch" forName="iconRect" refType="ctrY" refFor="ch" refForName="bgRect"/>
+              <dgm:constr type="w" for="ch" forName="spaceRect" refType="l" refFor="ch" refForName="iconRect"/>
+              <dgm:constr type="h" for="ch" forName="spaceRect" refType="h"/>
+              <dgm:constr type="l" for="ch" forName="spaceRect" refType="r" refFor="ch" refForName="iconRect"/>
+              <dgm:constr type="t" for="ch" forName="spaceRect"/>
+              <dgm:constr type="h" for="ch" forName="parTx" refType="h"/>
+              <dgm:constr type="l" for="ch" forName="parTx" refType="r" refFor="ch" refForName="spaceRect"/>
+              <dgm:constr type="t" for="ch" forName="parTx"/>
+            </dgm:constrLst>
+          </dgm:else>
+        </dgm:choose>
+        <dgm:ruleLst>
+          <dgm:rule type="h" val="INF" fact="NaN" max="NaN"/>
+        </dgm:ruleLst>
+        <dgm:layoutNode name="bgRect" styleLbl="bgShp">
+          <dgm:alg type="sp"/>
+          <dgm:shape xmlns:r="http://schemas.openxmlformats.org/officeDocument/2006/relationships" type="roundRect" r:blip="">
+            <dgm:adjLst>
+              <dgm:adj idx="1" val="0.1"/>
+            </dgm:adjLst>
+          </dgm:shape>
+          <dgm:presOf/>
+          <dgm:constrLst/>
+          <dgm:ruleLst/>
+        </dgm:layoutNode>
+        <dgm:layoutNode name="iconRect" styleLbl="node1">
+          <dgm:alg type="sp"/>
+          <dgm:shape xmlns:r="http://schemas.openxmlformats.org/officeDocument/2006/relationships" type="rect" r:blip="" blipPhldr="1">
+            <dgm:adjLst/>
+          </dgm:shape>
+          <dgm:presOf/>
+          <dgm:constrLst/>
+          <dgm:ruleLst/>
+        </dgm:layoutNode>
+        <dgm:layoutNode name="spaceRect">
+          <dgm:alg type="sp"/>
+          <dgm:shape xmlns:r="http://schemas.openxmlformats.org/officeDocument/2006/relationships" r:blip="">
+            <dgm:adjLst/>
+          </dgm:shape>
+          <dgm:presOf/>
+          <dgm:constrLst/>
+          <dgm:ruleLst/>
+        </dgm:layoutNode>
+        <dgm:layoutNode name="parTx" styleLbl="revTx">
+          <dgm:varLst>
+            <dgm:chMax val="0"/>
+            <dgm:chPref val="0"/>
+          </dgm:varLst>
+          <dgm:alg type="tx">
+            <dgm:param type="txAnchorVert" val="mid"/>
+            <dgm:param type="parTxLTRAlign" val="l"/>
+            <dgm:param type="shpTxLTRAlignCh" val="l"/>
+            <dgm:param type="parTxRTLAlign" val="r"/>
+            <dgm:param type="shpTxRTLAlignCh" val="r"/>
+          </dgm:alg>
+          <dgm:shape xmlns:r="http://schemas.openxmlformats.org/officeDocument/2006/relationships" type="rect" r:blip="">
+            <dgm:adjLst/>
+          </dgm:shape>
+          <dgm:presOf axis="self" ptType="node"/>
+          <dgm:constrLst>
+            <dgm:constr type="lMarg" refType="h" fact="0.3"/>
+            <dgm:constr type="rMarg" refType="h" fact="0.3"/>
+            <dgm:constr type="tMarg" refType="h" fact="0.3"/>
+            <dgm:constr type="bMarg" refType="h" fact="0.3"/>
+          </dgm:constrLst>
+          <dgm:ruleLst>
+            <dgm:rule type="primFontSz" val="14" fact="NaN" max="NaN"/>
+            <dgm:rule type="h" val="INF" fact="NaN" max="NaN"/>
+          </dgm:ruleLst>
+        </dgm:layoutNode>
+        <dgm:choose name="Name12">
+          <dgm:if name="Name13" axis="ch" ptType="node" func="cnt" op="gte" val="1">
+            <dgm:layoutNode name="desTx" styleLbl="revTx">
+              <dgm:varLst/>
+              <dgm:alg type="tx">
+                <dgm:param type="txAnchorVertCh" val="mid"/>
+                <dgm:param type="parTxLTRAlign" val="l"/>
+                <dgm:param type="shpTxLTRAlignCh" val="l"/>
+                <dgm:param type="parTxRTLAlign" val="r"/>
+                <dgm:param type="shpTxRTLAlignCh" val="r"/>
+                <dgm:param type="stBulletLvl" val="0"/>
+              </dgm:alg>
+              <dgm:shape xmlns:r="http://schemas.openxmlformats.org/officeDocument/2006/relationships" type="rect" r:blip="">
+                <dgm:adjLst/>
+              </dgm:shape>
+              <dgm:presOf axis="des" ptType="node"/>
+              <dgm:constrLst>
+                <dgm:constr type="primFontSz" val="18"/>
+                <dgm:constr type="secFontSz" refType="primFontSz"/>
+                <dgm:constr type="lMarg" refType="h" fact="0.3"/>
+                <dgm:constr type="rMarg" refType="h" fact="0.3"/>
+                <dgm:constr type="tMarg" refType="h" fact="0.3"/>
+                <dgm:constr type="bMarg" refType="h" fact="0.3"/>
+              </dgm:constrLst>
+              <dgm:ruleLst>
+                <dgm:rule type="primFontSz" val="11" fact="NaN" max="NaN"/>
+              </dgm:ruleLst>
+            </dgm:layoutNode>
+          </dgm:if>
+          <dgm:else name="Name14"/>
+        </dgm:choose>
+      </dgm:layoutNode>
+      <dgm:forEach name="Name15" axis="followSib" ptType="sibTrans" cnt="1">
+        <dgm:layoutNode name="sibTrans">
+          <dgm:alg type="sp"/>
+          <dgm:shape xmlns:r="http://schemas.openxmlformats.org/officeDocument/2006/relationships" r:blip="">
+            <dgm:adjLst/>
+          </dgm:shape>
+          <dgm:presOf axis="self"/>
+          <dgm:constrLst/>
+          <dgm:ruleLst/>
+        </dgm:layoutNode>
+      </dgm:forEach>
+    </dgm:forEach>
+  </dgm:layoutNode>
+  <dgm:extLst>
+    <a:ext uri="{68A01E43-0DF5-4B5B-8FA6-DAF915123BFB}">
+      <dgm1612:lstStyle xmlns:dgm1612="http://schemas.microsoft.com/office/drawing/2016/12/diagram">
+        <a:lvl1pPr>
+          <a:lnSpc>
+            <a:spcPct val="100000"/>
+          </a:lnSpc>
+        </a:lvl1pPr>
+        <a:lvl2pPr>
+          <a:lnSpc>
+            <a:spcPct val="100000"/>
+          </a:lnSpc>
+        </a:lvl2pPr>
+      </dgm1612:lstStyle>
+    </a:ext>
+  </dgm:extLst>
+</dgm:layoutDef>
+</file>
+
+<file path=ppt/diagrams/quickStyle1.xml><?xml version="1.0" encoding="utf-8"?>
+<dgm:styleDef xmlns:dgm="http://schemas.openxmlformats.org/drawingml/2006/diagram" xmlns:a="http://schemas.openxmlformats.org/drawingml/2006/main" uniqueId="urn:microsoft.com/office/officeart/2005/8/quickstyle/simple1">
+  <dgm:title val=""/>
+  <dgm:desc val=""/>
+  <dgm:catLst>
+    <dgm:cat type="simple" pri="10100"/>
+  </dgm:catLst>
+  <dgm:scene3d>
+    <a:camera prst="orthographicFront"/>
+    <a:lightRig rig="threePt" dir="t"/>
+  </dgm:scene3d>
+  <dgm:styleLbl name="node0">
+    <dgm:scene3d>
+      <a:camera prst="orthographicFront"/>
+      <a:lightRig rig="threePt" dir="t"/>
+    </dgm:scene3d>
+    <dgm:sp3d/>
+    <dgm:txPr/>
+    <dgm:style>
+      <a:lnRef idx="2">
+        <a:scrgbClr r="0" g="0" b="0"/>
+      </a:lnRef>
+      <a:fillRef idx="1">
+        <a:scrgbClr r="0" g="0" b="0"/>
+      </a:fillRef>
+      <a:effectRef idx="0">
+        <a:scrgbClr r="0" g="0" b="0"/>
+      </a:effectRef>
+      <a:fontRef idx="minor">
+        <a:schemeClr val="lt1"/>
+      </a:fontRef>
+    </dgm:style>
+  </dgm:styleLbl>
+  <dgm:styleLbl name="lnNode1">
+    <dgm:scene3d>
+      <a:camera prst="orthographicFront"/>
+      <a:lightRig rig="threePt" dir="t"/>
+    </dgm:scene3d>
+    <dgm:sp3d/>
+    <dgm:txPr/>
+    <dgm:style>
+      <a:lnRef idx="2">
+        <a:scrgbClr r="0" g="0" b="0"/>
+      </a:lnRef>
+      <a:fillRef idx="1">
+        <a:scrgbClr r="0" g="0" b="0"/>
+      </a:fillRef>
+      <a:effectRef idx="0">
+        <a:scrgbClr r="0" g="0" b="0"/>
+      </a:effectRef>
+      <a:fontRef idx="minor">
+        <a:schemeClr val="lt1"/>
+      </a:fontRef>
+    </dgm:style>
+  </dgm:styleLbl>
+  <dgm:styleLbl name="vennNode1">
+    <dgm:scene3d>
+      <a:camera prst="orthographicFront"/>
+      <a:lightRig rig="threePt" dir="t"/>
+    </dgm:scene3d>
+    <dgm:sp3d/>
+    <dgm:txPr/>
+    <dgm:style>
+      <a:lnRef idx="2">
+        <a:scrgbClr r="0" g="0" b="0"/>
+      </a:lnRef>
+      <a:fillRef idx="1">
+        <a:scrgbClr r="0" g="0" b="0"/>
+      </a:fillRef>
+      <a:effectRef idx="0">
+        <a:scrgbClr r="0" g="0" b="0"/>
+      </a:effectRef>
+      <a:fontRef idx="minor">
+        <a:schemeClr val="tx1"/>
+      </a:fontRef>
+    </dgm:style>
+  </dgm:styleLbl>
+  <dgm:styleLbl name="alignNode1">
+    <dgm:scene3d>
+      <a:camera prst="orthographicFront"/>
+      <a:lightRig rig="threePt" dir="t"/>
+    </dgm:scene3d>
+    <dgm:sp3d/>
+    <dgm:txPr/>
+    <dgm:style>
+      <a:lnRef idx="2">
+        <a:scrgbClr r="0" g="0" b="0"/>
+      </a:lnRef>
+      <a:fillRef idx="1">
+        <a:scrgbClr r="0" g="0" b="0"/>
+      </a:fillRef>
+      <a:effectRef idx="0">
+        <a:scrgbClr r="0" g="0" b="0"/>
+      </a:effectRef>
+      <a:fontRef idx="minor">
+        <a:schemeClr val="lt1"/>
+      </a:fontRef>
+    </dgm:style>
+  </dgm:styleLbl>
+  <dgm:styleLbl name="node1">
+    <dgm:scene3d>
+      <a:camera prst="orthographicFront"/>
+      <a:lightRig rig="threePt" dir="t"/>
+    </dgm:scene3d>
+    <dgm:sp3d/>
+    <dgm:txPr/>
+    <dgm:style>
+      <a:lnRef idx="2">
+        <a:scrgbClr r="0" g="0" b="0"/>
+      </a:lnRef>
+      <a:fillRef idx="1">
+        <a:scrgbClr r="0" g="0" b="0"/>
+      </a:fillRef>
+      <a:effectRef idx="0">
+        <a:scrgbClr r="0" g="0" b="0"/>
+      </a:effectRef>
+      <a:fontRef idx="minor">
+        <a:schemeClr val="lt1"/>
+      </a:fontRef>
+    </dgm:style>
+  </dgm:styleLbl>
+  <dgm:styleLbl name="node2">
+    <dgm:scene3d>
+      <a:camera prst="orthographicFront"/>
+      <a:lightRig rig="threePt" dir="t"/>
+    </dgm:scene3d>
+    <dgm:sp3d/>
+    <dgm:txPr/>
+    <dgm:style>
+      <a:lnRef idx="2">
+        <a:scrgbClr r="0" g="0" b="0"/>
+      </a:lnRef>
+      <a:fillRef idx="1">
+        <a:scrgbClr r="0" g="0" b="0"/>
+      </a:fillRef>
+      <a:effectRef idx="0">
+        <a:scrgbClr r="0" g="0" b="0"/>
+      </a:effectRef>
+      <a:fontRef idx="minor">
+        <a:schemeClr val="lt1"/>
+      </a:fontRef>
+    </dgm:style>
+  </dgm:styleLbl>
+  <dgm:styleLbl name="node3">
+    <dgm:scene3d>
+      <a:camera prst="orthographicFront"/>
+      <a:lightRig rig="threePt" dir="t"/>
+    </dgm:scene3d>
+    <dgm:sp3d/>
+    <dgm:txPr/>
+    <dgm:style>
+      <a:lnRef idx="2">
+        <a:scrgbClr r="0" g="0" b="0"/>
+      </a:lnRef>
+      <a:fillRef idx="1">
+        <a:scrgbClr r="0" g="0" b="0"/>
+      </a:fillRef>
+      <a:effectRef idx="0">
+        <a:scrgbClr r="0" g="0" b="0"/>
+      </a:effectRef>
+      <a:fontRef idx="minor">
+        <a:schemeClr val="lt1"/>
+      </a:fontRef>
+    </dgm:style>
+  </dgm:styleLbl>
+  <dgm:styleLbl name="node4">
+    <dgm:scene3d>
+      <a:camera prst="orthographicFront"/>
+      <a:lightRig rig="threePt" dir="t"/>
+    </dgm:scene3d>
+    <dgm:sp3d/>
+    <dgm:txPr/>
+    <dgm:style>
+      <a:lnRef idx="2">
+        <a:scrgbClr r="0" g="0" b="0"/>
+      </a:lnRef>
+      <a:fillRef idx="1">
+        <a:scrgbClr r="0" g="0" b="0"/>
+      </a:fillRef>
+      <a:effectRef idx="0">
+        <a:scrgbClr r="0" g="0" b="0"/>
+      </a:effectRef>
+      <a:fontRef idx="minor">
+        <a:schemeClr val="lt1"/>
+      </a:fontRef>
+    </dgm:style>
+  </dgm:styleLbl>
+  <dgm:styleLbl name="fgImgPlace1">
+    <dgm:scene3d>
+      <a:camera prst="orthographicFront"/>
+      <a:lightRig rig="threePt" dir="t"/>
+    </dgm:scene3d>
+    <dgm:sp3d/>
+    <dgm:txPr/>
+    <dgm:style>
+      <a:lnRef idx="2">
+        <a:scrgbClr r="0" g="0" b="0"/>
+      </a:lnRef>
+      <a:fillRef idx="1">
+        <a:scrgbClr r="0" g="0" b="0"/>
+      </a:fillRef>
+      <a:effectRef idx="0">
+        <a:scrgbClr r="0" g="0" b="0"/>
+      </a:effectRef>
+      <a:fontRef idx="minor"/>
+    </dgm:style>
+  </dgm:styleLbl>
+  <dgm:styleLbl name="alignImgPlace1">
+    <dgm:scene3d>
+      <a:camera prst="orthographicFront"/>
+      <a:lightRig rig="threePt" dir="t"/>
+    </dgm:scene3d>
+    <dgm:sp3d/>
+    <dgm:txPr/>
+    <dgm:style>
+      <a:lnRef idx="2">
+        <a:scrgbClr r="0" g="0" b="0"/>
+      </a:lnRef>
+      <a:fillRef idx="1">
+        <a:scrgbClr r="0" g="0" b="0"/>
+      </a:fillRef>
+      <a:effectRef idx="0">
+        <a:scrgbClr r="0" g="0" b="0"/>
+      </a:effectRef>
+      <a:fontRef idx="minor"/>
+    </dgm:style>
+  </dgm:styleLbl>
+  <dgm:styleLbl name="bgImgPlace1">
+    <dgm:scene3d>
+      <a:camera prst="orthographicFront"/>
+      <a:lightRig rig="threePt" dir="t"/>
+    </dgm:scene3d>
+    <dgm:sp3d/>
+    <dgm:txPr/>
+    <dgm:style>
+      <a:lnRef idx="2">
+        <a:scrgbClr r="0" g="0" b="0"/>
+      </a:lnRef>
+      <a:fillRef idx="1">
+        <a:scrgbClr r="0" g="0" b="0"/>
+      </a:fillRef>
+      <a:effectRef idx="0">
+        <a:scrgbClr r="0" g="0" b="0"/>
+      </a:effectRef>
+      <a:fontRef idx="minor"/>
+    </dgm:style>
+  </dgm:styleLbl>
+  <dgm:styleLbl name="sibTrans2D1">
+    <dgm:scene3d>
+      <a:camera prst="orthographicFront"/>
+      <a:lightRig rig="threePt" dir="t"/>
+    </dgm:scene3d>
+    <dgm:sp3d/>
+    <dgm:txPr/>
+    <dgm:style>
+      <a:lnRef idx="0">
+        <a:scrgbClr r="0" g="0" b="0"/>
+      </a:lnRef>
+      <a:fillRef idx="1">
+        <a:scrgbClr r="0" g="0" b="0"/>
+      </a:fillRef>
+      <a:effectRef idx="0">
+        <a:scrgbClr r="0" g="0" b="0"/>
+      </a:effectRef>
+      <a:fontRef idx="minor">
+        <a:schemeClr val="lt1"/>
+      </a:fontRef>
+    </dgm:style>
+  </dgm:styleLbl>
+  <dgm:styleLbl name="fgSibTrans2D1">
+    <dgm:scene3d>
+      <a:camera prst="orthographicFront"/>
+      <a:lightRig rig="threePt" dir="t"/>
+    </dgm:scene3d>
+    <dgm:sp3d/>
+    <dgm:txPr/>
+    <dgm:style>
+      <a:lnRef idx="0">
+        <a:scrgbClr r="0" g="0" b="0"/>
+      </a:lnRef>
+      <a:fillRef idx="1">
+        <a:scrgbClr r="0" g="0" b="0"/>
+      </a:fillRef>
+      <a:effectRef idx="0">
+        <a:scrgbClr r="0" g="0" b="0"/>
+      </a:effectRef>
+      <a:fontRef idx="minor">
+        <a:schemeClr val="lt1"/>
+      </a:fontRef>
+    </dgm:style>
+  </dgm:styleLbl>
+  <dgm:styleLbl name="bgSibTrans2D1">
+    <dgm:scene3d>
+      <a:camera prst="orthographicFront"/>
+      <a:lightRig rig="threePt" dir="t"/>
+    </dgm:scene3d>
+    <dgm:sp3d/>
+    <dgm:txPr/>
+    <dgm:style>
+      <a:lnRef idx="0">
+        <a:scrgbClr r="0" g="0" b="0"/>
+      </a:lnRef>
+      <a:fillRef idx="1">
+        <a:scrgbClr r="0" g="0" b="0"/>
+      </a:fillRef>
+      <a:effectRef idx="0">
+        <a:scrgbClr r="0" g="0" b="0"/>
+      </a:effectRef>
+      <a:fontRef idx="minor">
+        <a:schemeClr val="lt1"/>
+      </a:fontRef>
+    </dgm:style>
+  </dgm:styleLbl>
+  <dgm:styleLbl name="sibTrans1D1">
+    <dgm:scene3d>
+      <a:camera prst="orthographicFront"/>
+      <a:lightRig rig="threePt" dir="t"/>
+    </dgm:scene3d>
+    <dgm:sp3d/>
+    <dgm:txPr/>
+    <dgm:style>
+      <a:lnRef idx="1">
+        <a:scrgbClr r="0" g="0" b="0"/>
+      </a:lnRef>
+      <a:fillRef idx="0">
+        <a:scrgbClr r="0" g="0" b="0"/>
+      </a:fillRef>
+      <a:effectRef idx="0">
+        <a:scrgbClr r="0" g="0" b="0"/>
+      </a:effectRef>
+      <a:fontRef idx="minor"/>
+    </dgm:style>
+  </dgm:styleLbl>
+  <dgm:styleLbl name="callout">
+    <dgm:scene3d>
+      <a:camera prst="orthographicFront"/>
+      <a:lightRig rig="threePt" dir="t"/>
+    </dgm:scene3d>
+    <dgm:sp3d/>
+    <dgm:txPr/>
+    <dgm:style>
+      <a:lnRef idx="2">
+        <a:scrgbClr r="0" g="0" b="0"/>
+      </a:lnRef>
+      <a:fillRef idx="1">
+        <a:scrgbClr r="0" g="0" b="0"/>
+      </a:fillRef>
+      <a:effectRef idx="0">
+        <a:scrgbClr r="0" g="0" b="0"/>
+      </a:effectRef>
+      <a:fontRef idx="minor"/>
+    </dgm:style>
+  </dgm:styleLbl>
+  <dgm:styleLbl name="asst0">
+    <dgm:scene3d>
+      <a:camera prst="orthographicFront"/>
+      <a:lightRig rig="threePt" dir="t"/>
+    </dgm:scene3d>
+    <dgm:sp3d/>
+    <dgm:txPr/>
+    <dgm:style>
+      <a:lnRef idx="2">
+        <a:scrgbClr r="0" g="0" b="0"/>
+      </a:lnRef>
+      <a:fillRef idx="1">
+        <a:scrgbClr r="0" g="0" b="0"/>
+      </a:fillRef>
+      <a:effectRef idx="0">
+        <a:scrgbClr r="0" g="0" b="0"/>
+      </a:effectRef>
+      <a:fontRef idx="minor">
+        <a:schemeClr val="lt1"/>
+      </a:fontRef>
+    </dgm:style>
+  </dgm:styleLbl>
+  <dgm:styleLbl name="asst1">
+    <dgm:scene3d>
+      <a:camera prst="orthographicFront"/>
+      <a:lightRig rig="threePt" dir="t"/>
+    </dgm:scene3d>
+    <dgm:sp3d/>
+    <dgm:txPr/>
+    <dgm:style>
+      <a:lnRef idx="2">
+        <a:scrgbClr r="0" g="0" b="0"/>
+      </a:lnRef>
+      <a:fillRef idx="1">
+        <a:scrgbClr r="0" g="0" b="0"/>
+      </a:fillRef>
+      <a:effectRef idx="0">
+        <a:scrgbClr r="0" g="0" b="0"/>
+      </a:effectRef>
+      <a:fontRef idx="minor">
+        <a:schemeClr val="lt1"/>
+      </a:fontRef>
+    </dgm:style>
+  </dgm:styleLbl>
+  <dgm:styleLbl name="asst2">
+    <dgm:scene3d>
+      <a:camera prst="orthographicFront"/>
+      <a:lightRig rig="threePt" dir="t"/>
+    </dgm:scene3d>
+    <dgm:sp3d/>
+    <dgm:txPr/>
+    <dgm:style>
+      <a:lnRef idx="2">
+        <a:scrgbClr r="0" g="0" b="0"/>
+      </a:lnRef>
+      <a:fillRef idx="1">
+        <a:scrgbClr r="0" g="0" b="0"/>
+      </a:fillRef>
+      <a:effectRef idx="0">
+        <a:scrgbClr r="0" g="0" b="0"/>
+      </a:effectRef>
+      <a:fontRef idx="minor">
+        <a:schemeClr val="lt1"/>
+      </a:fontRef>
+    </dgm:style>
+  </dgm:styleLbl>
+  <dgm:styleLbl name="asst3">
+    <dgm:scene3d>
+      <a:camera prst="orthographicFront"/>
+      <a:lightRig rig="threePt" dir="t"/>
+    </dgm:scene3d>
+    <dgm:sp3d/>
+    <dgm:txPr/>
+    <dgm:style>
+      <a:lnRef idx="2">
+        <a:scrgbClr r="0" g="0" b="0"/>
+      </a:lnRef>
+      <a:fillRef idx="1">
+        <a:scrgbClr r="0" g="0" b="0"/>
+      </a:fillRef>
+      <a:effectRef idx="0">
+        <a:scrgbClr r="0" g="0" b="0"/>
+      </a:effectRef>
+      <a:fontRef idx="minor">
+        <a:schemeClr val="lt1"/>
+      </a:fontRef>
+    </dgm:style>
+  </dgm:styleLbl>
+  <dgm:styleLbl name="asst4">
+    <dgm:scene3d>
+      <a:camera prst="orthographicFront"/>
+      <a:lightRig rig="threePt" dir="t"/>
+    </dgm:scene3d>
+    <dgm:sp3d/>
+    <dgm:txPr/>
+    <dgm:style>
+      <a:lnRef idx="2">
+        <a:scrgbClr r="0" g="0" b="0"/>
+      </a:lnRef>
+      <a:fillRef idx="1">
+        <a:scrgbClr r="0" g="0" b="0"/>
+      </a:fillRef>
+      <a:effectRef idx="0">
+        <a:scrgbClr r="0" g="0" b="0"/>
+      </a:effectRef>
+      <a:fontRef idx="minor">
+        <a:schemeClr val="lt1"/>
+      </a:fontRef>
+    </dgm:style>
+  </dgm:styleLbl>
+  <dgm:styleLbl name="parChTrans2D1">
+    <dgm:scene3d>
+      <a:camera prst="orthographicFront"/>
+      <a:lightRig rig="threePt" dir="t"/>
+    </dgm:scene3d>
+    <dgm:sp3d/>
+    <dgm:txPr/>
+    <dgm:style>
+      <a:lnRef idx="2">
+        <a:scrgbClr r="0" g="0" b="0"/>
+      </a:lnRef>
+      <a:fillRef idx="1">
+        <a:scrgbClr r="0" g="0" b="0"/>
+      </a:fillRef>
+      <a:effectRef idx="0">
+        <a:scrgbClr r="0" g="0" b="0"/>
+      </a:effectRef>
+      <a:fontRef idx="minor">
+        <a:schemeClr val="lt1"/>
+      </a:fontRef>
+    </dgm:style>
+  </dgm:styleLbl>
+  <dgm:styleLbl name="parChTrans2D2">
+    <dgm:scene3d>
+      <a:camera prst="orthographicFront"/>
+      <a:lightRig rig="threePt" dir="t"/>
+    </dgm:scene3d>
+    <dgm:sp3d/>
+    <dgm:txPr/>
+    <dgm:style>
+      <a:lnRef idx="2">
+        <a:scrgbClr r="0" g="0" b="0"/>
+      </a:lnRef>
+      <a:fillRef idx="1">
+        <a:scrgbClr r="0" g="0" b="0"/>
+      </a:fillRef>
+      <a:effectRef idx="0">
+        <a:scrgbClr r="0" g="0" b="0"/>
+      </a:effectRef>
+      <a:fontRef idx="minor">
+        <a:schemeClr val="lt1"/>
+      </a:fontRef>
+    </dgm:style>
+  </dgm:styleLbl>
+  <dgm:styleLbl name="parChTrans2D3">
+    <dgm:scene3d>
+      <a:camera prst="orthographicFront"/>
+      <a:lightRig rig="threePt" dir="t"/>
+    </dgm:scene3d>
+    <dgm:sp3d/>
+    <dgm:txPr/>
+    <dgm:style>
+      <a:lnRef idx="2">
+        <a:scrgbClr r="0" g="0" b="0"/>
+      </a:lnRef>
+      <a:fillRef idx="1">
+        <a:scrgbClr r="0" g="0" b="0"/>
+      </a:fillRef>
+      <a:effectRef idx="0">
+        <a:scrgbClr r="0" g="0" b="0"/>
+      </a:effectRef>
+      <a:fontRef idx="minor">
+        <a:schemeClr val="lt1"/>
+      </a:fontRef>
+    </dgm:style>
+  </dgm:styleLbl>
+  <dgm:styleLbl name="parChTrans2D4">
+    <dgm:scene3d>
+      <a:camera prst="orthographicFront"/>
+      <a:lightRig rig="threePt" dir="t"/>
+    </dgm:scene3d>
+    <dgm:sp3d/>
+    <dgm:txPr/>
+    <dgm:style>
+      <a:lnRef idx="2">
+        <a:scrgbClr r="0" g="0" b="0"/>
+      </a:lnRef>
+      <a:fillRef idx="1">
+        <a:scrgbClr r="0" g="0" b="0"/>
+      </a:fillRef>
+      <a:effectRef idx="0">
+        <a:scrgbClr r="0" g="0" b="0"/>
+      </a:effectRef>
+      <a:fontRef idx="minor">
+        <a:schemeClr val="lt1"/>
+      </a:fontRef>
+    </dgm:style>
+  </dgm:styleLbl>
+  <dgm:styleLbl name="parChTrans1D1">
+    <dgm:scene3d>
+      <a:camera prst="orthographicFront"/>
+      <a:lightRig rig="threePt" dir="t"/>
+    </dgm:scene3d>
+    <dgm:sp3d/>
+    <dgm:txPr/>
+    <dgm:style>
+      <a:lnRef idx="2">
+        <a:scrgbClr r="0" g="0" b="0"/>
+      </a:lnRef>
+      <a:fillRef idx="0">
+        <a:scrgbClr r="0" g="0" b="0"/>
+      </a:fillRef>
+      <a:effectRef idx="0">
+        <a:scrgbClr r="0" g="0" b="0"/>
+      </a:effectRef>
+      <a:fontRef idx="minor"/>
+    </dgm:style>
+  </dgm:styleLbl>
+  <dgm:styleLbl name="parChTrans1D2">
+    <dgm:scene3d>
+      <a:camera prst="orthographicFront"/>
+      <a:lightRig rig="threePt" dir="t"/>
+    </dgm:scene3d>
+    <dgm:sp3d/>
+    <dgm:txPr/>
+    <dgm:style>
+      <a:lnRef idx="2">
+        <a:scrgbClr r="0" g="0" b="0"/>
+      </a:lnRef>
+      <a:fillRef idx="0">
+        <a:scrgbClr r="0" g="0" b="0"/>
+      </a:fillRef>
+      <a:effectRef idx="0">
+        <a:scrgbClr r="0" g="0" b="0"/>
+      </a:effectRef>
+      <a:fontRef idx="minor"/>
+    </dgm:style>
+  </dgm:styleLbl>
+  <dgm:styleLbl name="parChTrans1D3">
+    <dgm:scene3d>
+      <a:camera prst="orthographicFront"/>
+      <a:lightRig rig="threePt" dir="t"/>
+    </dgm:scene3d>
+    <dgm:sp3d/>
+    <dgm:txPr/>
+    <dgm:style>
+      <a:lnRef idx="2">
+        <a:scrgbClr r="0" g="0" b="0"/>
+      </a:lnRef>
+      <a:fillRef idx="0">
+        <a:scrgbClr r="0" g="0" b="0"/>
+      </a:fillRef>
+      <a:effectRef idx="0">
+        <a:scrgbClr r="0" g="0" b="0"/>
+      </a:effectRef>
+      <a:fontRef idx="minor"/>
+    </dgm:style>
+  </dgm:styleLbl>
+  <dgm:styleLbl name="parChTrans1D4">
+    <dgm:scene3d>
+      <a:camera prst="orthographicFront"/>
+      <a:lightRig rig="threePt" dir="t"/>
+    </dgm:scene3d>
+    <dgm:sp3d/>
+    <dgm:txPr/>
+    <dgm:style>
+      <a:lnRef idx="2">
+        <a:scrgbClr r="0" g="0" b="0"/>
+      </a:lnRef>
+      <a:fillRef idx="0">
+        <a:scrgbClr r="0" g="0" b="0"/>
+      </a:fillRef>
+      <a:effectRef idx="0">
+        <a:scrgbClr r="0" g="0" b="0"/>
+      </a:effectRef>
+      <a:fontRef idx="minor"/>
+    </dgm:style>
+  </dgm:styleLbl>
+  <dgm:styleLbl name="fgAcc1">
+    <dgm:scene3d>
+      <a:camera prst="orthographicFront"/>
+      <a:lightRig rig="threePt" dir="t"/>
+    </dgm:scene3d>
+    <dgm:sp3d/>
+    <dgm:txPr/>
+    <dgm:style>
+      <a:lnRef idx="2">
+        <a:scrgbClr r="0" g="0" b="0"/>
+      </a:lnRef>
+      <a:fillRef idx="1">
+        <a:scrgbClr r="0" g="0" b="0"/>
+      </a:fillRef>
+      <a:effectRef idx="0">
+        <a:scrgbClr r="0" g="0" b="0"/>
+      </a:effectRef>
+      <a:fontRef idx="minor"/>
+    </dgm:style>
+  </dgm:styleLbl>
+  <dgm:styleLbl name="conFgAcc1">
+    <dgm:scene3d>
+      <a:camera prst="orthographicFront"/>
+      <a:lightRig rig="threePt" dir="t"/>
+    </dgm:scene3d>
+    <dgm:sp3d/>
+    <dgm:txPr/>
+    <dgm:style>
+      <a:lnRef idx="2">
+        <a:scrgbClr r="0" g="0" b="0"/>
+      </a:lnRef>
+      <a:fillRef idx="1">
+        <a:scrgbClr r="0" g="0" b="0"/>
+      </a:fillRef>
+      <a:effectRef idx="0">
+        <a:scrgbClr r="0" g="0" b="0"/>
+      </a:effectRef>
+      <a:fontRef idx="minor"/>
+    </dgm:style>
+  </dgm:styleLbl>
+  <dgm:styleLbl name="alignAcc1">
+    <dgm:scene3d>
+      <a:camera prst="orthographicFront"/>
+      <a:lightRig rig="threePt" dir="t"/>
+    </dgm:scene3d>
+    <dgm:sp3d/>
+    <dgm:txPr/>
+    <dgm:style>
+      <a:lnRef idx="2">
+        <a:scrgbClr r="0" g="0" b="0"/>
+      </a:lnRef>
+      <a:fillRef idx="1">
+        <a:scrgbClr r="0" g="0" b="0"/>
+      </a:fillRef>
+      <a:effectRef idx="0">
+        <a:scrgbClr r="0" g="0" b="0"/>
+      </a:effectRef>
+      <a:fontRef idx="minor"/>
+    </dgm:style>
+  </dgm:styleLbl>
+  <dgm:styleLbl name="trAlignAcc1">
+    <dgm:scene3d>
+      <a:camera prst="orthographicFront"/>
+      <a:lightRig rig="threePt" dir="t"/>
+    </dgm:scene3d>
+    <dgm:sp3d/>
+    <dgm:txPr/>
+    <dgm:style>
+      <a:lnRef idx="1">
+        <a:scrgbClr r="0" g="0" b="0"/>
+      </a:lnRef>
+      <a:fillRef idx="1">
+        <a:scrgbClr r="0" g="0" b="0"/>
+      </a:fillRef>
+      <a:effectRef idx="0">
+        <a:scrgbClr r="0" g="0" b="0"/>
+      </a:effectRef>
+      <a:fontRef idx="minor"/>
+    </dgm:style>
+  </dgm:styleLbl>
+  <dgm:styleLbl name="bgAcc1">
+    <dgm:scene3d>
+      <a:camera prst="orthographicFront"/>
+      <a:lightRig rig="threePt" dir="t"/>
+    </dgm:scene3d>
+    <dgm:sp3d/>
+    <dgm:txPr/>
+    <dgm:style>
+      <a:lnRef idx="2">
+        <a:scrgbClr r="0" g="0" b="0"/>
+      </a:lnRef>
+      <a:fillRef idx="1">
+        <a:scrgbClr r="0" g="0" b="0"/>
+      </a:fillRef>
+      <a:effectRef idx="0">
+        <a:scrgbClr r="0" g="0" b="0"/>
+      </a:effectRef>
+      <a:fontRef idx="minor"/>
+    </dgm:style>
+  </dgm:styleLbl>
+  <dgm:styleLbl name="solidFgAcc1">
+    <dgm:scene3d>
+      <a:camera prst="orthographicFront"/>
+      <a:lightRig rig="threePt" dir="t"/>
+    </dgm:scene3d>
+    <dgm:sp3d/>
+    <dgm:txPr/>
+    <dgm:style>
+      <a:lnRef idx="2">
+        <a:scrgbClr r="0" g="0" b="0"/>
+      </a:lnRef>
+      <a:fillRef idx="1">
+        <a:scrgbClr r="0" g="0" b="0"/>
+      </a:fillRef>
+      <a:effectRef idx="0">
+        <a:scrgbClr r="0" g="0" b="0"/>
+      </a:effectRef>
+      <a:fontRef idx="minor"/>
+    </dgm:style>
+  </dgm:styleLbl>
+  <dgm:styleLbl name="solidAlignAcc1">
+    <dgm:scene3d>
+      <a:camera prst="orthographicFront"/>
+      <a:lightRig rig="threePt" dir="t"/>
+    </dgm:scene3d>
+    <dgm:sp3d/>
+    <dgm:txPr/>
+    <dgm:style>
+      <a:lnRef idx="2">
+        <a:scrgbClr r="0" g="0" b="0"/>
+      </a:lnRef>
+      <a:fillRef idx="1">
+        <a:scrgbClr r="0" g="0" b="0"/>
+      </a:fillRef>
+      <a:effectRef idx="0">
+        <a:scrgbClr r="0" g="0" b="0"/>
+      </a:effectRef>
+      <a:fontRef idx="minor"/>
+    </dgm:style>
+  </dgm:styleLbl>
+  <dgm:styleLbl name="solidBgAcc1">
+    <dgm:scene3d>
+      <a:camera prst="orthographicFront"/>
+      <a:lightRig rig="threePt" dir="t"/>
+    </dgm:scene3d>
+    <dgm:sp3d/>
+    <dgm:txPr/>
+    <dgm:style>
+      <a:lnRef idx="2">
+        <a:scrgbClr r="0" g="0" b="0"/>
+      </a:lnRef>
+      <a:fillRef idx="1">
+        <a:scrgbClr r="0" g="0" b="0"/>
+      </a:fillRef>
+      <a:effectRef idx="0">
+        <a:scrgbClr r="0" g="0" b="0"/>
+      </a:effectRef>
+      <a:fontRef idx="minor"/>
+    </dgm:style>
+  </dgm:styleLbl>
+  <dgm:styleLbl name="fgAccFollowNode1">
+    <dgm:scene3d>
+      <a:camera prst="orthographicFront"/>
+      <a:lightRig rig="threePt" dir="t"/>
+    </dgm:scene3d>
+    <dgm:sp3d/>
+    <dgm:txPr/>
+    <dgm:style>
+      <a:lnRef idx="2">
+        <a:scrgbClr r="0" g="0" b="0"/>
+      </a:lnRef>
+      <a:fillRef idx="1">
+        <a:scrgbClr r="0" g="0" b="0"/>
+      </a:fillRef>
+      <a:effectRef idx="0">
+        <a:scrgbClr r="0" g="0" b="0"/>
+      </a:effectRef>
+      <a:fontRef idx="minor"/>
+    </dgm:style>
+  </dgm:styleLbl>
+  <dgm:styleLbl name="alignAccFollowNode1">
+    <dgm:scene3d>
+      <a:camera prst="orthographicFront"/>
+      <a:lightRig rig="threePt" dir="t"/>
+    </dgm:scene3d>
+    <dgm:sp3d/>
+    <dgm:txPr/>
+    <dgm:style>
+      <a:lnRef idx="2">
+        <a:scrgbClr r="0" g="0" b="0"/>
+      </a:lnRef>
+      <a:fillRef idx="1">
+        <a:scrgbClr r="0" g="0" b="0"/>
+      </a:fillRef>
+      <a:effectRef idx="0">
+        <a:scrgbClr r="0" g="0" b="0"/>
+      </a:effectRef>
+      <a:fontRef idx="minor"/>
+    </dgm:style>
+  </dgm:styleLbl>
+  <dgm:styleLbl name="bgAccFollowNode1">
+    <dgm:scene3d>
+      <a:camera prst="orthographicFront"/>
+      <a:lightRig rig="threePt" dir="t"/>
+    </dgm:scene3d>
+    <dgm:sp3d/>
+    <dgm:txPr/>
+    <dgm:style>
+      <a:lnRef idx="2">
+        <a:scrgbClr r="0" g="0" b="0"/>
+      </a:lnRef>
+      <a:fillRef idx="1">
+        <a:scrgbClr r="0" g="0" b="0"/>
+      </a:fillRef>
+      <a:effectRef idx="0">
+        <a:scrgbClr r="0" g="0" b="0"/>
+      </a:effectRef>
+      <a:fontRef idx="minor"/>
+    </dgm:style>
+  </dgm:styleLbl>
+  <dgm:styleLbl name="fgAcc0">
+    <dgm:scene3d>
+      <a:camera prst="orthographicFront"/>
+      <a:lightRig rig="threePt" dir="t"/>
+    </dgm:scene3d>
+    <dgm:sp3d/>
+    <dgm:txPr/>
+    <dgm:style>
+      <a:lnRef idx="2">
+        <a:scrgbClr r="0" g="0" b="0"/>
+      </a:lnRef>
+      <a:fillRef idx="1">
+        <a:scrgbClr r="0" g="0" b="0"/>
+      </a:fillRef>
+      <a:effectRef idx="0">
+        <a:scrgbClr r="0" g="0" b="0"/>
+      </a:effectRef>
+      <a:fontRef idx="minor"/>
+    </dgm:style>
+  </dgm:styleLbl>
+  <dgm:styleLbl name="fgAcc2">
+    <dgm:scene3d>
+      <a:camera prst="orthographicFront"/>
+      <a:lightRig rig="threePt" dir="t"/>
+    </dgm:scene3d>
+    <dgm:sp3d/>
+    <dgm:txPr/>
+    <dgm:style>
+      <a:lnRef idx="2">
+        <a:scrgbClr r="0" g="0" b="0"/>
+      </a:lnRef>
+      <a:fillRef idx="1">
+        <a:scrgbClr r="0" g="0" b="0"/>
+      </a:fillRef>
+      <a:effectRef idx="0">
+        <a:scrgbClr r="0" g="0" b="0"/>
+      </a:effectRef>
+      <a:fontRef idx="minor"/>
+    </dgm:style>
+  </dgm:styleLbl>
+  <dgm:styleLbl name="fgAcc3">
+    <dgm:scene3d>
+      <a:camera prst="orthographicFront"/>
+      <a:lightRig rig="threePt" dir="t"/>
+    </dgm:scene3d>
+    <dgm:sp3d/>
+    <dgm:txPr/>
+    <dgm:style>
+      <a:lnRef idx="2">
+        <a:scrgbClr r="0" g="0" b="0"/>
+      </a:lnRef>
+      <a:fillRef idx="1">
+        <a:scrgbClr r="0" g="0" b="0"/>
+      </a:fillRef>
+      <a:effectRef idx="0">
+        <a:scrgbClr r="0" g="0" b="0"/>
+      </a:effectRef>
+      <a:fontRef idx="minor"/>
+    </dgm:style>
+  </dgm:styleLbl>
+  <dgm:styleLbl name="fgAcc4">
+    <dgm:scene3d>
+      <a:camera prst="orthographicFront"/>
+      <a:lightRig rig="threePt" dir="t"/>
+    </dgm:scene3d>
+    <dgm:sp3d/>
+    <dgm:txPr/>
+    <dgm:style>
+      <a:lnRef idx="2">
+        <a:scrgbClr r="0" g="0" b="0"/>
+      </a:lnRef>
+      <a:fillRef idx="1">
+        <a:scrgbClr r="0" g="0" b="0"/>
+      </a:fillRef>
+      <a:effectRef idx="0">
+        <a:scrgbClr r="0" g="0" b="0"/>
+      </a:effectRef>
+      <a:fontRef idx="minor"/>
+    </dgm:style>
+  </dgm:styleLbl>
+  <dgm:styleLbl name="bgShp">
+    <dgm:scene3d>
+      <a:camera prst="orthographicFront"/>
+      <a:lightRig rig="threePt" dir="t"/>
+    </dgm:scene3d>
+    <dgm:sp3d/>
+    <dgm:txPr/>
+    <dgm:style>
+      <a:lnRef idx="0">
+        <a:scrgbClr r="0" g="0" b="0"/>
+      </a:lnRef>
+      <a:fillRef idx="1">
+        <a:scrgbClr r="0" g="0" b="0"/>
+      </a:fillRef>
+      <a:effectRef idx="0">
+        <a:scrgbClr r="0" g="0" b="0"/>
+      </a:effectRef>
+      <a:fontRef idx="minor"/>
+    </dgm:style>
+  </dgm:styleLbl>
+  <dgm:styleLbl name="dkBgShp">
+    <dgm:scene3d>
+      <a:camera prst="orthographicFront"/>
+      <a:lightRig rig="threePt" dir="t"/>
+    </dgm:scene3d>
+    <dgm:sp3d/>
+    <dgm:txPr/>
+    <dgm:style>
+      <a:lnRef idx="0">
+        <a:scrgbClr r="0" g="0" b="0"/>
+      </a:lnRef>
+      <a:fillRef idx="1">
+        <a:scrgbClr r="0" g="0" b="0"/>
+      </a:fillRef>
+      <a:effectRef idx="0">
+        <a:scrgbClr r="0" g="0" b="0"/>
+      </a:effectRef>
+      <a:fontRef idx="minor"/>
+    </dgm:style>
+  </dgm:styleLbl>
+  <dgm:styleLbl name="trBgShp">
+    <dgm:scene3d>
+      <a:camera prst="orthographicFront"/>
+      <a:lightRig rig="threePt" dir="t"/>
+    </dgm:scene3d>
+    <dgm:sp3d/>
+    <dgm:txPr/>
+    <dgm:style>
+      <a:lnRef idx="0">
+        <a:scrgbClr r="0" g="0" b="0"/>
+      </a:lnRef>
+      <a:fillRef idx="1">
+        <a:scrgbClr r="0" g="0" b="0"/>
+      </a:fillRef>
+      <a:effectRef idx="0">
+        <a:scrgbClr r="0" g="0" b="0"/>
+      </a:effectRef>
+      <a:fontRef idx="minor"/>
+    </dgm:style>
+  </dgm:styleLbl>
+  <dgm:styleLbl name="fgShp">
+    <dgm:scene3d>
+      <a:camera prst="orthographicFront"/>
+      <a:lightRig rig="threePt" dir="t"/>
+    </dgm:scene3d>
+    <dgm:sp3d/>
+    <dgm:txPr/>
+    <dgm:style>
+      <a:lnRef idx="2">
+        <a:scrgbClr r="0" g="0" b="0"/>
+      </a:lnRef>
+      <a:fillRef idx="1">
+        <a:scrgbClr r="0" g="0" b="0"/>
+      </a:fillRef>
+      <a:effectRef idx="0">
+        <a:scrgbClr r="0" g="0" b="0"/>
+      </a:effectRef>
+      <a:fontRef idx="minor"/>
+    </dgm:style>
+  </dgm:styleLbl>
+  <dgm:styleLbl name="revTx">
+    <dgm:scene3d>
+      <a:camera prst="orthographicFront"/>
+      <a:lightRig rig="threePt" dir="t"/>
+    </dgm:scene3d>
+    <dgm:sp3d/>
+    <dgm:txPr/>
+    <dgm:style>
+      <a:lnRef idx="0">
+        <a:scrgbClr r="0" g="0" b="0"/>
+      </a:lnRef>
+      <a:fillRef idx="0">
+        <a:scrgbClr r="0" g="0" b="0"/>
+      </a:fillRef>
+      <a:effectRef idx="0">
+        <a:scrgbClr r="0" g="0" b="0"/>
+      </a:effectRef>
+      <a:fontRef idx="minor"/>
+    </dgm:style>
+  </dgm:styleLbl>
+</dgm:styleDef>
 </file>
 
 <file path=ppt/slideLayouts/slideLayout1.xml><?xml version="1.0" encoding="utf-8"?>
@@ -298,7 +3348,7 @@
           <a:p>
             <a:fld id="{E8911957-E561-4BF5-98AE-BB567BC01949}" type="datetimeFigureOut">
               <a:rPr lang="en-ZA" smtClean="0"/>
-              <a:t>2024/11/02</a:t>
+              <a:t>2024/11/04</a:t>
             </a:fld>
             <a:endParaRPr lang="en-ZA"/>
           </a:p>
@@ -573,7 +3623,7 @@
           <a:p>
             <a:fld id="{E8911957-E561-4BF5-98AE-BB567BC01949}" type="datetimeFigureOut">
               <a:rPr lang="en-ZA" smtClean="0"/>
-              <a:t>2024/11/02</a:t>
+              <a:t>2024/11/04</a:t>
             </a:fld>
             <a:endParaRPr lang="en-ZA"/>
           </a:p>
@@ -767,7 +3817,7 @@
           <a:p>
             <a:fld id="{E8911957-E561-4BF5-98AE-BB567BC01949}" type="datetimeFigureOut">
               <a:rPr lang="en-ZA" smtClean="0"/>
-              <a:t>2024/11/02</a:t>
+              <a:t>2024/11/04</a:t>
             </a:fld>
             <a:endParaRPr lang="en-ZA"/>
           </a:p>
@@ -1040,7 +4090,7 @@
           <a:p>
             <a:fld id="{E8911957-E561-4BF5-98AE-BB567BC01949}" type="datetimeFigureOut">
               <a:rPr lang="en-ZA" smtClean="0"/>
-              <a:t>2024/11/02</a:t>
+              <a:t>2024/11/04</a:t>
             </a:fld>
             <a:endParaRPr lang="en-ZA"/>
           </a:p>
@@ -1381,7 +4431,7 @@
           <a:p>
             <a:fld id="{E8911957-E561-4BF5-98AE-BB567BC01949}" type="datetimeFigureOut">
               <a:rPr lang="en-ZA" smtClean="0"/>
-              <a:t>2024/11/02</a:t>
+              <a:t>2024/11/04</a:t>
             </a:fld>
             <a:endParaRPr lang="en-ZA"/>
           </a:p>
@@ -2004,7 +5054,7 @@
           <a:p>
             <a:fld id="{E8911957-E561-4BF5-98AE-BB567BC01949}" type="datetimeFigureOut">
               <a:rPr lang="en-ZA" smtClean="0"/>
-              <a:t>2024/11/02</a:t>
+              <a:t>2024/11/04</a:t>
             </a:fld>
             <a:endParaRPr lang="en-ZA"/>
           </a:p>
@@ -2864,7 +5914,7 @@
           <a:p>
             <a:fld id="{E8911957-E561-4BF5-98AE-BB567BC01949}" type="datetimeFigureOut">
               <a:rPr lang="en-ZA" smtClean="0"/>
-              <a:t>2024/11/02</a:t>
+              <a:t>2024/11/04</a:t>
             </a:fld>
             <a:endParaRPr lang="en-ZA"/>
           </a:p>
@@ -3034,7 +6084,7 @@
           <a:p>
             <a:fld id="{E8911957-E561-4BF5-98AE-BB567BC01949}" type="datetimeFigureOut">
               <a:rPr lang="en-ZA" smtClean="0"/>
-              <a:t>2024/11/02</a:t>
+              <a:t>2024/11/04</a:t>
             </a:fld>
             <a:endParaRPr lang="en-ZA"/>
           </a:p>
@@ -3214,7 +6264,7 @@
           <a:p>
             <a:fld id="{E8911957-E561-4BF5-98AE-BB567BC01949}" type="datetimeFigureOut">
               <a:rPr lang="en-ZA" smtClean="0"/>
-              <a:t>2024/11/02</a:t>
+              <a:t>2024/11/04</a:t>
             </a:fld>
             <a:endParaRPr lang="en-ZA"/>
           </a:p>
@@ -3384,7 +6434,7 @@
           <a:p>
             <a:fld id="{E8911957-E561-4BF5-98AE-BB567BC01949}" type="datetimeFigureOut">
               <a:rPr lang="en-ZA" smtClean="0"/>
-              <a:t>2024/11/02</a:t>
+              <a:t>2024/11/04</a:t>
             </a:fld>
             <a:endParaRPr lang="en-ZA"/>
           </a:p>
@@ -3631,7 +6681,7 @@
           <a:p>
             <a:fld id="{E8911957-E561-4BF5-98AE-BB567BC01949}" type="datetimeFigureOut">
               <a:rPr lang="en-ZA" smtClean="0"/>
-              <a:t>2024/11/02</a:t>
+              <a:t>2024/11/04</a:t>
             </a:fld>
             <a:endParaRPr lang="en-ZA"/>
           </a:p>
@@ -3923,7 +6973,7 @@
           <a:p>
             <a:fld id="{E8911957-E561-4BF5-98AE-BB567BC01949}" type="datetimeFigureOut">
               <a:rPr lang="en-ZA" smtClean="0"/>
-              <a:t>2024/11/02</a:t>
+              <a:t>2024/11/04</a:t>
             </a:fld>
             <a:endParaRPr lang="en-ZA"/>
           </a:p>
@@ -4367,7 +7417,7 @@
           <a:p>
             <a:fld id="{E8911957-E561-4BF5-98AE-BB567BC01949}" type="datetimeFigureOut">
               <a:rPr lang="en-ZA" smtClean="0"/>
-              <a:t>2024/11/02</a:t>
+              <a:t>2024/11/04</a:t>
             </a:fld>
             <a:endParaRPr lang="en-ZA"/>
           </a:p>
@@ -4485,7 +7535,7 @@
           <a:p>
             <a:fld id="{E8911957-E561-4BF5-98AE-BB567BC01949}" type="datetimeFigureOut">
               <a:rPr lang="en-ZA" smtClean="0"/>
-              <a:t>2024/11/02</a:t>
+              <a:t>2024/11/04</a:t>
             </a:fld>
             <a:endParaRPr lang="en-ZA"/>
           </a:p>
@@ -4580,7 +7630,7 @@
           <a:p>
             <a:fld id="{E8911957-E561-4BF5-98AE-BB567BC01949}" type="datetimeFigureOut">
               <a:rPr lang="en-ZA" smtClean="0"/>
-              <a:t>2024/11/02</a:t>
+              <a:t>2024/11/04</a:t>
             </a:fld>
             <a:endParaRPr lang="en-ZA"/>
           </a:p>
@@ -4859,7 +7909,7 @@
           <a:p>
             <a:fld id="{E8911957-E561-4BF5-98AE-BB567BC01949}" type="datetimeFigureOut">
               <a:rPr lang="en-ZA" smtClean="0"/>
-              <a:t>2024/11/02</a:t>
+              <a:t>2024/11/04</a:t>
             </a:fld>
             <a:endParaRPr lang="en-ZA"/>
           </a:p>
@@ -5134,7 +8184,7 @@
           <a:p>
             <a:fld id="{E8911957-E561-4BF5-98AE-BB567BC01949}" type="datetimeFigureOut">
               <a:rPr lang="en-ZA" smtClean="0"/>
-              <a:t>2024/11/02</a:t>
+              <a:t>2024/11/04</a:t>
             </a:fld>
             <a:endParaRPr lang="en-ZA"/>
           </a:p>
@@ -5563,7 +8613,7 @@
           <a:p>
             <a:fld id="{E8911957-E561-4BF5-98AE-BB567BC01949}" type="datetimeFigureOut">
               <a:rPr lang="en-ZA" smtClean="0"/>
-              <a:t>2024/11/02</a:t>
+              <a:t>2024/11/04</a:t>
             </a:fld>
             <a:endParaRPr lang="en-ZA"/>
           </a:p>
@@ -6299,9 +9349,23 @@
 <file path=ppt/slides/slide3.xml><?xml version="1.0" encoding="utf-8"?>
 <p:sld xmlns:a="http://schemas.openxmlformats.org/drawingml/2006/main" xmlns:r="http://schemas.openxmlformats.org/officeDocument/2006/relationships" xmlns:p="http://schemas.openxmlformats.org/presentationml/2006/main">
   <p:cSld>
+    <p:bg>
+      <p:bgPr>
+        <a:solidFill>
+          <a:schemeClr val="bg1"/>
+        </a:solidFill>
+        <a:effectLst/>
+      </p:bgPr>
+    </p:bg>
     <p:spTree>
       <p:nvGrpSpPr>
-        <p:cNvPr id="1" name=""/>
+        <p:cNvPr id="1" name="">
+          <a:extLst>
+            <a:ext uri="{FF2B5EF4-FFF2-40B4-BE49-F238E27FC236}">
+              <a16:creationId xmlns:a16="http://schemas.microsoft.com/office/drawing/2014/main" id="{6F93B127-5ED5-CF3E-AA21-1956B5B585C2}"/>
+            </a:ext>
+          </a:extLst>
+        </p:cNvPr>
         <p:cNvGrpSpPr/>
         <p:nvPr/>
       </p:nvGrpSpPr>
@@ -6315,10 +9379,70 @@
       </p:grpSpPr>
       <p:sp>
         <p:nvSpPr>
+          <p:cNvPr id="9" name="Rectangle 8">
+            <a:extLst>
+              <a:ext uri="{FF2B5EF4-FFF2-40B4-BE49-F238E27FC236}">
+                <a16:creationId xmlns:a16="http://schemas.microsoft.com/office/drawing/2014/main" id="{ABE6F9A3-300E-47F5-B41C-C8C5E758DE7C}"/>
+              </a:ext>
+              <a:ext uri="{C183D7F6-B498-43B3-948B-1728B52AA6E4}">
+                <adec:decorative xmlns:adec="http://schemas.microsoft.com/office/drawing/2017/decorative" val="1"/>
+              </a:ext>
+            </a:extLst>
+          </p:cNvPr>
+          <p:cNvSpPr>
+            <a:spLocks noGrp="1" noRot="1" noChangeAspect="1" noMove="1" noResize="1" noEditPoints="1" noAdjustHandles="1" noChangeArrowheads="1" noChangeShapeType="1" noTextEdit="1"/>
+          </p:cNvSpPr>
+          <p:nvPr>
+            <p:extLst>
+              <p:ext uri="{386F3935-93C4-4BCD-93E2-E3B085C9AB24}">
+                <p16:designElem xmlns:p16="http://schemas.microsoft.com/office/powerpoint/2015/main" val="1"/>
+              </p:ext>
+            </p:extLst>
+          </p:nvPr>
+        </p:nvSpPr>
+        <p:spPr>
+          <a:xfrm>
+            <a:off x="0" y="0"/>
+            <a:ext cx="12191999" cy="6858000"/>
+          </a:xfrm>
+          <a:prstGeom prst="rect">
+            <a:avLst/>
+          </a:prstGeom>
+          <a:ln>
+            <a:noFill/>
+          </a:ln>
+        </p:spPr>
+        <p:style>
+          <a:lnRef idx="2">
+            <a:schemeClr val="accent1">
+              <a:shade val="50000"/>
+            </a:schemeClr>
+          </a:lnRef>
+          <a:fillRef idx="1003">
+            <a:schemeClr val="dk2"/>
+          </a:fillRef>
+          <a:effectRef idx="0">
+            <a:schemeClr val="accent1"/>
+          </a:effectRef>
+          <a:fontRef idx="minor">
+            <a:schemeClr val="lt1"/>
+          </a:fontRef>
+        </p:style>
+        <p:txBody>
+          <a:bodyPr rtlCol="0" anchor="ctr"/>
+          <a:lstStyle/>
+          <a:p>
+            <a:pPr algn="ctr"/>
+            <a:endParaRPr lang="en-US"/>
+          </a:p>
+        </p:txBody>
+      </p:sp>
+      <p:sp>
+        <p:nvSpPr>
           <p:cNvPr id="2" name="Title 1">
             <a:extLst>
               <a:ext uri="{FF2B5EF4-FFF2-40B4-BE49-F238E27FC236}">
-                <a16:creationId xmlns:a16="http://schemas.microsoft.com/office/drawing/2014/main" id="{5D637F0A-0D92-58C9-8AC4-8F8807E0AF6B}"/>
+                <a16:creationId xmlns:a16="http://schemas.microsoft.com/office/drawing/2014/main" id="{6E9B6460-568A-0FB1-9DED-49ED277CE971}"/>
               </a:ext>
             </a:extLst>
           </p:cNvPr>
@@ -6329,85 +9453,266 @@
             <p:ph type="title"/>
           </p:nvPr>
         </p:nvSpPr>
-        <p:spPr/>
-        <p:txBody>
-          <a:bodyPr/>
+        <p:spPr>
+          <a:xfrm>
+            <a:off x="648929" y="1063417"/>
+            <a:ext cx="3505495" cy="4675396"/>
+          </a:xfrm>
+        </p:spPr>
+        <p:txBody>
+          <a:bodyPr anchor="ctr">
+            <a:normAutofit/>
+          </a:bodyPr>
           <a:lstStyle/>
           <a:p>
             <a:r>
-              <a:rPr lang="en-ZA" dirty="0"/>
-              <a:t>Objectives</a:t>
-            </a:r>
-          </a:p>
-        </p:txBody>
-      </p:sp>
-      <p:sp>
-        <p:nvSpPr>
-          <p:cNvPr id="3" name="Content Placeholder 2">
+              <a:rPr lang="en-ZA">
+                <a:solidFill>
+                  <a:srgbClr val="F2F2F2"/>
+                </a:solidFill>
+              </a:rPr>
+              <a:t>Introduction</a:t>
+            </a:r>
+          </a:p>
+        </p:txBody>
+      </p:sp>
+      <p:sp>
+        <p:nvSpPr>
+          <p:cNvPr id="11" name="Rectangle 10">
             <a:extLst>
               <a:ext uri="{FF2B5EF4-FFF2-40B4-BE49-F238E27FC236}">
-                <a16:creationId xmlns:a16="http://schemas.microsoft.com/office/drawing/2014/main" id="{861FEE8E-B3B9-77D7-EEBE-C157B7ADB4A8}"/>
+                <a16:creationId xmlns:a16="http://schemas.microsoft.com/office/drawing/2014/main" id="{61B4701B-39FE-43B8-86AA-D6B8789C2207}"/>
+              </a:ext>
+              <a:ext uri="{C183D7F6-B498-43B3-948B-1728B52AA6E4}">
+                <adec:decorative xmlns:adec="http://schemas.microsoft.com/office/drawing/2017/decorative" val="1"/>
               </a:ext>
             </a:extLst>
           </p:cNvPr>
           <p:cNvSpPr>
-            <a:spLocks noGrp="1"/>
-          </p:cNvSpPr>
-          <p:nvPr>
-            <p:ph idx="1"/>
-          </p:nvPr>
-        </p:nvSpPr>
-        <p:spPr/>
+            <a:spLocks noGrp="1" noRot="1" noChangeAspect="1" noMove="1" noResize="1" noEditPoints="1" noAdjustHandles="1" noChangeArrowheads="1" noChangeShapeType="1" noTextEdit="1"/>
+          </p:cNvSpPr>
+          <p:nvPr>
+            <p:extLst>
+              <p:ext uri="{386F3935-93C4-4BCD-93E2-E3B085C9AB24}">
+                <p16:designElem xmlns:p16="http://schemas.microsoft.com/office/powerpoint/2015/main" val="1"/>
+              </p:ext>
+            </p:extLst>
+          </p:nvPr>
+        </p:nvSpPr>
+        <p:spPr>
+          <a:xfrm>
+            <a:off x="4639056" y="0"/>
+            <a:ext cx="7552944" cy="6858000"/>
+          </a:xfrm>
+          <a:prstGeom prst="rect">
+            <a:avLst/>
+          </a:prstGeom>
+          <a:solidFill>
+            <a:srgbClr val="FFFFFF"/>
+          </a:solidFill>
+          <a:ln>
+            <a:noFill/>
+          </a:ln>
+        </p:spPr>
+        <p:style>
+          <a:lnRef idx="2">
+            <a:schemeClr val="accent1">
+              <a:shade val="50000"/>
+            </a:schemeClr>
+          </a:lnRef>
+          <a:fillRef idx="1">
+            <a:schemeClr val="accent1"/>
+          </a:fillRef>
+          <a:effectRef idx="0">
+            <a:schemeClr val="accent1"/>
+          </a:effectRef>
+          <a:fontRef idx="minor">
+            <a:schemeClr val="lt1"/>
+          </a:fontRef>
+        </p:style>
+        <p:txBody>
+          <a:bodyPr rtlCol="0" anchor="ctr"/>
+          <a:lstStyle/>
+          <a:p>
+            <a:pPr algn="ctr"/>
+            <a:endParaRPr lang="en-US"/>
+          </a:p>
+        </p:txBody>
+      </p:sp>
+      <p:sp useBgFill="1">
+        <p:nvSpPr>
+          <p:cNvPr id="13" name="Rounded Rectangle 9">
+            <a:extLst>
+              <a:ext uri="{FF2B5EF4-FFF2-40B4-BE49-F238E27FC236}">
+                <a16:creationId xmlns:a16="http://schemas.microsoft.com/office/drawing/2014/main" id="{E9A7EF13-49FA-4355-971A-34B065F35022}"/>
+              </a:ext>
+              <a:ext uri="{C183D7F6-B498-43B3-948B-1728B52AA6E4}">
+                <adec:decorative xmlns:adec="http://schemas.microsoft.com/office/drawing/2017/decorative" val="1"/>
+              </a:ext>
+            </a:extLst>
+          </p:cNvPr>
+          <p:cNvSpPr>
+            <a:spLocks noGrp="1" noRot="1" noChangeAspect="1" noMove="1" noResize="1" noEditPoints="1" noAdjustHandles="1" noChangeArrowheads="1" noChangeShapeType="1" noTextEdit="1"/>
+          </p:cNvSpPr>
+          <p:nvPr>
+            <p:extLst>
+              <p:ext uri="{386F3935-93C4-4BCD-93E2-E3B085C9AB24}">
+                <p16:designElem xmlns:p16="http://schemas.microsoft.com/office/powerpoint/2015/main" val="1"/>
+              </p:ext>
+            </p:extLst>
+          </p:nvPr>
+        </p:nvSpPr>
+        <p:spPr>
+          <a:xfrm>
+            <a:off x="5123688" y="484632"/>
+            <a:ext cx="6584098" cy="5739187"/>
+          </a:xfrm>
+          <a:prstGeom prst="roundRect">
+            <a:avLst>
+              <a:gd name="adj" fmla="val 0"/>
+            </a:avLst>
+          </a:prstGeom>
+          <a:ln w="12700" cap="sq">
+            <a:solidFill>
+              <a:schemeClr val="bg1">
+                <a:lumMod val="75000"/>
+              </a:schemeClr>
+            </a:solidFill>
+            <a:miter lim="800000"/>
+          </a:ln>
+          <a:effectLst>
+            <a:outerShdw blurRad="63500" dist="25400" dir="5400000" algn="tl" rotWithShape="0">
+              <a:srgbClr val="000000">
+                <a:alpha val="39000"/>
+              </a:srgbClr>
+            </a:outerShdw>
+          </a:effectLst>
+        </p:spPr>
+        <p:style>
+          <a:lnRef idx="2">
+            <a:schemeClr val="accent1">
+              <a:shade val="50000"/>
+            </a:schemeClr>
+          </a:lnRef>
+          <a:fillRef idx="1">
+            <a:schemeClr val="accent1"/>
+          </a:fillRef>
+          <a:effectRef idx="0">
+            <a:schemeClr val="accent1"/>
+          </a:effectRef>
+          <a:fontRef idx="minor">
+            <a:schemeClr val="lt1"/>
+          </a:fontRef>
+        </p:style>
+        <p:txBody>
+          <a:bodyPr rtlCol="0" anchor="ctr"/>
+          <a:lstStyle/>
+          <a:p>
+            <a:pPr algn="ctr"/>
+            <a:endParaRPr lang="en-US"/>
+          </a:p>
+        </p:txBody>
+      </p:sp>
+      <p:sp>
+        <p:nvSpPr>
+          <p:cNvPr id="15" name="Rectangle 14">
+            <a:extLst>
+              <a:ext uri="{FF2B5EF4-FFF2-40B4-BE49-F238E27FC236}">
+                <a16:creationId xmlns:a16="http://schemas.microsoft.com/office/drawing/2014/main" id="{92CF3C3E-0F7B-4F0C-8EBD-BDD38E9C66F5}"/>
+              </a:ext>
+              <a:ext uri="{C183D7F6-B498-43B3-948B-1728B52AA6E4}">
+                <adec:decorative xmlns:adec="http://schemas.microsoft.com/office/drawing/2017/decorative" val="1"/>
+              </a:ext>
+            </a:extLst>
+          </p:cNvPr>
+          <p:cNvSpPr>
+            <a:spLocks noGrp="1" noRot="1" noChangeAspect="1" noMove="1" noResize="1" noEditPoints="1" noAdjustHandles="1" noChangeArrowheads="1" noChangeShapeType="1" noTextEdit="1"/>
+          </p:cNvSpPr>
+          <p:nvPr>
+            <p:extLst>
+              <p:ext uri="{386F3935-93C4-4BCD-93E2-E3B085C9AB24}">
+                <p16:designElem xmlns:p16="http://schemas.microsoft.com/office/powerpoint/2015/main" val="1"/>
+              </p:ext>
+            </p:extLst>
+          </p:nvPr>
+        </p:nvSpPr>
+        <p:spPr>
+          <a:xfrm>
+            <a:off x="10442448" y="0"/>
+            <a:ext cx="685800" cy="1143000"/>
+          </a:xfrm>
+          <a:prstGeom prst="rect">
+            <a:avLst/>
+          </a:prstGeom>
+          <a:solidFill>
+            <a:schemeClr val="accent1"/>
+          </a:solidFill>
+          <a:ln>
+            <a:noFill/>
+          </a:ln>
+        </p:spPr>
+        <p:style>
+          <a:lnRef idx="1">
+            <a:schemeClr val="accent1"/>
+          </a:lnRef>
+          <a:fillRef idx="3">
+            <a:schemeClr val="accent1"/>
+          </a:fillRef>
+          <a:effectRef idx="2">
+            <a:schemeClr val="accent1"/>
+          </a:effectRef>
+          <a:fontRef idx="minor">
+            <a:schemeClr val="lt1"/>
+          </a:fontRef>
+        </p:style>
         <p:txBody>
           <a:bodyPr/>
           <a:lstStyle/>
           <a:p>
-            <a:r>
-              <a:rPr lang="en-ZA" dirty="0"/>
-              <a:t>Personalise meal plans</a:t>
-            </a:r>
-          </a:p>
-          <a:p>
-            <a:r>
-              <a:rPr lang="en-ZA" dirty="0"/>
-              <a:t>Filter recipes based off available ingredients</a:t>
-            </a:r>
-          </a:p>
-          <a:p>
-            <a:r>
-              <a:rPr lang="en-ZA" dirty="0"/>
-              <a:t>Offline feature to save recipes</a:t>
-            </a:r>
-          </a:p>
-          <a:p>
-            <a:r>
-              <a:rPr lang="en-ZA" dirty="0"/>
-              <a:t>Provide step-by-step instructions </a:t>
-            </a:r>
-          </a:p>
-          <a:p>
-            <a:r>
-              <a:rPr lang="en-ZA" dirty="0"/>
-              <a:t>Scheduling with a built-in meal planner</a:t>
-            </a:r>
-          </a:p>
-          <a:p>
-            <a:r>
-              <a:rPr lang="en-ZA" dirty="0"/>
-              <a:t>Accessible as a multi-platform app</a:t>
-            </a:r>
-          </a:p>
-        </p:txBody>
-      </p:sp>
+            <a:endParaRPr lang="en-ZA"/>
+          </a:p>
+        </p:txBody>
+      </p:sp>
+      <p:graphicFrame>
+        <p:nvGraphicFramePr>
+          <p:cNvPr id="5" name="Content Placeholder 2">
+            <a:extLst>
+              <a:ext uri="{FF2B5EF4-FFF2-40B4-BE49-F238E27FC236}">
+                <a16:creationId xmlns:a16="http://schemas.microsoft.com/office/drawing/2014/main" id="{0E1E68B9-3210-F3FC-5F28-5AE053CD856F}"/>
+              </a:ext>
+            </a:extLst>
+          </p:cNvPr>
+          <p:cNvGraphicFramePr>
+            <a:graphicFrameLocks noGrp="1"/>
+          </p:cNvGraphicFramePr>
+          <p:nvPr>
+            <p:ph idx="1"/>
+            <p:extLst>
+              <p:ext uri="{D42A27DB-BD31-4B8C-83A1-F6EECF244321}">
+                <p14:modId xmlns:p14="http://schemas.microsoft.com/office/powerpoint/2010/main" val="1852551823"/>
+              </p:ext>
+            </p:extLst>
+          </p:nvPr>
+        </p:nvGraphicFramePr>
+        <p:xfrm>
+          <a:off x="5608638" y="965200"/>
+          <a:ext cx="5614987" cy="4773613"/>
+        </p:xfrm>
+        <a:graphic>
+          <a:graphicData uri="http://schemas.openxmlformats.org/drawingml/2006/diagram">
+            <dgm:relIds xmlns:dgm="http://schemas.openxmlformats.org/drawingml/2006/diagram" xmlns:r="http://schemas.openxmlformats.org/officeDocument/2006/relationships" r:dm="rId2" r:lo="rId3" r:qs="rId4" r:cs="rId5"/>
+          </a:graphicData>
+        </a:graphic>
+      </p:graphicFrame>
     </p:spTree>
     <p:extLst>
       <p:ext uri="{BB962C8B-B14F-4D97-AF65-F5344CB8AC3E}">
-        <p14:creationId xmlns:p14="http://schemas.microsoft.com/office/powerpoint/2010/main" val="240963032"/>
+        <p14:creationId xmlns:p14="http://schemas.microsoft.com/office/powerpoint/2010/main" val="1045181677"/>
       </p:ext>
     </p:extLst>
   </p:cSld>
   <p:clrMapOvr>
-    <a:masterClrMapping/>
+    <a:overrideClrMapping bg1="lt1" tx1="dk1" bg2="lt2" tx2="dk2" accent1="accent1" accent2="accent2" accent3="accent3" accent4="accent4" accent5="accent5" accent6="accent6" hlink="hlink" folHlink="folHlink"/>
   </p:clrMapOvr>
 </p:sld>
 </file>
@@ -6434,6 +9739,949 @@
           <p:cNvPr id="2" name="Title 1">
             <a:extLst>
               <a:ext uri="{FF2B5EF4-FFF2-40B4-BE49-F238E27FC236}">
+                <a16:creationId xmlns:a16="http://schemas.microsoft.com/office/drawing/2014/main" id="{5D637F0A-0D92-58C9-8AC4-8F8807E0AF6B}"/>
+              </a:ext>
+            </a:extLst>
+          </p:cNvPr>
+          <p:cNvSpPr>
+            <a:spLocks noGrp="1"/>
+          </p:cNvSpPr>
+          <p:nvPr>
+            <p:ph type="title"/>
+          </p:nvPr>
+        </p:nvSpPr>
+        <p:spPr/>
+        <p:txBody>
+          <a:bodyPr/>
+          <a:lstStyle/>
+          <a:p>
+            <a:r>
+              <a:rPr lang="en-ZA" dirty="0"/>
+              <a:t>Objectives</a:t>
+            </a:r>
+          </a:p>
+        </p:txBody>
+      </p:sp>
+      <p:sp>
+        <p:nvSpPr>
+          <p:cNvPr id="3" name="Content Placeholder 2">
+            <a:extLst>
+              <a:ext uri="{FF2B5EF4-FFF2-40B4-BE49-F238E27FC236}">
+                <a16:creationId xmlns:a16="http://schemas.microsoft.com/office/drawing/2014/main" id="{861FEE8E-B3B9-77D7-EEBE-C157B7ADB4A8}"/>
+              </a:ext>
+            </a:extLst>
+          </p:cNvPr>
+          <p:cNvSpPr>
+            <a:spLocks noGrp="1"/>
+          </p:cNvSpPr>
+          <p:nvPr>
+            <p:ph idx="1"/>
+          </p:nvPr>
+        </p:nvSpPr>
+        <p:spPr/>
+        <p:txBody>
+          <a:bodyPr/>
+          <a:lstStyle/>
+          <a:p>
+            <a:r>
+              <a:rPr lang="en-ZA"/>
+              <a:t>Personalise meal plans</a:t>
+            </a:r>
+          </a:p>
+          <a:p>
+            <a:r>
+              <a:rPr lang="en-ZA"/>
+              <a:t>Filter recipes based off available ingredients</a:t>
+            </a:r>
+          </a:p>
+          <a:p>
+            <a:r>
+              <a:rPr lang="en-ZA"/>
+              <a:t>Offline feature to save recipes</a:t>
+            </a:r>
+          </a:p>
+          <a:p>
+            <a:r>
+              <a:rPr lang="en-ZA"/>
+              <a:t>Provide step-by-step instructions </a:t>
+            </a:r>
+          </a:p>
+          <a:p>
+            <a:r>
+              <a:rPr lang="en-ZA"/>
+              <a:t>Scheduling with a built-in meal planner</a:t>
+            </a:r>
+          </a:p>
+          <a:p>
+            <a:r>
+              <a:rPr lang="en-ZA"/>
+              <a:t>Accessible as a multi-platform app</a:t>
+            </a:r>
+            <a:endParaRPr lang="en-ZA" dirty="0"/>
+          </a:p>
+        </p:txBody>
+      </p:sp>
+    </p:spTree>
+    <p:extLst>
+      <p:ext uri="{BB962C8B-B14F-4D97-AF65-F5344CB8AC3E}">
+        <p14:creationId xmlns:p14="http://schemas.microsoft.com/office/powerpoint/2010/main" val="240963032"/>
+      </p:ext>
+    </p:extLst>
+  </p:cSld>
+  <p:clrMapOvr>
+    <a:masterClrMapping/>
+  </p:clrMapOvr>
+</p:sld>
+</file>
+
+<file path=ppt/slides/slide5.xml><?xml version="1.0" encoding="utf-8"?>
+<p:sld xmlns:a="http://schemas.openxmlformats.org/drawingml/2006/main" xmlns:r="http://schemas.openxmlformats.org/officeDocument/2006/relationships" xmlns:p="http://schemas.openxmlformats.org/presentationml/2006/main">
+  <p:cSld>
+    <p:bg>
+      <p:bgPr>
+        <a:blipFill rotWithShape="1">
+          <a:blip r:embed="rId2">
+            <a:duotone>
+              <a:schemeClr val="bg2">
+                <a:shade val="69000"/>
+                <a:hueMod val="108000"/>
+                <a:satMod val="164000"/>
+                <a:lumMod val="74000"/>
+              </a:schemeClr>
+              <a:schemeClr val="bg2">
+                <a:tint val="96000"/>
+                <a:hueMod val="88000"/>
+                <a:satMod val="140000"/>
+                <a:lumMod val="132000"/>
+              </a:schemeClr>
+            </a:duotone>
+          </a:blip>
+          <a:stretch/>
+        </a:blipFill>
+        <a:effectLst/>
+      </p:bgPr>
+    </p:bg>
+    <p:spTree>
+      <p:nvGrpSpPr>
+        <p:cNvPr id="1" name="">
+          <a:extLst>
+            <a:ext uri="{FF2B5EF4-FFF2-40B4-BE49-F238E27FC236}">
+              <a16:creationId xmlns:a16="http://schemas.microsoft.com/office/drawing/2014/main" id="{0E8B6602-7A9E-4089-C959-0B6B90C4C5C9}"/>
+            </a:ext>
+          </a:extLst>
+        </p:cNvPr>
+        <p:cNvGrpSpPr/>
+        <p:nvPr/>
+      </p:nvGrpSpPr>
+      <p:grpSpPr>
+        <a:xfrm>
+          <a:off x="0" y="0"/>
+          <a:ext cx="0" cy="0"/>
+          <a:chOff x="0" y="0"/>
+          <a:chExt cx="0" cy="0"/>
+        </a:xfrm>
+      </p:grpSpPr>
+      <p:sp>
+        <p:nvSpPr>
+          <p:cNvPr id="9" name="Rectangle 8">
+            <a:extLst>
+              <a:ext uri="{FF2B5EF4-FFF2-40B4-BE49-F238E27FC236}">
+                <a16:creationId xmlns:a16="http://schemas.microsoft.com/office/drawing/2014/main" id="{C8A3C342-1D03-412F-8DD3-BF519E8E0AE9}"/>
+              </a:ext>
+              <a:ext uri="{C183D7F6-B498-43B3-948B-1728B52AA6E4}">
+                <adec:decorative xmlns:adec="http://schemas.microsoft.com/office/drawing/2017/decorative" val="1"/>
+              </a:ext>
+            </a:extLst>
+          </p:cNvPr>
+          <p:cNvSpPr>
+            <a:spLocks noGrp="1" noRot="1" noChangeAspect="1" noMove="1" noResize="1" noEditPoints="1" noAdjustHandles="1" noChangeArrowheads="1" noChangeShapeType="1" noTextEdit="1"/>
+          </p:cNvSpPr>
+          <p:nvPr>
+            <p:extLst>
+              <p:ext uri="{386F3935-93C4-4BCD-93E2-E3B085C9AB24}">
+                <p16:designElem xmlns:p16="http://schemas.microsoft.com/office/powerpoint/2015/main" val="1"/>
+              </p:ext>
+            </p:extLst>
+          </p:nvPr>
+        </p:nvSpPr>
+        <p:spPr>
+          <a:xfrm>
+            <a:off x="0" y="0"/>
+            <a:ext cx="12192000" cy="6858000"/>
+          </a:xfrm>
+          <a:prstGeom prst="rect">
+            <a:avLst/>
+          </a:prstGeom>
+          <a:ln>
+            <a:noFill/>
+          </a:ln>
+        </p:spPr>
+        <p:style>
+          <a:lnRef idx="2">
+            <a:schemeClr val="accent1">
+              <a:shade val="50000"/>
+            </a:schemeClr>
+          </a:lnRef>
+          <a:fillRef idx="1003">
+            <a:schemeClr val="dk2"/>
+          </a:fillRef>
+          <a:effectRef idx="0">
+            <a:schemeClr val="accent1"/>
+          </a:effectRef>
+          <a:fontRef idx="minor">
+            <a:schemeClr val="lt1"/>
+          </a:fontRef>
+        </p:style>
+        <p:txBody>
+          <a:bodyPr rtlCol="0" anchor="ctr"/>
+          <a:lstStyle/>
+          <a:p>
+            <a:pPr algn="ctr"/>
+            <a:endParaRPr lang="en-US"/>
+          </a:p>
+        </p:txBody>
+      </p:sp>
+      <p:sp>
+        <p:nvSpPr>
+          <p:cNvPr id="2" name="Title 1">
+            <a:extLst>
+              <a:ext uri="{FF2B5EF4-FFF2-40B4-BE49-F238E27FC236}">
+                <a16:creationId xmlns:a16="http://schemas.microsoft.com/office/drawing/2014/main" id="{526A9BE6-866E-F949-8DCE-EC029D22D4D3}"/>
+              </a:ext>
+            </a:extLst>
+          </p:cNvPr>
+          <p:cNvSpPr>
+            <a:spLocks noGrp="1"/>
+          </p:cNvSpPr>
+          <p:nvPr>
+            <p:ph type="title"/>
+          </p:nvPr>
+        </p:nvSpPr>
+        <p:spPr>
+          <a:xfrm>
+            <a:off x="5411931" y="452718"/>
+            <a:ext cx="4638903" cy="1400530"/>
+          </a:xfrm>
+        </p:spPr>
+        <p:txBody>
+          <a:bodyPr>
+            <a:normAutofit/>
+          </a:bodyPr>
+          <a:lstStyle/>
+          <a:p>
+            <a:r>
+              <a:rPr lang="en-ZA" dirty="0"/>
+              <a:t>Objectives</a:t>
+            </a:r>
+          </a:p>
+        </p:txBody>
+      </p:sp>
+      <p:sp>
+        <p:nvSpPr>
+          <p:cNvPr id="11" name="Freeform 31">
+            <a:extLst>
+              <a:ext uri="{FF2B5EF4-FFF2-40B4-BE49-F238E27FC236}">
+                <a16:creationId xmlns:a16="http://schemas.microsoft.com/office/drawing/2014/main" id="{81CC9B02-E087-4350-AEBD-2C3CF001AF01}"/>
+              </a:ext>
+              <a:ext uri="{C183D7F6-B498-43B3-948B-1728B52AA6E4}">
+                <adec:decorative xmlns:adec="http://schemas.microsoft.com/office/drawing/2017/decorative" val="1"/>
+              </a:ext>
+            </a:extLst>
+          </p:cNvPr>
+          <p:cNvSpPr>
+            <a:spLocks noGrp="1" noRot="1" noChangeAspect="1" noMove="1" noResize="1" noEditPoints="1" noAdjustHandles="1" noChangeArrowheads="1" noChangeShapeType="1" noTextEdit="1"/>
+          </p:cNvSpPr>
+          <p:nvPr>
+            <p:extLst>
+              <p:ext uri="{386F3935-93C4-4BCD-93E2-E3B085C9AB24}">
+                <p16:designElem xmlns:p16="http://schemas.microsoft.com/office/powerpoint/2015/main" val="1"/>
+              </p:ext>
+            </p:extLst>
+          </p:nvPr>
+        </p:nvSpPr>
+        <p:spPr>
+          <a:xfrm flipH="1">
+            <a:off x="4628375" y="-1573"/>
+            <a:ext cx="559472" cy="3709642"/>
+          </a:xfrm>
+          <a:custGeom>
+            <a:avLst/>
+            <a:gdLst>
+              <a:gd name="connsiteX0" fmla="*/ 0 w 559472"/>
+              <a:gd name="connsiteY0" fmla="*/ 0 h 3709642"/>
+              <a:gd name="connsiteX1" fmla="*/ 473952 w 559472"/>
+              <a:gd name="connsiteY1" fmla="*/ 0 h 3709642"/>
+              <a:gd name="connsiteX2" fmla="*/ 485840 w 559472"/>
+              <a:gd name="connsiteY2" fmla="*/ 161194 h 3709642"/>
+              <a:gd name="connsiteX3" fmla="*/ 523949 w 559472"/>
+              <a:gd name="connsiteY3" fmla="*/ 3672197 h 3709642"/>
+              <a:gd name="connsiteX4" fmla="*/ 454748 w 559472"/>
+              <a:gd name="connsiteY4" fmla="*/ 3709642 h 3709642"/>
+              <a:gd name="connsiteX5" fmla="*/ 448224 w 559472"/>
+              <a:gd name="connsiteY5" fmla="*/ 3510471 h 3709642"/>
+              <a:gd name="connsiteX6" fmla="*/ 443564 w 559472"/>
+              <a:gd name="connsiteY6" fmla="*/ 3408563 h 3709642"/>
+              <a:gd name="connsiteX7" fmla="*/ 438902 w 559472"/>
+              <a:gd name="connsiteY7" fmla="*/ 3304407 h 3709642"/>
+              <a:gd name="connsiteX8" fmla="*/ 433941 w 559472"/>
+              <a:gd name="connsiteY8" fmla="*/ 3198777 h 3709642"/>
+              <a:gd name="connsiteX9" fmla="*/ 427584 w 559472"/>
+              <a:gd name="connsiteY9" fmla="*/ 3092510 h 3709642"/>
+              <a:gd name="connsiteX10" fmla="*/ 420988 w 559472"/>
+              <a:gd name="connsiteY10" fmla="*/ 2984390 h 3709642"/>
+              <a:gd name="connsiteX11" fmla="*/ 414330 w 559472"/>
+              <a:gd name="connsiteY11" fmla="*/ 2874401 h 3709642"/>
+              <a:gd name="connsiteX12" fmla="*/ 406840 w 559472"/>
+              <a:gd name="connsiteY12" fmla="*/ 2762980 h 3709642"/>
+              <a:gd name="connsiteX13" fmla="*/ 397745 w 559472"/>
+              <a:gd name="connsiteY13" fmla="*/ 2650566 h 3709642"/>
+              <a:gd name="connsiteX14" fmla="*/ 389154 w 559472"/>
+              <a:gd name="connsiteY14" fmla="*/ 2536612 h 3709642"/>
+              <a:gd name="connsiteX15" fmla="*/ 379225 w 559472"/>
+              <a:gd name="connsiteY15" fmla="*/ 2421642 h 3709642"/>
+              <a:gd name="connsiteX16" fmla="*/ 368316 w 559472"/>
+              <a:gd name="connsiteY16" fmla="*/ 2305627 h 3709642"/>
+              <a:gd name="connsiteX17" fmla="*/ 357466 w 559472"/>
+              <a:gd name="connsiteY17" fmla="*/ 2189233 h 3709642"/>
+              <a:gd name="connsiteX18" fmla="*/ 344982 w 559472"/>
+              <a:gd name="connsiteY18" fmla="*/ 2071473 h 3709642"/>
+              <a:gd name="connsiteX19" fmla="*/ 332466 w 559472"/>
+              <a:gd name="connsiteY19" fmla="*/ 1952216 h 3709642"/>
+              <a:gd name="connsiteX20" fmla="*/ 319121 w 559472"/>
+              <a:gd name="connsiteY20" fmla="*/ 1833776 h 3709642"/>
+              <a:gd name="connsiteX21" fmla="*/ 304408 w 559472"/>
+              <a:gd name="connsiteY21" fmla="*/ 1713948 h 3709642"/>
+              <a:gd name="connsiteX22" fmla="*/ 288685 w 559472"/>
+              <a:gd name="connsiteY22" fmla="*/ 1592703 h 3709642"/>
+              <a:gd name="connsiteX23" fmla="*/ 273050 w 559472"/>
+              <a:gd name="connsiteY23" fmla="*/ 1471451 h 3709642"/>
+              <a:gd name="connsiteX24" fmla="*/ 255813 w 559472"/>
+              <a:gd name="connsiteY24" fmla="*/ 1350328 h 3709642"/>
+              <a:gd name="connsiteX25" fmla="*/ 237060 w 559472"/>
+              <a:gd name="connsiteY25" fmla="*/ 1227080 h 3709642"/>
+              <a:gd name="connsiteX26" fmla="*/ 218488 w 559472"/>
+              <a:gd name="connsiteY26" fmla="*/ 1106065 h 3709642"/>
+              <a:gd name="connsiteX27" fmla="*/ 198221 w 559472"/>
+              <a:gd name="connsiteY27" fmla="*/ 982940 h 3709642"/>
+              <a:gd name="connsiteX28" fmla="*/ 177152 w 559472"/>
+              <a:gd name="connsiteY28" fmla="*/ 858755 h 3709642"/>
+              <a:gd name="connsiteX29" fmla="*/ 155551 w 559472"/>
+              <a:gd name="connsiteY29" fmla="*/ 736861 h 3709642"/>
+              <a:gd name="connsiteX30" fmla="*/ 131782 w 559472"/>
+              <a:gd name="connsiteY30" fmla="*/ 613645 h 3709642"/>
+              <a:gd name="connsiteX31" fmla="*/ 107123 w 559472"/>
+              <a:gd name="connsiteY31" fmla="*/ 490500 h 3709642"/>
+              <a:gd name="connsiteX32" fmla="*/ 82552 w 559472"/>
+              <a:gd name="connsiteY32" fmla="*/ 367348 h 3709642"/>
+              <a:gd name="connsiteX33" fmla="*/ 55608 w 559472"/>
+              <a:gd name="connsiteY33" fmla="*/ 244762 h 3709642"/>
+              <a:gd name="connsiteX34" fmla="*/ 28130 w 559472"/>
+              <a:gd name="connsiteY34" fmla="*/ 122220 h 3709642"/>
+              <a:gd name="connsiteX35" fmla="*/ 0 w 559472"/>
+              <a:gd name="connsiteY35" fmla="*/ 0 h 3709642"/>
+            </a:gdLst>
+            <a:ahLst/>
+            <a:cxnLst>
+              <a:cxn ang="0">
+                <a:pos x="connsiteX0" y="connsiteY0"/>
+              </a:cxn>
+              <a:cxn ang="0">
+                <a:pos x="connsiteX1" y="connsiteY1"/>
+              </a:cxn>
+              <a:cxn ang="0">
+                <a:pos x="connsiteX2" y="connsiteY2"/>
+              </a:cxn>
+              <a:cxn ang="0">
+                <a:pos x="connsiteX3" y="connsiteY3"/>
+              </a:cxn>
+              <a:cxn ang="0">
+                <a:pos x="connsiteX4" y="connsiteY4"/>
+              </a:cxn>
+              <a:cxn ang="0">
+                <a:pos x="connsiteX5" y="connsiteY5"/>
+              </a:cxn>
+              <a:cxn ang="0">
+                <a:pos x="connsiteX6" y="connsiteY6"/>
+              </a:cxn>
+              <a:cxn ang="0">
+                <a:pos x="connsiteX7" y="connsiteY7"/>
+              </a:cxn>
+              <a:cxn ang="0">
+                <a:pos x="connsiteX8" y="connsiteY8"/>
+              </a:cxn>
+              <a:cxn ang="0">
+                <a:pos x="connsiteX9" y="connsiteY9"/>
+              </a:cxn>
+              <a:cxn ang="0">
+                <a:pos x="connsiteX10" y="connsiteY10"/>
+              </a:cxn>
+              <a:cxn ang="0">
+                <a:pos x="connsiteX11" y="connsiteY11"/>
+              </a:cxn>
+              <a:cxn ang="0">
+                <a:pos x="connsiteX12" y="connsiteY12"/>
+              </a:cxn>
+              <a:cxn ang="0">
+                <a:pos x="connsiteX13" y="connsiteY13"/>
+              </a:cxn>
+              <a:cxn ang="0">
+                <a:pos x="connsiteX14" y="connsiteY14"/>
+              </a:cxn>
+              <a:cxn ang="0">
+                <a:pos x="connsiteX15" y="connsiteY15"/>
+              </a:cxn>
+              <a:cxn ang="0">
+                <a:pos x="connsiteX16" y="connsiteY16"/>
+              </a:cxn>
+              <a:cxn ang="0">
+                <a:pos x="connsiteX17" y="connsiteY17"/>
+              </a:cxn>
+              <a:cxn ang="0">
+                <a:pos x="connsiteX18" y="connsiteY18"/>
+              </a:cxn>
+              <a:cxn ang="0">
+                <a:pos x="connsiteX19" y="connsiteY19"/>
+              </a:cxn>
+              <a:cxn ang="0">
+                <a:pos x="connsiteX20" y="connsiteY20"/>
+              </a:cxn>
+              <a:cxn ang="0">
+                <a:pos x="connsiteX21" y="connsiteY21"/>
+              </a:cxn>
+              <a:cxn ang="0">
+                <a:pos x="connsiteX22" y="connsiteY22"/>
+              </a:cxn>
+              <a:cxn ang="0">
+                <a:pos x="connsiteX23" y="connsiteY23"/>
+              </a:cxn>
+              <a:cxn ang="0">
+                <a:pos x="connsiteX24" y="connsiteY24"/>
+              </a:cxn>
+              <a:cxn ang="0">
+                <a:pos x="connsiteX25" y="connsiteY25"/>
+              </a:cxn>
+              <a:cxn ang="0">
+                <a:pos x="connsiteX26" y="connsiteY26"/>
+              </a:cxn>
+              <a:cxn ang="0">
+                <a:pos x="connsiteX27" y="connsiteY27"/>
+              </a:cxn>
+              <a:cxn ang="0">
+                <a:pos x="connsiteX28" y="connsiteY28"/>
+              </a:cxn>
+              <a:cxn ang="0">
+                <a:pos x="connsiteX29" y="connsiteY29"/>
+              </a:cxn>
+              <a:cxn ang="0">
+                <a:pos x="connsiteX30" y="connsiteY30"/>
+              </a:cxn>
+              <a:cxn ang="0">
+                <a:pos x="connsiteX31" y="connsiteY31"/>
+              </a:cxn>
+              <a:cxn ang="0">
+                <a:pos x="connsiteX32" y="connsiteY32"/>
+              </a:cxn>
+              <a:cxn ang="0">
+                <a:pos x="connsiteX33" y="connsiteY33"/>
+              </a:cxn>
+              <a:cxn ang="0">
+                <a:pos x="connsiteX34" y="connsiteY34"/>
+              </a:cxn>
+              <a:cxn ang="0">
+                <a:pos x="connsiteX35" y="connsiteY35"/>
+              </a:cxn>
+            </a:cxnLst>
+            <a:rect l="l" t="t" r="r" b="b"/>
+            <a:pathLst>
+              <a:path w="559472" h="3709642">
+                <a:moveTo>
+                  <a:pt x="0" y="0"/>
+                </a:moveTo>
+                <a:lnTo>
+                  <a:pt x="473952" y="0"/>
+                </a:lnTo>
+                <a:lnTo>
+                  <a:pt x="485840" y="161194"/>
+                </a:lnTo>
+                <a:cubicBezTo>
+                  <a:pt x="552063" y="1147770"/>
+                  <a:pt x="592441" y="3086737"/>
+                  <a:pt x="523949" y="3672197"/>
+                </a:cubicBezTo>
+                <a:cubicBezTo>
+                  <a:pt x="500842" y="3684557"/>
+                  <a:pt x="477855" y="3697282"/>
+                  <a:pt x="454748" y="3709642"/>
+                </a:cubicBezTo>
+                <a:lnTo>
+                  <a:pt x="448224" y="3510471"/>
+                </a:lnTo>
+                <a:lnTo>
+                  <a:pt x="443564" y="3408563"/>
+                </a:lnTo>
+                <a:lnTo>
+                  <a:pt x="438902" y="3304407"/>
+                </a:lnTo>
+                <a:lnTo>
+                  <a:pt x="433941" y="3198777"/>
+                </a:lnTo>
+                <a:lnTo>
+                  <a:pt x="427584" y="3092510"/>
+                </a:lnTo>
+                <a:lnTo>
+                  <a:pt x="420988" y="2984390"/>
+                </a:lnTo>
+                <a:lnTo>
+                  <a:pt x="414330" y="2874401"/>
+                </a:lnTo>
+                <a:lnTo>
+                  <a:pt x="406840" y="2762980"/>
+                </a:lnTo>
+                <a:lnTo>
+                  <a:pt x="397745" y="2650566"/>
+                </a:lnTo>
+                <a:lnTo>
+                  <a:pt x="389154" y="2536612"/>
+                </a:lnTo>
+                <a:lnTo>
+                  <a:pt x="379225" y="2421642"/>
+                </a:lnTo>
+                <a:lnTo>
+                  <a:pt x="368316" y="2305627"/>
+                </a:lnTo>
+                <a:lnTo>
+                  <a:pt x="357466" y="2189233"/>
+                </a:lnTo>
+                <a:lnTo>
+                  <a:pt x="344982" y="2071473"/>
+                </a:lnTo>
+                <a:lnTo>
+                  <a:pt x="332466" y="1952216"/>
+                </a:lnTo>
+                <a:lnTo>
+                  <a:pt x="319121" y="1833776"/>
+                </a:lnTo>
+                <a:lnTo>
+                  <a:pt x="304408" y="1713948"/>
+                </a:lnTo>
+                <a:lnTo>
+                  <a:pt x="288685" y="1592703"/>
+                </a:lnTo>
+                <a:lnTo>
+                  <a:pt x="273050" y="1471451"/>
+                </a:lnTo>
+                <a:lnTo>
+                  <a:pt x="255813" y="1350328"/>
+                </a:lnTo>
+                <a:lnTo>
+                  <a:pt x="237060" y="1227080"/>
+                </a:lnTo>
+                <a:lnTo>
+                  <a:pt x="218488" y="1106065"/>
+                </a:lnTo>
+                <a:lnTo>
+                  <a:pt x="198221" y="982940"/>
+                </a:lnTo>
+                <a:lnTo>
+                  <a:pt x="177152" y="858755"/>
+                </a:lnTo>
+                <a:lnTo>
+                  <a:pt x="155551" y="736861"/>
+                </a:lnTo>
+                <a:lnTo>
+                  <a:pt x="131782" y="613645"/>
+                </a:lnTo>
+                <a:lnTo>
+                  <a:pt x="107123" y="490500"/>
+                </a:lnTo>
+                <a:lnTo>
+                  <a:pt x="82552" y="367348"/>
+                </a:lnTo>
+                <a:lnTo>
+                  <a:pt x="55608" y="244762"/>
+                </a:lnTo>
+                <a:lnTo>
+                  <a:pt x="28130" y="122220"/>
+                </a:lnTo>
+                <a:lnTo>
+                  <a:pt x="0" y="0"/>
+                </a:lnTo>
+                <a:close/>
+              </a:path>
+            </a:pathLst>
+          </a:custGeom>
+          <a:solidFill>
+            <a:schemeClr val="tx1">
+              <a:alpha val="20000"/>
+            </a:schemeClr>
+          </a:solidFill>
+          <a:ln>
+            <a:noFill/>
+          </a:ln>
+        </p:spPr>
+        <p:txBody>
+          <a:bodyPr rtlCol="0" anchor="ctr"/>
+          <a:lstStyle/>
+          <a:p>
+            <a:pPr algn="ctr"/>
+            <a:endParaRPr lang="en-US"/>
+          </a:p>
+        </p:txBody>
+      </p:sp>
+      <p:pic>
+        <p:nvPicPr>
+          <p:cNvPr id="5" name="Picture 4" descr="Assorted vegetables and fruits">
+            <a:extLst>
+              <a:ext uri="{FF2B5EF4-FFF2-40B4-BE49-F238E27FC236}">
+                <a16:creationId xmlns:a16="http://schemas.microsoft.com/office/drawing/2014/main" id="{04FC826D-5F72-A128-55C8-2EBA7BE83BB7}"/>
+              </a:ext>
+            </a:extLst>
+          </p:cNvPr>
+          <p:cNvPicPr>
+            <a:picLocks noChangeAspect="1"/>
+          </p:cNvPicPr>
+          <p:nvPr/>
+        </p:nvPicPr>
+        <p:blipFill>
+          <a:blip r:embed="rId3"/>
+          <a:srcRect l="31939" r="19656" b="-1"/>
+          <a:stretch/>
+        </p:blipFill>
+        <p:spPr>
+          <a:xfrm>
+            <a:off x="3" y="10"/>
+            <a:ext cx="4973099" cy="6857991"/>
+          </a:xfrm>
+          <a:custGeom>
+            <a:avLst/>
+            <a:gdLst/>
+            <a:ahLst/>
+            <a:cxnLst/>
+            <a:rect l="l" t="t" r="r" b="b"/>
+            <a:pathLst>
+              <a:path w="4973099" h="6858001">
+                <a:moveTo>
+                  <a:pt x="3628384" y="0"/>
+                </a:moveTo>
+                <a:lnTo>
+                  <a:pt x="4971922" y="0"/>
+                </a:lnTo>
+                <a:lnTo>
+                  <a:pt x="4946877" y="155677"/>
+                </a:lnTo>
+                <a:lnTo>
+                  <a:pt x="4923008" y="310668"/>
+                </a:lnTo>
+                <a:lnTo>
+                  <a:pt x="4899644" y="466344"/>
+                </a:lnTo>
+                <a:lnTo>
+                  <a:pt x="4879641" y="622707"/>
+                </a:lnTo>
+                <a:lnTo>
+                  <a:pt x="4859470" y="778383"/>
+                </a:lnTo>
+                <a:lnTo>
+                  <a:pt x="4840644" y="934746"/>
+                </a:lnTo>
+                <a:lnTo>
+                  <a:pt x="4824508" y="1089051"/>
+                </a:lnTo>
+                <a:lnTo>
+                  <a:pt x="4809212" y="1245413"/>
+                </a:lnTo>
+                <a:lnTo>
+                  <a:pt x="4795260" y="1401090"/>
+                </a:lnTo>
+                <a:lnTo>
+                  <a:pt x="4783158" y="1554023"/>
+                </a:lnTo>
+                <a:lnTo>
+                  <a:pt x="4771055" y="1709014"/>
+                </a:lnTo>
+                <a:lnTo>
+                  <a:pt x="4760970" y="1861947"/>
+                </a:lnTo>
+                <a:lnTo>
+                  <a:pt x="4753070" y="2014881"/>
+                </a:lnTo>
+                <a:lnTo>
+                  <a:pt x="4744833" y="2167128"/>
+                </a:lnTo>
+                <a:lnTo>
+                  <a:pt x="4737942" y="2318004"/>
+                </a:lnTo>
+                <a:lnTo>
+                  <a:pt x="4733067" y="2467509"/>
+                </a:lnTo>
+                <a:lnTo>
+                  <a:pt x="4728865" y="2617013"/>
+                </a:lnTo>
+                <a:lnTo>
+                  <a:pt x="4724831" y="2765146"/>
+                </a:lnTo>
+                <a:lnTo>
+                  <a:pt x="4722982" y="2911221"/>
+                </a:lnTo>
+                <a:lnTo>
+                  <a:pt x="4720965" y="3057297"/>
+                </a:lnTo>
+                <a:lnTo>
+                  <a:pt x="4719956" y="3201315"/>
+                </a:lnTo>
+                <a:lnTo>
+                  <a:pt x="4720965" y="3343961"/>
+                </a:lnTo>
+                <a:lnTo>
+                  <a:pt x="4720965" y="3485236"/>
+                </a:lnTo>
+                <a:lnTo>
+                  <a:pt x="4722982" y="3625139"/>
+                </a:lnTo>
+                <a:lnTo>
+                  <a:pt x="4726007" y="3762299"/>
+                </a:lnTo>
+                <a:lnTo>
+                  <a:pt x="4728865" y="3898087"/>
+                </a:lnTo>
+                <a:lnTo>
+                  <a:pt x="4732059" y="4031133"/>
+                </a:lnTo>
+                <a:lnTo>
+                  <a:pt x="4736933" y="4163492"/>
+                </a:lnTo>
+                <a:lnTo>
+                  <a:pt x="4742144" y="4293793"/>
+                </a:lnTo>
+                <a:lnTo>
+                  <a:pt x="4746850" y="4421352"/>
+                </a:lnTo>
+                <a:lnTo>
+                  <a:pt x="4760130" y="4670298"/>
+                </a:lnTo>
+                <a:lnTo>
+                  <a:pt x="4774249" y="4908956"/>
+                </a:lnTo>
+                <a:lnTo>
+                  <a:pt x="4789041" y="5138013"/>
+                </a:lnTo>
+                <a:lnTo>
+                  <a:pt x="4805346" y="5354726"/>
+                </a:lnTo>
+                <a:lnTo>
+                  <a:pt x="4822323" y="5561838"/>
+                </a:lnTo>
+                <a:lnTo>
+                  <a:pt x="4840644" y="5753862"/>
+                </a:lnTo>
+                <a:lnTo>
+                  <a:pt x="4858630" y="5934227"/>
+                </a:lnTo>
+                <a:lnTo>
+                  <a:pt x="4876615" y="6100191"/>
+                </a:lnTo>
+                <a:lnTo>
+                  <a:pt x="4893592" y="6252438"/>
+                </a:lnTo>
+                <a:lnTo>
+                  <a:pt x="4909729" y="6387541"/>
+                </a:lnTo>
+                <a:lnTo>
+                  <a:pt x="4925025" y="6509613"/>
+                </a:lnTo>
+                <a:lnTo>
+                  <a:pt x="4937800" y="6612483"/>
+                </a:lnTo>
+                <a:lnTo>
+                  <a:pt x="4949902" y="6698894"/>
+                </a:lnTo>
+                <a:lnTo>
+                  <a:pt x="4967216" y="6817538"/>
+                </a:lnTo>
+                <a:lnTo>
+                  <a:pt x="4973099" y="6858000"/>
+                </a:lnTo>
+                <a:lnTo>
+                  <a:pt x="4075210" y="6858000"/>
+                </a:lnTo>
+                <a:lnTo>
+                  <a:pt x="4075210" y="6858001"/>
+                </a:lnTo>
+                <a:lnTo>
+                  <a:pt x="0" y="6858001"/>
+                </a:lnTo>
+                <a:lnTo>
+                  <a:pt x="0" y="1"/>
+                </a:lnTo>
+                <a:lnTo>
+                  <a:pt x="3628384" y="1"/>
+                </a:lnTo>
+                <a:close/>
+              </a:path>
+            </a:pathLst>
+          </a:custGeom>
+        </p:spPr>
+      </p:pic>
+      <p:sp>
+        <p:nvSpPr>
+          <p:cNvPr id="13" name="Rectangle 12">
+            <a:extLst>
+              <a:ext uri="{FF2B5EF4-FFF2-40B4-BE49-F238E27FC236}">
+                <a16:creationId xmlns:a16="http://schemas.microsoft.com/office/drawing/2014/main" id="{D6F18ACE-6E82-4ADC-8A2F-A1771B309B16}"/>
+              </a:ext>
+              <a:ext uri="{C183D7F6-B498-43B3-948B-1728B52AA6E4}">
+                <adec:decorative xmlns:adec="http://schemas.microsoft.com/office/drawing/2017/decorative" val="1"/>
+              </a:ext>
+            </a:extLst>
+          </p:cNvPr>
+          <p:cNvSpPr>
+            <a:spLocks noGrp="1" noRot="1" noChangeAspect="1" noMove="1" noResize="1" noEditPoints="1" noAdjustHandles="1" noChangeArrowheads="1" noChangeShapeType="1" noTextEdit="1"/>
+          </p:cNvSpPr>
+          <p:nvPr>
+            <p:extLst>
+              <p:ext uri="{386F3935-93C4-4BCD-93E2-E3B085C9AB24}">
+                <p16:designElem xmlns:p16="http://schemas.microsoft.com/office/powerpoint/2015/main" val="1"/>
+              </p:ext>
+            </p:extLst>
+          </p:nvPr>
+        </p:nvSpPr>
+        <p:spPr>
+          <a:xfrm>
+            <a:off x="10442448" y="0"/>
+            <a:ext cx="685800" cy="1143000"/>
+          </a:xfrm>
+          <a:prstGeom prst="rect">
+            <a:avLst/>
+          </a:prstGeom>
+          <a:solidFill>
+            <a:schemeClr val="accent1"/>
+          </a:solidFill>
+          <a:ln>
+            <a:noFill/>
+          </a:ln>
+        </p:spPr>
+        <p:style>
+          <a:lnRef idx="1">
+            <a:schemeClr val="accent1"/>
+          </a:lnRef>
+          <a:fillRef idx="3">
+            <a:schemeClr val="accent1"/>
+          </a:fillRef>
+          <a:effectRef idx="2">
+            <a:schemeClr val="accent1"/>
+          </a:effectRef>
+          <a:fontRef idx="minor">
+            <a:schemeClr val="lt1"/>
+          </a:fontRef>
+        </p:style>
+        <p:txBody>
+          <a:bodyPr/>
+          <a:lstStyle/>
+          <a:p>
+            <a:endParaRPr lang="en-ZA"/>
+          </a:p>
+        </p:txBody>
+      </p:sp>
+      <p:sp>
+        <p:nvSpPr>
+          <p:cNvPr id="3" name="Content Placeholder 2">
+            <a:extLst>
+              <a:ext uri="{FF2B5EF4-FFF2-40B4-BE49-F238E27FC236}">
+                <a16:creationId xmlns:a16="http://schemas.microsoft.com/office/drawing/2014/main" id="{217137C5-1564-F615-8811-9E55C25ED593}"/>
+              </a:ext>
+            </a:extLst>
+          </p:cNvPr>
+          <p:cNvSpPr>
+            <a:spLocks noGrp="1"/>
+          </p:cNvSpPr>
+          <p:nvPr>
+            <p:ph idx="1"/>
+          </p:nvPr>
+        </p:nvSpPr>
+        <p:spPr>
+          <a:xfrm>
+            <a:off x="5410950" y="2052918"/>
+            <a:ext cx="4638903" cy="4195481"/>
+          </a:xfrm>
+        </p:spPr>
+        <p:txBody>
+          <a:bodyPr>
+            <a:normAutofit/>
+          </a:bodyPr>
+          <a:lstStyle/>
+          <a:p>
+            <a:r>
+              <a:rPr lang="en-ZA" dirty="0"/>
+              <a:t>Personalise meal plans</a:t>
+            </a:r>
+          </a:p>
+          <a:p>
+            <a:r>
+              <a:rPr lang="en-ZA" dirty="0"/>
+              <a:t>Filter recipes based off available ingredients</a:t>
+            </a:r>
+          </a:p>
+          <a:p>
+            <a:r>
+              <a:rPr lang="en-ZA" dirty="0"/>
+              <a:t>Offline feature to save recipes</a:t>
+            </a:r>
+          </a:p>
+          <a:p>
+            <a:r>
+              <a:rPr lang="en-ZA" dirty="0"/>
+              <a:t>Provide step-by-step instructions </a:t>
+            </a:r>
+          </a:p>
+          <a:p>
+            <a:r>
+              <a:rPr lang="en-ZA" dirty="0"/>
+              <a:t>Scheduling with a built-in meal planner</a:t>
+            </a:r>
+          </a:p>
+          <a:p>
+            <a:r>
+              <a:rPr lang="en-ZA" dirty="0"/>
+              <a:t>Cross Platform App</a:t>
+            </a:r>
+          </a:p>
+        </p:txBody>
+      </p:sp>
+    </p:spTree>
+    <p:extLst>
+      <p:ext uri="{BB962C8B-B14F-4D97-AF65-F5344CB8AC3E}">
+        <p14:creationId xmlns:p14="http://schemas.microsoft.com/office/powerpoint/2010/main" val="2352881730"/>
+      </p:ext>
+    </p:extLst>
+  </p:cSld>
+  <p:clrMapOvr>
+    <a:masterClrMapping/>
+  </p:clrMapOvr>
+</p:sld>
+</file>
+
+<file path=ppt/slides/slide6.xml><?xml version="1.0" encoding="utf-8"?>
+<p:sld xmlns:a="http://schemas.openxmlformats.org/drawingml/2006/main" xmlns:r="http://schemas.openxmlformats.org/officeDocument/2006/relationships" xmlns:p="http://schemas.openxmlformats.org/presentationml/2006/main">
+  <p:cSld>
+    <p:spTree>
+      <p:nvGrpSpPr>
+        <p:cNvPr id="1" name=""/>
+        <p:cNvGrpSpPr/>
+        <p:nvPr/>
+      </p:nvGrpSpPr>
+      <p:grpSpPr>
+        <a:xfrm>
+          <a:off x="0" y="0"/>
+          <a:ext cx="0" cy="0"/>
+          <a:chOff x="0" y="0"/>
+          <a:chExt cx="0" cy="0"/>
+        </a:xfrm>
+      </p:grpSpPr>
+      <p:sp>
+        <p:nvSpPr>
+          <p:cNvPr id="2" name="Title 1">
+            <a:extLst>
+              <a:ext uri="{FF2B5EF4-FFF2-40B4-BE49-F238E27FC236}">
                 <a16:creationId xmlns:a16="http://schemas.microsoft.com/office/drawing/2014/main" id="{9F7C81D7-EADE-3300-759C-1A714E111058}"/>
               </a:ext>
             </a:extLst>
@@ -6517,12 +10765,6 @@
               <a:t>Web app requires stable internet connection</a:t>
             </a:r>
           </a:p>
-          <a:p>
-            <a:r>
-              <a:rPr lang="en-ZA" dirty="0"/>
-              <a:t>Database hosted on the Firebase cloud infrastructure</a:t>
-            </a:r>
-          </a:p>
         </p:txBody>
       </p:sp>
       <p:sp>
@@ -6606,8 +10848,17 @@
           <a:p>
             <a:r>
               <a:rPr lang="en-ZA" dirty="0"/>
-              <a:t>Web version optimized for MS Edge</a:t>
-            </a:r>
+              <a:t>Web browser (optimized for MS Edge)</a:t>
+            </a:r>
+          </a:p>
+          <a:p>
+            <a:r>
+              <a:rPr lang="en-ZA" dirty="0"/>
+              <a:t>Database hosted on the Firebase cloud infrastructure</a:t>
+            </a:r>
+          </a:p>
+          <a:p>
+            <a:endParaRPr lang="en-ZA" dirty="0"/>
           </a:p>
         </p:txBody>
       </p:sp>
@@ -6624,7 +10875,7 @@
 </p:sld>
 </file>
 
-<file path=ppt/slides/slide5.xml><?xml version="1.0" encoding="utf-8"?>
+<file path=ppt/slides/slide7.xml><?xml version="1.0" encoding="utf-8"?>
 <p:sld xmlns:a="http://schemas.openxmlformats.org/drawingml/2006/main" xmlns:r="http://schemas.openxmlformats.org/officeDocument/2006/relationships" xmlns:p="http://schemas.openxmlformats.org/presentationml/2006/main">
   <p:cSld>
     <p:spTree>
@@ -6812,7 +11063,7 @@
 </p:sld>
 </file>
 
-<file path=ppt/slides/slide6.xml><?xml version="1.0" encoding="utf-8"?>
+<file path=ppt/slides/slide8.xml><?xml version="1.0" encoding="utf-8"?>
 <p:sld xmlns:a="http://schemas.openxmlformats.org/drawingml/2006/main" xmlns:r="http://schemas.openxmlformats.org/officeDocument/2006/relationships" xmlns:p="http://schemas.openxmlformats.org/presentationml/2006/main">
   <p:cSld>
     <p:spTree>

</xml_diff>

<commit_message>
changes to presentation stuff
</commit_message>
<xml_diff>
--- a/PowerPoint Slides/ITPV302 - Presentation.pptx
+++ b/PowerPoint Slides/ITPV302 - Presentation.pptx
@@ -6,13 +6,11 @@
   </p:sldMasterIdLst>
   <p:sldIdLst>
     <p:sldId id="256" r:id="rId2"/>
-    <p:sldId id="257" r:id="rId3"/>
-    <p:sldId id="263" r:id="rId4"/>
-    <p:sldId id="258" r:id="rId5"/>
-    <p:sldId id="262" r:id="rId6"/>
-    <p:sldId id="259" r:id="rId7"/>
-    <p:sldId id="260" r:id="rId8"/>
-    <p:sldId id="261" r:id="rId9"/>
+    <p:sldId id="263" r:id="rId3"/>
+    <p:sldId id="262" r:id="rId4"/>
+    <p:sldId id="259" r:id="rId5"/>
+    <p:sldId id="260" r:id="rId6"/>
+    <p:sldId id="261" r:id="rId7"/>
   </p:sldIdLst>
   <p:sldSz cx="12192000" cy="6858000"/>
   <p:notesSz cx="6858000" cy="9144000"/>
@@ -9228,127 +9226,6 @@
 <file path=ppt/slides/slide2.xml><?xml version="1.0" encoding="utf-8"?>
 <p:sld xmlns:a="http://schemas.openxmlformats.org/drawingml/2006/main" xmlns:r="http://schemas.openxmlformats.org/officeDocument/2006/relationships" xmlns:p="http://schemas.openxmlformats.org/presentationml/2006/main">
   <p:cSld>
-    <p:spTree>
-      <p:nvGrpSpPr>
-        <p:cNvPr id="1" name=""/>
-        <p:cNvGrpSpPr/>
-        <p:nvPr/>
-      </p:nvGrpSpPr>
-      <p:grpSpPr>
-        <a:xfrm>
-          <a:off x="0" y="0"/>
-          <a:ext cx="0" cy="0"/>
-          <a:chOff x="0" y="0"/>
-          <a:chExt cx="0" cy="0"/>
-        </a:xfrm>
-      </p:grpSpPr>
-      <p:sp>
-        <p:nvSpPr>
-          <p:cNvPr id="2" name="Title 1">
-            <a:extLst>
-              <a:ext uri="{FF2B5EF4-FFF2-40B4-BE49-F238E27FC236}">
-                <a16:creationId xmlns:a16="http://schemas.microsoft.com/office/drawing/2014/main" id="{BAAB5038-821C-905C-4ED7-7CDDA6A601C2}"/>
-              </a:ext>
-            </a:extLst>
-          </p:cNvPr>
-          <p:cNvSpPr>
-            <a:spLocks noGrp="1"/>
-          </p:cNvSpPr>
-          <p:nvPr>
-            <p:ph type="title"/>
-          </p:nvPr>
-        </p:nvSpPr>
-        <p:spPr/>
-        <p:txBody>
-          <a:bodyPr/>
-          <a:lstStyle/>
-          <a:p>
-            <a:r>
-              <a:rPr lang="en-ZA" dirty="0"/>
-              <a:t>Introduction</a:t>
-            </a:r>
-          </a:p>
-        </p:txBody>
-      </p:sp>
-      <p:sp>
-        <p:nvSpPr>
-          <p:cNvPr id="3" name="Content Placeholder 2">
-            <a:extLst>
-              <a:ext uri="{FF2B5EF4-FFF2-40B4-BE49-F238E27FC236}">
-                <a16:creationId xmlns:a16="http://schemas.microsoft.com/office/drawing/2014/main" id="{4B6D13A4-3982-1F3F-AA40-172F6D7F1A9C}"/>
-              </a:ext>
-            </a:extLst>
-          </p:cNvPr>
-          <p:cNvSpPr>
-            <a:spLocks noGrp="1"/>
-          </p:cNvSpPr>
-          <p:nvPr>
-            <p:ph idx="1"/>
-          </p:nvPr>
-        </p:nvSpPr>
-        <p:spPr/>
-        <p:txBody>
-          <a:bodyPr/>
-          <a:lstStyle/>
-          <a:p>
-            <a:pPr>
-              <a:buClr>
-                <a:schemeClr val="tx2"/>
-              </a:buClr>
-            </a:pPr>
-            <a:r>
-              <a:rPr lang="en-ZA" dirty="0"/>
-              <a:t>People struggle to find recipes that are suited to their needs</a:t>
-            </a:r>
-          </a:p>
-          <a:p>
-            <a:pPr>
-              <a:buClr>
-                <a:schemeClr val="tx2"/>
-              </a:buClr>
-            </a:pPr>
-            <a:r>
-              <a:rPr lang="en-ZA" dirty="0"/>
-              <a:t>Lack of beginner-friendly recipes</a:t>
-            </a:r>
-          </a:p>
-          <a:p>
-            <a:pPr>
-              <a:buClr>
-                <a:schemeClr val="tx2"/>
-              </a:buClr>
-            </a:pPr>
-            <a:r>
-              <a:rPr lang="en-ZA" dirty="0"/>
-              <a:t>How this affects those who need easy to follow recipes</a:t>
-            </a:r>
-          </a:p>
-          <a:p>
-            <a:pPr>
-              <a:buClr>
-                <a:schemeClr val="tx2"/>
-              </a:buClr>
-            </a:pPr>
-            <a:endParaRPr lang="en-ZA" dirty="0"/>
-          </a:p>
-        </p:txBody>
-      </p:sp>
-    </p:spTree>
-    <p:extLst>
-      <p:ext uri="{BB962C8B-B14F-4D97-AF65-F5344CB8AC3E}">
-        <p14:creationId xmlns:p14="http://schemas.microsoft.com/office/powerpoint/2010/main" val="3520264310"/>
-      </p:ext>
-    </p:extLst>
-  </p:cSld>
-  <p:clrMapOvr>
-    <a:masterClrMapping/>
-  </p:clrMapOvr>
-</p:sld>
-</file>
-
-<file path=ppt/slides/slide3.xml><?xml version="1.0" encoding="utf-8"?>
-<p:sld xmlns:a="http://schemas.openxmlformats.org/drawingml/2006/main" xmlns:r="http://schemas.openxmlformats.org/officeDocument/2006/relationships" xmlns:p="http://schemas.openxmlformats.org/presentationml/2006/main">
-  <p:cSld>
     <p:bg>
       <p:bgPr>
         <a:solidFill>
@@ -9717,124 +9594,7 @@
 </p:sld>
 </file>
 
-<file path=ppt/slides/slide4.xml><?xml version="1.0" encoding="utf-8"?>
-<p:sld xmlns:a="http://schemas.openxmlformats.org/drawingml/2006/main" xmlns:r="http://schemas.openxmlformats.org/officeDocument/2006/relationships" xmlns:p="http://schemas.openxmlformats.org/presentationml/2006/main">
-  <p:cSld>
-    <p:spTree>
-      <p:nvGrpSpPr>
-        <p:cNvPr id="1" name=""/>
-        <p:cNvGrpSpPr/>
-        <p:nvPr/>
-      </p:nvGrpSpPr>
-      <p:grpSpPr>
-        <a:xfrm>
-          <a:off x="0" y="0"/>
-          <a:ext cx="0" cy="0"/>
-          <a:chOff x="0" y="0"/>
-          <a:chExt cx="0" cy="0"/>
-        </a:xfrm>
-      </p:grpSpPr>
-      <p:sp>
-        <p:nvSpPr>
-          <p:cNvPr id="2" name="Title 1">
-            <a:extLst>
-              <a:ext uri="{FF2B5EF4-FFF2-40B4-BE49-F238E27FC236}">
-                <a16:creationId xmlns:a16="http://schemas.microsoft.com/office/drawing/2014/main" id="{5D637F0A-0D92-58C9-8AC4-8F8807E0AF6B}"/>
-              </a:ext>
-            </a:extLst>
-          </p:cNvPr>
-          <p:cNvSpPr>
-            <a:spLocks noGrp="1"/>
-          </p:cNvSpPr>
-          <p:nvPr>
-            <p:ph type="title"/>
-          </p:nvPr>
-        </p:nvSpPr>
-        <p:spPr/>
-        <p:txBody>
-          <a:bodyPr/>
-          <a:lstStyle/>
-          <a:p>
-            <a:r>
-              <a:rPr lang="en-ZA" dirty="0"/>
-              <a:t>Objectives</a:t>
-            </a:r>
-          </a:p>
-        </p:txBody>
-      </p:sp>
-      <p:sp>
-        <p:nvSpPr>
-          <p:cNvPr id="3" name="Content Placeholder 2">
-            <a:extLst>
-              <a:ext uri="{FF2B5EF4-FFF2-40B4-BE49-F238E27FC236}">
-                <a16:creationId xmlns:a16="http://schemas.microsoft.com/office/drawing/2014/main" id="{861FEE8E-B3B9-77D7-EEBE-C157B7ADB4A8}"/>
-              </a:ext>
-            </a:extLst>
-          </p:cNvPr>
-          <p:cNvSpPr>
-            <a:spLocks noGrp="1"/>
-          </p:cNvSpPr>
-          <p:nvPr>
-            <p:ph idx="1"/>
-          </p:nvPr>
-        </p:nvSpPr>
-        <p:spPr/>
-        <p:txBody>
-          <a:bodyPr/>
-          <a:lstStyle/>
-          <a:p>
-            <a:r>
-              <a:rPr lang="en-ZA"/>
-              <a:t>Personalise meal plans</a:t>
-            </a:r>
-          </a:p>
-          <a:p>
-            <a:r>
-              <a:rPr lang="en-ZA"/>
-              <a:t>Filter recipes based off available ingredients</a:t>
-            </a:r>
-          </a:p>
-          <a:p>
-            <a:r>
-              <a:rPr lang="en-ZA"/>
-              <a:t>Offline feature to save recipes</a:t>
-            </a:r>
-          </a:p>
-          <a:p>
-            <a:r>
-              <a:rPr lang="en-ZA"/>
-              <a:t>Provide step-by-step instructions </a:t>
-            </a:r>
-          </a:p>
-          <a:p>
-            <a:r>
-              <a:rPr lang="en-ZA"/>
-              <a:t>Scheduling with a built-in meal planner</a:t>
-            </a:r>
-          </a:p>
-          <a:p>
-            <a:r>
-              <a:rPr lang="en-ZA"/>
-              <a:t>Accessible as a multi-platform app</a:t>
-            </a:r>
-            <a:endParaRPr lang="en-ZA" dirty="0"/>
-          </a:p>
-        </p:txBody>
-      </p:sp>
-    </p:spTree>
-    <p:extLst>
-      <p:ext uri="{BB962C8B-B14F-4D97-AF65-F5344CB8AC3E}">
-        <p14:creationId xmlns:p14="http://schemas.microsoft.com/office/powerpoint/2010/main" val="240963032"/>
-      </p:ext>
-    </p:extLst>
-  </p:cSld>
-  <p:clrMapOvr>
-    <a:masterClrMapping/>
-  </p:clrMapOvr>
-</p:sld>
-</file>
-
-<file path=ppt/slides/slide5.xml><?xml version="1.0" encoding="utf-8"?>
+<file path=ppt/slides/slide3.xml><?xml version="1.0" encoding="utf-8"?>
 <p:sld xmlns:a="http://schemas.openxmlformats.org/drawingml/2006/main" xmlns:r="http://schemas.openxmlformats.org/officeDocument/2006/relationships" xmlns:p="http://schemas.openxmlformats.org/presentationml/2006/main">
   <p:cSld>
     <p:bg>
@@ -10660,7 +10420,7 @@
 </p:sld>
 </file>
 
-<file path=ppt/slides/slide6.xml><?xml version="1.0" encoding="utf-8"?>
+<file path=ppt/slides/slide4.xml><?xml version="1.0" encoding="utf-8"?>
 <p:sld xmlns:a="http://schemas.openxmlformats.org/drawingml/2006/main" xmlns:r="http://schemas.openxmlformats.org/officeDocument/2006/relationships" xmlns:p="http://schemas.openxmlformats.org/presentationml/2006/main">
   <p:cSld>
     <p:spTree>
@@ -10875,7 +10635,7 @@
 </p:sld>
 </file>
 
-<file path=ppt/slides/slide7.xml><?xml version="1.0" encoding="utf-8"?>
+<file path=ppt/slides/slide5.xml><?xml version="1.0" encoding="utf-8"?>
 <p:sld xmlns:a="http://schemas.openxmlformats.org/drawingml/2006/main" xmlns:r="http://schemas.openxmlformats.org/officeDocument/2006/relationships" xmlns:p="http://schemas.openxmlformats.org/presentationml/2006/main">
   <p:cSld>
     <p:spTree>
@@ -11063,7 +10823,7 @@
 </p:sld>
 </file>
 
-<file path=ppt/slides/slide8.xml><?xml version="1.0" encoding="utf-8"?>
+<file path=ppt/slides/slide6.xml><?xml version="1.0" encoding="utf-8"?>
 <p:sld xmlns:a="http://schemas.openxmlformats.org/drawingml/2006/main" xmlns:r="http://schemas.openxmlformats.org/officeDocument/2006/relationships" xmlns:p="http://schemas.openxmlformats.org/presentationml/2006/main">
   <p:cSld>
     <p:spTree>

</xml_diff>

<commit_message>
Cleaned Up some files
</commit_message>
<xml_diff>
--- a/PowerPoint Slides/ITPV302 - Presentation.pptx
+++ b/PowerPoint Slides/ITPV302 - Presentation.pptx
@@ -3348,7 +3348,7 @@
           <a:p>
             <a:fld id="{E8911957-E561-4BF5-98AE-BB567BC01949}" type="datetimeFigureOut">
               <a:rPr lang="en-ZA" smtClean="0"/>
-              <a:t>2024/11/04</a:t>
+              <a:t>2024/11/05</a:t>
             </a:fld>
             <a:endParaRPr lang="en-ZA"/>
           </a:p>
@@ -3623,7 +3623,7 @@
           <a:p>
             <a:fld id="{E8911957-E561-4BF5-98AE-BB567BC01949}" type="datetimeFigureOut">
               <a:rPr lang="en-ZA" smtClean="0"/>
-              <a:t>2024/11/04</a:t>
+              <a:t>2024/11/05</a:t>
             </a:fld>
             <a:endParaRPr lang="en-ZA"/>
           </a:p>
@@ -3817,7 +3817,7 @@
           <a:p>
             <a:fld id="{E8911957-E561-4BF5-98AE-BB567BC01949}" type="datetimeFigureOut">
               <a:rPr lang="en-ZA" smtClean="0"/>
-              <a:t>2024/11/04</a:t>
+              <a:t>2024/11/05</a:t>
             </a:fld>
             <a:endParaRPr lang="en-ZA"/>
           </a:p>
@@ -4090,7 +4090,7 @@
           <a:p>
             <a:fld id="{E8911957-E561-4BF5-98AE-BB567BC01949}" type="datetimeFigureOut">
               <a:rPr lang="en-ZA" smtClean="0"/>
-              <a:t>2024/11/04</a:t>
+              <a:t>2024/11/05</a:t>
             </a:fld>
             <a:endParaRPr lang="en-ZA"/>
           </a:p>
@@ -4431,7 +4431,7 @@
           <a:p>
             <a:fld id="{E8911957-E561-4BF5-98AE-BB567BC01949}" type="datetimeFigureOut">
               <a:rPr lang="en-ZA" smtClean="0"/>
-              <a:t>2024/11/04</a:t>
+              <a:t>2024/11/05</a:t>
             </a:fld>
             <a:endParaRPr lang="en-ZA"/>
           </a:p>
@@ -5054,7 +5054,7 @@
           <a:p>
             <a:fld id="{E8911957-E561-4BF5-98AE-BB567BC01949}" type="datetimeFigureOut">
               <a:rPr lang="en-ZA" smtClean="0"/>
-              <a:t>2024/11/04</a:t>
+              <a:t>2024/11/05</a:t>
             </a:fld>
             <a:endParaRPr lang="en-ZA"/>
           </a:p>
@@ -5914,7 +5914,7 @@
           <a:p>
             <a:fld id="{E8911957-E561-4BF5-98AE-BB567BC01949}" type="datetimeFigureOut">
               <a:rPr lang="en-ZA" smtClean="0"/>
-              <a:t>2024/11/04</a:t>
+              <a:t>2024/11/05</a:t>
             </a:fld>
             <a:endParaRPr lang="en-ZA"/>
           </a:p>
@@ -6084,7 +6084,7 @@
           <a:p>
             <a:fld id="{E8911957-E561-4BF5-98AE-BB567BC01949}" type="datetimeFigureOut">
               <a:rPr lang="en-ZA" smtClean="0"/>
-              <a:t>2024/11/04</a:t>
+              <a:t>2024/11/05</a:t>
             </a:fld>
             <a:endParaRPr lang="en-ZA"/>
           </a:p>
@@ -6264,7 +6264,7 @@
           <a:p>
             <a:fld id="{E8911957-E561-4BF5-98AE-BB567BC01949}" type="datetimeFigureOut">
               <a:rPr lang="en-ZA" smtClean="0"/>
-              <a:t>2024/11/04</a:t>
+              <a:t>2024/11/05</a:t>
             </a:fld>
             <a:endParaRPr lang="en-ZA"/>
           </a:p>
@@ -6434,7 +6434,7 @@
           <a:p>
             <a:fld id="{E8911957-E561-4BF5-98AE-BB567BC01949}" type="datetimeFigureOut">
               <a:rPr lang="en-ZA" smtClean="0"/>
-              <a:t>2024/11/04</a:t>
+              <a:t>2024/11/05</a:t>
             </a:fld>
             <a:endParaRPr lang="en-ZA"/>
           </a:p>
@@ -6681,7 +6681,7 @@
           <a:p>
             <a:fld id="{E8911957-E561-4BF5-98AE-BB567BC01949}" type="datetimeFigureOut">
               <a:rPr lang="en-ZA" smtClean="0"/>
-              <a:t>2024/11/04</a:t>
+              <a:t>2024/11/05</a:t>
             </a:fld>
             <a:endParaRPr lang="en-ZA"/>
           </a:p>
@@ -6973,7 +6973,7 @@
           <a:p>
             <a:fld id="{E8911957-E561-4BF5-98AE-BB567BC01949}" type="datetimeFigureOut">
               <a:rPr lang="en-ZA" smtClean="0"/>
-              <a:t>2024/11/04</a:t>
+              <a:t>2024/11/05</a:t>
             </a:fld>
             <a:endParaRPr lang="en-ZA"/>
           </a:p>
@@ -7417,7 +7417,7 @@
           <a:p>
             <a:fld id="{E8911957-E561-4BF5-98AE-BB567BC01949}" type="datetimeFigureOut">
               <a:rPr lang="en-ZA" smtClean="0"/>
-              <a:t>2024/11/04</a:t>
+              <a:t>2024/11/05</a:t>
             </a:fld>
             <a:endParaRPr lang="en-ZA"/>
           </a:p>
@@ -7535,7 +7535,7 @@
           <a:p>
             <a:fld id="{E8911957-E561-4BF5-98AE-BB567BC01949}" type="datetimeFigureOut">
               <a:rPr lang="en-ZA" smtClean="0"/>
-              <a:t>2024/11/04</a:t>
+              <a:t>2024/11/05</a:t>
             </a:fld>
             <a:endParaRPr lang="en-ZA"/>
           </a:p>
@@ -7630,7 +7630,7 @@
           <a:p>
             <a:fld id="{E8911957-E561-4BF5-98AE-BB567BC01949}" type="datetimeFigureOut">
               <a:rPr lang="en-ZA" smtClean="0"/>
-              <a:t>2024/11/04</a:t>
+              <a:t>2024/11/05</a:t>
             </a:fld>
             <a:endParaRPr lang="en-ZA"/>
           </a:p>
@@ -7909,7 +7909,7 @@
           <a:p>
             <a:fld id="{E8911957-E561-4BF5-98AE-BB567BC01949}" type="datetimeFigureOut">
               <a:rPr lang="en-ZA" smtClean="0"/>
-              <a:t>2024/11/04</a:t>
+              <a:t>2024/11/05</a:t>
             </a:fld>
             <a:endParaRPr lang="en-ZA"/>
           </a:p>
@@ -8184,7 +8184,7 @@
           <a:p>
             <a:fld id="{E8911957-E561-4BF5-98AE-BB567BC01949}" type="datetimeFigureOut">
               <a:rPr lang="en-ZA" smtClean="0"/>
-              <a:t>2024/11/04</a:t>
+              <a:t>2024/11/05</a:t>
             </a:fld>
             <a:endParaRPr lang="en-ZA"/>
           </a:p>
@@ -8613,7 +8613,7 @@
           <a:p>
             <a:fld id="{E8911957-E561-4BF5-98AE-BB567BC01949}" type="datetimeFigureOut">
               <a:rPr lang="en-ZA" smtClean="0"/>
-              <a:t>2024/11/04</a:t>
+              <a:t>2024/11/05</a:t>
             </a:fld>
             <a:endParaRPr lang="en-ZA"/>
           </a:p>
@@ -9278,6 +9278,62 @@
           </a:prstGeom>
         </p:spPr>
       </p:pic>
+      <p:sp>
+        <p:nvSpPr>
+          <p:cNvPr id="4" name="TextBox 3">
+            <a:extLst>
+              <a:ext uri="{FF2B5EF4-FFF2-40B4-BE49-F238E27FC236}">
+                <a16:creationId xmlns:a16="http://schemas.microsoft.com/office/drawing/2014/main" id="{F88AF123-1071-AD58-49AA-F173C23A4F2A}"/>
+              </a:ext>
+            </a:extLst>
+          </p:cNvPr>
+          <p:cNvSpPr txBox="1"/>
+          <p:nvPr/>
+        </p:nvSpPr>
+        <p:spPr>
+          <a:xfrm>
+            <a:off x="8502315" y="5759116"/>
+            <a:ext cx="4186989" cy="923330"/>
+          </a:xfrm>
+          <a:prstGeom prst="rect">
+            <a:avLst/>
+          </a:prstGeom>
+          <a:noFill/>
+        </p:spPr>
+        <p:txBody>
+          <a:bodyPr wrap="square" rtlCol="0">
+            <a:spAutoFit/>
+          </a:bodyPr>
+          <a:lstStyle/>
+          <a:p>
+            <a:r>
+              <a:rPr lang="en-US" dirty="0"/>
+              <a:t>Nathan Rogers s221412581</a:t>
+            </a:r>
+          </a:p>
+          <a:p>
+            <a:r>
+              <a:rPr lang="en-US" dirty="0"/>
+              <a:t>Zanele </a:t>
+            </a:r>
+            <a:r>
+              <a:rPr lang="en-US" dirty="0" err="1"/>
+              <a:t>Mndaweni</a:t>
+            </a:r>
+            <a:r>
+              <a:rPr lang="en-US" dirty="0"/>
+              <a:t> s225097524</a:t>
+            </a:r>
+          </a:p>
+          <a:p>
+            <a:r>
+              <a:rPr lang="en-US" dirty="0"/>
+              <a:t>Max Naidoo s225227053 </a:t>
+            </a:r>
+            <a:endParaRPr lang="en-ZA" dirty="0"/>
+          </a:p>
+        </p:txBody>
+      </p:sp>
     </p:spTree>
     <p:extLst>
       <p:ext uri="{BB962C8B-B14F-4D97-AF65-F5344CB8AC3E}">
@@ -9288,13 +9344,13 @@
   <p:clrMapOvr>
     <a:masterClrMapping/>
   </p:clrMapOvr>
-  <mc:AlternateContent xmlns:mc="http://schemas.openxmlformats.org/markup-compatibility/2006">
-    <mc:Choice xmlns:p14="http://schemas.microsoft.com/office/powerpoint/2010/main" Requires="p14">
+  <mc:AlternateContent xmlns:mc="http://schemas.openxmlformats.org/markup-compatibility/2006" xmlns:p14="http://schemas.microsoft.com/office/powerpoint/2010/main">
+    <mc:Choice Requires="p14">
       <p:transition spd="med" p14:dur="700">
         <p:fade/>
       </p:transition>
     </mc:Choice>
-    <mc:Fallback>
+    <mc:Fallback xmlns="">
       <p:transition spd="med">
         <p:fade/>
       </p:transition>
@@ -9671,13 +9727,13 @@
   <p:clrMapOvr>
     <a:overrideClrMapping bg1="lt1" tx1="dk1" bg2="lt2" tx2="dk2" accent1="accent1" accent2="accent2" accent3="accent3" accent4="accent4" accent5="accent5" accent6="accent6" hlink="hlink" folHlink="folHlink"/>
   </p:clrMapOvr>
-  <mc:AlternateContent xmlns:mc="http://schemas.openxmlformats.org/markup-compatibility/2006">
-    <mc:Choice xmlns:p14="http://schemas.microsoft.com/office/powerpoint/2010/main" Requires="p14">
+  <mc:AlternateContent xmlns:mc="http://schemas.openxmlformats.org/markup-compatibility/2006" xmlns:p14="http://schemas.microsoft.com/office/powerpoint/2010/main">
+    <mc:Choice Requires="p14">
       <p:transition spd="med" p14:dur="700">
         <p:fade/>
       </p:transition>
     </mc:Choice>
-    <mc:Fallback>
+    <mc:Fallback xmlns="">
       <p:transition spd="med">
         <p:fade/>
       </p:transition>
@@ -10509,13 +10565,13 @@
   <p:clrMapOvr>
     <a:masterClrMapping/>
   </p:clrMapOvr>
-  <mc:AlternateContent xmlns:mc="http://schemas.openxmlformats.org/markup-compatibility/2006">
-    <mc:Choice xmlns:p14="http://schemas.microsoft.com/office/powerpoint/2010/main" Requires="p14">
+  <mc:AlternateContent xmlns:mc="http://schemas.openxmlformats.org/markup-compatibility/2006" xmlns:p14="http://schemas.microsoft.com/office/powerpoint/2010/main">
+    <mc:Choice Requires="p14">
       <p:transition spd="med" p14:dur="700">
         <p:fade/>
       </p:transition>
     </mc:Choice>
-    <mc:Fallback>
+    <mc:Fallback xmlns="">
       <p:transition spd="med">
         <p:fade/>
       </p:transition>
@@ -10768,13 +10824,13 @@
   <p:clrMapOvr>
     <a:masterClrMapping/>
   </p:clrMapOvr>
-  <mc:AlternateContent xmlns:mc="http://schemas.openxmlformats.org/markup-compatibility/2006">
-    <mc:Choice xmlns:p14="http://schemas.microsoft.com/office/powerpoint/2010/main" Requires="p14">
+  <mc:AlternateContent xmlns:mc="http://schemas.openxmlformats.org/markup-compatibility/2006" xmlns:p14="http://schemas.microsoft.com/office/powerpoint/2010/main">
+    <mc:Choice Requires="p14">
       <p:transition spd="med" p14:dur="700">
         <p:fade/>
       </p:transition>
     </mc:Choice>
-    <mc:Fallback>
+    <mc:Fallback xmlns="">
       <p:transition spd="med">
         <p:fade/>
       </p:transition>
@@ -10961,13 +11017,13 @@
   <p:clrMapOvr>
     <a:masterClrMapping/>
   </p:clrMapOvr>
-  <mc:AlternateContent xmlns:mc="http://schemas.openxmlformats.org/markup-compatibility/2006">
-    <mc:Choice xmlns:p14="http://schemas.microsoft.com/office/powerpoint/2010/main" Requires="p14">
+  <mc:AlternateContent xmlns:mc="http://schemas.openxmlformats.org/markup-compatibility/2006" xmlns:p14="http://schemas.microsoft.com/office/powerpoint/2010/main">
+    <mc:Choice Requires="p14">
       <p:transition spd="med" p14:dur="700">
         <p:fade/>
       </p:transition>
     </mc:Choice>
-    <mc:Fallback>
+    <mc:Fallback xmlns="">
       <p:transition spd="med">
         <p:fade/>
       </p:transition>
@@ -11017,8 +11073,8 @@
         </p:nvSpPr>
         <p:spPr>
           <a:xfrm>
-            <a:off x="0" y="614046"/>
-            <a:ext cx="3528091" cy="1447800"/>
+            <a:off x="0" y="0"/>
+            <a:ext cx="8833104" cy="1447800"/>
           </a:xfrm>
         </p:spPr>
         <p:txBody>
@@ -11026,7 +11082,7 @@
           <a:lstStyle/>
           <a:p>
             <a:r>
-              <a:rPr lang="en-ZA" sz="2800" dirty="0"/>
+              <a:rPr lang="en-ZA" sz="4200" dirty="0"/>
               <a:t>Relational database diagram</a:t>
             </a:r>
           </a:p>
@@ -11175,13 +11231,13 @@
   <p:clrMapOvr>
     <a:masterClrMapping/>
   </p:clrMapOvr>
-  <mc:AlternateContent xmlns:mc="http://schemas.openxmlformats.org/markup-compatibility/2006">
-    <mc:Choice xmlns:p14="http://schemas.microsoft.com/office/powerpoint/2010/main" Requires="p14">
+  <mc:AlternateContent xmlns:mc="http://schemas.openxmlformats.org/markup-compatibility/2006" xmlns:p14="http://schemas.microsoft.com/office/powerpoint/2010/main">
+    <mc:Choice Requires="p14">
       <p:transition spd="med" p14:dur="700">
         <p:fade/>
       </p:transition>
     </mc:Choice>
-    <mc:Fallback>
+    <mc:Fallback xmlns="">
       <p:transition spd="med">
         <p:fade/>
       </p:transition>
@@ -11292,13 +11348,13 @@
   <p:clrMapOvr>
     <a:masterClrMapping/>
   </p:clrMapOvr>
-  <mc:AlternateContent xmlns:mc="http://schemas.openxmlformats.org/markup-compatibility/2006">
-    <mc:Choice xmlns:p159="http://schemas.microsoft.com/office/powerpoint/2015/09/main" Requires="p159">
+  <mc:AlternateContent xmlns:mc="http://schemas.openxmlformats.org/markup-compatibility/2006" xmlns:p159="http://schemas.microsoft.com/office/powerpoint/2015/09/main">
+    <mc:Choice Requires="p159">
       <p:transition xmlns:p14="http://schemas.microsoft.com/office/powerpoint/2010/main" spd="slow" p14:dur="2000">
         <p159:morph option="byObject"/>
       </p:transition>
     </mc:Choice>
-    <mc:Fallback>
+    <mc:Fallback xmlns="">
       <p:transition spd="slow">
         <p:fade/>
       </p:transition>
@@ -11352,31 +11408,6 @@
           </a:p>
         </p:txBody>
       </p:sp>
-      <p:sp>
-        <p:nvSpPr>
-          <p:cNvPr id="3" name="Subtitle 2">
-            <a:extLst>
-              <a:ext uri="{FF2B5EF4-FFF2-40B4-BE49-F238E27FC236}">
-                <a16:creationId xmlns:a16="http://schemas.microsoft.com/office/drawing/2014/main" id="{68EE04BD-6407-07F9-86AA-F4D0C6041955}"/>
-              </a:ext>
-            </a:extLst>
-          </p:cNvPr>
-          <p:cNvSpPr>
-            <a:spLocks noGrp="1"/>
-          </p:cNvSpPr>
-          <p:nvPr>
-            <p:ph type="subTitle" idx="1"/>
-          </p:nvPr>
-        </p:nvSpPr>
-        <p:spPr/>
-        <p:txBody>
-          <a:bodyPr/>
-          <a:lstStyle/>
-          <a:p>
-            <a:endParaRPr lang="en-ZA"/>
-          </a:p>
-        </p:txBody>
-      </p:sp>
     </p:spTree>
     <p:extLst>
       <p:ext uri="{BB962C8B-B14F-4D97-AF65-F5344CB8AC3E}">
@@ -11387,13 +11418,13 @@
   <p:clrMapOvr>
     <a:masterClrMapping/>
   </p:clrMapOvr>
-  <mc:AlternateContent xmlns:mc="http://schemas.openxmlformats.org/markup-compatibility/2006">
-    <mc:Choice xmlns:p14="http://schemas.microsoft.com/office/powerpoint/2010/main" Requires="p14">
+  <mc:AlternateContent xmlns:mc="http://schemas.openxmlformats.org/markup-compatibility/2006" xmlns:p14="http://schemas.microsoft.com/office/powerpoint/2010/main">
+    <mc:Choice Requires="p14">
       <p:transition spd="med" p14:dur="700">
         <p:fade/>
       </p:transition>
     </mc:Choice>
-    <mc:Fallback>
+    <mc:Fallback xmlns="">
       <p:transition spd="med">
         <p:fade/>
       </p:transition>

</xml_diff>